<commit_message>
few more empty slides
</commit_message>
<xml_diff>
--- a/git_python_kurs.pptx
+++ b/git_python_kurs.pptx
@@ -1,6 +1,6 @@
 
 <file path=ppt/presentation.xml><?xml version="1.0" encoding="utf-8"?>
-<p:presentation xmlns:a="http://schemas.openxmlformats.org/drawingml/2006/main" xmlns:r="http://schemas.openxmlformats.org/officeDocument/2006/relationships" xmlns:mc="http://schemas.openxmlformats.org/markup-compatibility/2006" xmlns:mv="urn:schemas-microsoft-com:mac:vml" xmlns:p="http://schemas.openxmlformats.org/presentationml/2006/main" mc:Ignorable="mv" mc:PreserveAttributes="mv:*" saveSubsetFonts="1" autoCompressPictures="0">
+<p:presentation xmlns:a="http://schemas.openxmlformats.org/drawingml/2006/main" xmlns:r="http://schemas.openxmlformats.org/officeDocument/2006/relationships" xmlns:p="http://schemas.openxmlformats.org/presentationml/2006/main" saveSubsetFonts="1" autoCompressPictures="0">
   <p:sldMasterIdLst>
     <p:sldMasterId id="2147483648" r:id="rId1"/>
   </p:sldMasterIdLst>
@@ -10,8 +10,13 @@
     <p:sldId id="257" r:id="rId4"/>
     <p:sldId id="258" r:id="rId5"/>
     <p:sldId id="262" r:id="rId6"/>
-    <p:sldId id="260" r:id="rId7"/>
-    <p:sldId id="259" r:id="rId8"/>
+    <p:sldId id="263" r:id="rId7"/>
+    <p:sldId id="264" r:id="rId8"/>
+    <p:sldId id="265" r:id="rId9"/>
+    <p:sldId id="266" r:id="rId10"/>
+    <p:sldId id="267" r:id="rId11"/>
+    <p:sldId id="268" r:id="rId12"/>
+    <p:sldId id="269" r:id="rId13"/>
   </p:sldIdLst>
   <p:sldSz cx="9144000" cy="6858000" type="screen4x3"/>
   <p:notesSz cx="6858000" cy="9144000"/>
@@ -114,7 +119,7 @@
 </file>
 
 <file path=ppt/slideLayouts/slideLayout1.xml><?xml version="1.0" encoding="utf-8"?>
-<p:sldLayout xmlns:a="http://schemas.openxmlformats.org/drawingml/2006/main" xmlns:r="http://schemas.openxmlformats.org/officeDocument/2006/relationships" xmlns:mc="http://schemas.openxmlformats.org/markup-compatibility/2006" xmlns:mv="urn:schemas-microsoft-com:mac:vml" xmlns:p="http://schemas.openxmlformats.org/presentationml/2006/main" mc:Ignorable="mv" mc:PreserveAttributes="mv:*" type="title" preserve="1">
+<p:sldLayout xmlns:a="http://schemas.openxmlformats.org/drawingml/2006/main" xmlns:r="http://schemas.openxmlformats.org/officeDocument/2006/relationships" xmlns:p="http://schemas.openxmlformats.org/presentationml/2006/main" type="title" preserve="1">
   <p:cSld name="Title Slide">
     <p:spTree>
       <p:nvGrpSpPr>
@@ -294,7 +299,7 @@
           <a:p>
             <a:fld id="{7AB4D525-FEA6-4C46-A836-18AB099A0B80}" type="datetimeFigureOut">
               <a:rPr lang="en-US" smtClean="0"/>
-              <a:t>1/30/15</a:t>
+              <a:t>2/9/15</a:t>
             </a:fld>
             <a:endParaRPr lang="en-US"/>
           </a:p>
@@ -336,7 +341,7 @@
           <a:p>
             <a:fld id="{4F754926-63EB-4746-BA1D-DEED820DE9EA}" type="slidenum">
               <a:rPr lang="en-US" smtClean="0"/>
-              <a:t>‹#›</a:t>
+              <a:t>‹Nr.›</a:t>
             </a:fld>
             <a:endParaRPr lang="en-US"/>
           </a:p>
@@ -351,7 +356,7 @@
 </file>
 
 <file path=ppt/slideLayouts/slideLayout10.xml><?xml version="1.0" encoding="utf-8"?>
-<p:sldLayout xmlns:a="http://schemas.openxmlformats.org/drawingml/2006/main" xmlns:r="http://schemas.openxmlformats.org/officeDocument/2006/relationships" xmlns:mc="http://schemas.openxmlformats.org/markup-compatibility/2006" xmlns:mv="urn:schemas-microsoft-com:mac:vml" xmlns:p="http://schemas.openxmlformats.org/presentationml/2006/main" mc:Ignorable="mv" mc:PreserveAttributes="mv:*" type="vertTx" preserve="1">
+<p:sldLayout xmlns:a="http://schemas.openxmlformats.org/drawingml/2006/main" xmlns:r="http://schemas.openxmlformats.org/officeDocument/2006/relationships" xmlns:p="http://schemas.openxmlformats.org/presentationml/2006/main" type="vertTx" preserve="1">
   <p:cSld name="Title and Vertical Text">
     <p:spTree>
       <p:nvGrpSpPr>
@@ -459,7 +464,7 @@
           <a:p>
             <a:fld id="{7AB4D525-FEA6-4C46-A836-18AB099A0B80}" type="datetimeFigureOut">
               <a:rPr lang="en-US" smtClean="0"/>
-              <a:t>1/30/15</a:t>
+              <a:t>2/9/15</a:t>
             </a:fld>
             <a:endParaRPr lang="en-US"/>
           </a:p>
@@ -501,7 +506,7 @@
           <a:p>
             <a:fld id="{4F754926-63EB-4746-BA1D-DEED820DE9EA}" type="slidenum">
               <a:rPr lang="en-US" smtClean="0"/>
-              <a:t>‹#›</a:t>
+              <a:t>‹Nr.›</a:t>
             </a:fld>
             <a:endParaRPr lang="en-US"/>
           </a:p>
@@ -516,7 +521,7 @@
 </file>
 
 <file path=ppt/slideLayouts/slideLayout11.xml><?xml version="1.0" encoding="utf-8"?>
-<p:sldLayout xmlns:a="http://schemas.openxmlformats.org/drawingml/2006/main" xmlns:r="http://schemas.openxmlformats.org/officeDocument/2006/relationships" xmlns:mc="http://schemas.openxmlformats.org/markup-compatibility/2006" xmlns:mv="urn:schemas-microsoft-com:mac:vml" xmlns:p="http://schemas.openxmlformats.org/presentationml/2006/main" mc:Ignorable="mv" mc:PreserveAttributes="mv:*" type="vertTitleAndTx" preserve="1">
+<p:sldLayout xmlns:a="http://schemas.openxmlformats.org/drawingml/2006/main" xmlns:r="http://schemas.openxmlformats.org/officeDocument/2006/relationships" xmlns:p="http://schemas.openxmlformats.org/presentationml/2006/main" type="vertTitleAndTx" preserve="1">
   <p:cSld name="Vertical Title and Text">
     <p:spTree>
       <p:nvGrpSpPr>
@@ -634,7 +639,7 @@
           <a:p>
             <a:fld id="{7AB4D525-FEA6-4C46-A836-18AB099A0B80}" type="datetimeFigureOut">
               <a:rPr lang="en-US" smtClean="0"/>
-              <a:t>1/30/15</a:t>
+              <a:t>2/9/15</a:t>
             </a:fld>
             <a:endParaRPr lang="en-US"/>
           </a:p>
@@ -676,7 +681,7 @@
           <a:p>
             <a:fld id="{4F754926-63EB-4746-BA1D-DEED820DE9EA}" type="slidenum">
               <a:rPr lang="en-US" smtClean="0"/>
-              <a:t>‹#›</a:t>
+              <a:t>‹Nr.›</a:t>
             </a:fld>
             <a:endParaRPr lang="en-US"/>
           </a:p>
@@ -691,7 +696,7 @@
 </file>
 
 <file path=ppt/slideLayouts/slideLayout2.xml><?xml version="1.0" encoding="utf-8"?>
-<p:sldLayout xmlns:a="http://schemas.openxmlformats.org/drawingml/2006/main" xmlns:r="http://schemas.openxmlformats.org/officeDocument/2006/relationships" xmlns:mc="http://schemas.openxmlformats.org/markup-compatibility/2006" xmlns:mv="urn:schemas-microsoft-com:mac:vml" xmlns:p="http://schemas.openxmlformats.org/presentationml/2006/main" mc:Ignorable="mv" mc:PreserveAttributes="mv:*" type="obj" preserve="1">
+<p:sldLayout xmlns:a="http://schemas.openxmlformats.org/drawingml/2006/main" xmlns:r="http://schemas.openxmlformats.org/officeDocument/2006/relationships" xmlns:p="http://schemas.openxmlformats.org/presentationml/2006/main" type="obj" preserve="1">
   <p:cSld name="Title and Content">
     <p:spTree>
       <p:nvGrpSpPr>
@@ -799,7 +804,7 @@
           <a:p>
             <a:fld id="{7AB4D525-FEA6-4C46-A836-18AB099A0B80}" type="datetimeFigureOut">
               <a:rPr lang="en-US" smtClean="0"/>
-              <a:t>1/30/15</a:t>
+              <a:t>2/9/15</a:t>
             </a:fld>
             <a:endParaRPr lang="en-US"/>
           </a:p>
@@ -841,7 +846,7 @@
           <a:p>
             <a:fld id="{4F754926-63EB-4746-BA1D-DEED820DE9EA}" type="slidenum">
               <a:rPr lang="en-US" smtClean="0"/>
-              <a:t>‹#›</a:t>
+              <a:t>‹Nr.›</a:t>
             </a:fld>
             <a:endParaRPr lang="en-US"/>
           </a:p>
@@ -856,7 +861,7 @@
 </file>
 
 <file path=ppt/slideLayouts/slideLayout3.xml><?xml version="1.0" encoding="utf-8"?>
-<p:sldLayout xmlns:a="http://schemas.openxmlformats.org/drawingml/2006/main" xmlns:r="http://schemas.openxmlformats.org/officeDocument/2006/relationships" xmlns:mc="http://schemas.openxmlformats.org/markup-compatibility/2006" xmlns:mv="urn:schemas-microsoft-com:mac:vml" xmlns:p="http://schemas.openxmlformats.org/presentationml/2006/main" mc:Ignorable="mv" mc:PreserveAttributes="mv:*" type="secHead" preserve="1">
+<p:sldLayout xmlns:a="http://schemas.openxmlformats.org/drawingml/2006/main" xmlns:r="http://schemas.openxmlformats.org/officeDocument/2006/relationships" xmlns:p="http://schemas.openxmlformats.org/presentationml/2006/main" type="secHead" preserve="1">
   <p:cSld name="Section Header">
     <p:spTree>
       <p:nvGrpSpPr>
@@ -1040,7 +1045,7 @@
           <a:p>
             <a:fld id="{7AB4D525-FEA6-4C46-A836-18AB099A0B80}" type="datetimeFigureOut">
               <a:rPr lang="en-US" smtClean="0"/>
-              <a:t>1/30/15</a:t>
+              <a:t>2/9/15</a:t>
             </a:fld>
             <a:endParaRPr lang="en-US"/>
           </a:p>
@@ -1082,7 +1087,7 @@
           <a:p>
             <a:fld id="{4F754926-63EB-4746-BA1D-DEED820DE9EA}" type="slidenum">
               <a:rPr lang="en-US" smtClean="0"/>
-              <a:t>‹#›</a:t>
+              <a:t>‹Nr.›</a:t>
             </a:fld>
             <a:endParaRPr lang="en-US"/>
           </a:p>
@@ -1097,7 +1102,7 @@
 </file>
 
 <file path=ppt/slideLayouts/slideLayout4.xml><?xml version="1.0" encoding="utf-8"?>
-<p:sldLayout xmlns:a="http://schemas.openxmlformats.org/drawingml/2006/main" xmlns:r="http://schemas.openxmlformats.org/officeDocument/2006/relationships" xmlns:mc="http://schemas.openxmlformats.org/markup-compatibility/2006" xmlns:mv="urn:schemas-microsoft-com:mac:vml" xmlns:p="http://schemas.openxmlformats.org/presentationml/2006/main" mc:Ignorable="mv" mc:PreserveAttributes="mv:*" type="twoObj" preserve="1">
+<p:sldLayout xmlns:a="http://schemas.openxmlformats.org/drawingml/2006/main" xmlns:r="http://schemas.openxmlformats.org/officeDocument/2006/relationships" xmlns:p="http://schemas.openxmlformats.org/presentationml/2006/main" type="twoObj" preserve="1">
   <p:cSld name="Two Content">
     <p:spTree>
       <p:nvGrpSpPr>
@@ -1323,7 +1328,7 @@
           <a:p>
             <a:fld id="{7AB4D525-FEA6-4C46-A836-18AB099A0B80}" type="datetimeFigureOut">
               <a:rPr lang="en-US" smtClean="0"/>
-              <a:t>1/30/15</a:t>
+              <a:t>2/9/15</a:t>
             </a:fld>
             <a:endParaRPr lang="en-US"/>
           </a:p>
@@ -1365,7 +1370,7 @@
           <a:p>
             <a:fld id="{4F754926-63EB-4746-BA1D-DEED820DE9EA}" type="slidenum">
               <a:rPr lang="en-US" smtClean="0"/>
-              <a:t>‹#›</a:t>
+              <a:t>‹Nr.›</a:t>
             </a:fld>
             <a:endParaRPr lang="en-US"/>
           </a:p>
@@ -1380,7 +1385,7 @@
 </file>
 
 <file path=ppt/slideLayouts/slideLayout5.xml><?xml version="1.0" encoding="utf-8"?>
-<p:sldLayout xmlns:a="http://schemas.openxmlformats.org/drawingml/2006/main" xmlns:r="http://schemas.openxmlformats.org/officeDocument/2006/relationships" xmlns:mc="http://schemas.openxmlformats.org/markup-compatibility/2006" xmlns:mv="urn:schemas-microsoft-com:mac:vml" xmlns:p="http://schemas.openxmlformats.org/presentationml/2006/main" mc:Ignorable="mv" mc:PreserveAttributes="mv:*" type="twoTxTwoObj" preserve="1">
+<p:sldLayout xmlns:a="http://schemas.openxmlformats.org/drawingml/2006/main" xmlns:r="http://schemas.openxmlformats.org/officeDocument/2006/relationships" xmlns:p="http://schemas.openxmlformats.org/presentationml/2006/main" type="twoTxTwoObj" preserve="1">
   <p:cSld name="Comparison">
     <p:spTree>
       <p:nvGrpSpPr>
@@ -1740,7 +1745,7 @@
           <a:p>
             <a:fld id="{7AB4D525-FEA6-4C46-A836-18AB099A0B80}" type="datetimeFigureOut">
               <a:rPr lang="en-US" smtClean="0"/>
-              <a:t>1/30/15</a:t>
+              <a:t>2/9/15</a:t>
             </a:fld>
             <a:endParaRPr lang="en-US"/>
           </a:p>
@@ -1782,7 +1787,7 @@
           <a:p>
             <a:fld id="{4F754926-63EB-4746-BA1D-DEED820DE9EA}" type="slidenum">
               <a:rPr lang="en-US" smtClean="0"/>
-              <a:t>‹#›</a:t>
+              <a:t>‹Nr.›</a:t>
             </a:fld>
             <a:endParaRPr lang="en-US"/>
           </a:p>
@@ -1797,7 +1802,7 @@
 </file>
 
 <file path=ppt/slideLayouts/slideLayout6.xml><?xml version="1.0" encoding="utf-8"?>
-<p:sldLayout xmlns:a="http://schemas.openxmlformats.org/drawingml/2006/main" xmlns:r="http://schemas.openxmlformats.org/officeDocument/2006/relationships" xmlns:mc="http://schemas.openxmlformats.org/markup-compatibility/2006" xmlns:mv="urn:schemas-microsoft-com:mac:vml" xmlns:p="http://schemas.openxmlformats.org/presentationml/2006/main" mc:Ignorable="mv" mc:PreserveAttributes="mv:*" type="titleOnly" preserve="1">
+<p:sldLayout xmlns:a="http://schemas.openxmlformats.org/drawingml/2006/main" xmlns:r="http://schemas.openxmlformats.org/officeDocument/2006/relationships" xmlns:p="http://schemas.openxmlformats.org/presentationml/2006/main" type="titleOnly" preserve="1">
   <p:cSld name="Title Only">
     <p:spTree>
       <p:nvGrpSpPr>
@@ -1853,7 +1858,7 @@
           <a:p>
             <a:fld id="{7AB4D525-FEA6-4C46-A836-18AB099A0B80}" type="datetimeFigureOut">
               <a:rPr lang="en-US" smtClean="0"/>
-              <a:t>1/30/15</a:t>
+              <a:t>2/9/15</a:t>
             </a:fld>
             <a:endParaRPr lang="en-US"/>
           </a:p>
@@ -1895,7 +1900,7 @@
           <a:p>
             <a:fld id="{4F754926-63EB-4746-BA1D-DEED820DE9EA}" type="slidenum">
               <a:rPr lang="en-US" smtClean="0"/>
-              <a:t>‹#›</a:t>
+              <a:t>‹Nr.›</a:t>
             </a:fld>
             <a:endParaRPr lang="en-US"/>
           </a:p>
@@ -1910,7 +1915,7 @@
 </file>
 
 <file path=ppt/slideLayouts/slideLayout7.xml><?xml version="1.0" encoding="utf-8"?>
-<p:sldLayout xmlns:a="http://schemas.openxmlformats.org/drawingml/2006/main" xmlns:r="http://schemas.openxmlformats.org/officeDocument/2006/relationships" xmlns:mc="http://schemas.openxmlformats.org/markup-compatibility/2006" xmlns:mv="urn:schemas-microsoft-com:mac:vml" xmlns:p="http://schemas.openxmlformats.org/presentationml/2006/main" mc:Ignorable="mv" mc:PreserveAttributes="mv:*" type="blank" preserve="1">
+<p:sldLayout xmlns:a="http://schemas.openxmlformats.org/drawingml/2006/main" xmlns:r="http://schemas.openxmlformats.org/officeDocument/2006/relationships" xmlns:p="http://schemas.openxmlformats.org/presentationml/2006/main" type="blank" preserve="1">
   <p:cSld name="Blank">
     <p:spTree>
       <p:nvGrpSpPr>
@@ -1943,7 +1948,7 @@
           <a:p>
             <a:fld id="{7AB4D525-FEA6-4C46-A836-18AB099A0B80}" type="datetimeFigureOut">
               <a:rPr lang="en-US" smtClean="0"/>
-              <a:t>1/30/15</a:t>
+              <a:t>2/9/15</a:t>
             </a:fld>
             <a:endParaRPr lang="en-US"/>
           </a:p>
@@ -1985,7 +1990,7 @@
           <a:p>
             <a:fld id="{4F754926-63EB-4746-BA1D-DEED820DE9EA}" type="slidenum">
               <a:rPr lang="en-US" smtClean="0"/>
-              <a:t>‹#›</a:t>
+              <a:t>‹Nr.›</a:t>
             </a:fld>
             <a:endParaRPr lang="en-US"/>
           </a:p>
@@ -2000,7 +2005,7 @@
 </file>
 
 <file path=ppt/slideLayouts/slideLayout8.xml><?xml version="1.0" encoding="utf-8"?>
-<p:sldLayout xmlns:a="http://schemas.openxmlformats.org/drawingml/2006/main" xmlns:r="http://schemas.openxmlformats.org/officeDocument/2006/relationships" xmlns:mc="http://schemas.openxmlformats.org/markup-compatibility/2006" xmlns:mv="urn:schemas-microsoft-com:mac:vml" xmlns:p="http://schemas.openxmlformats.org/presentationml/2006/main" mc:Ignorable="mv" mc:PreserveAttributes="mv:*" type="objTx" preserve="1">
+<p:sldLayout xmlns:a="http://schemas.openxmlformats.org/drawingml/2006/main" xmlns:r="http://schemas.openxmlformats.org/officeDocument/2006/relationships" xmlns:p="http://schemas.openxmlformats.org/presentationml/2006/main" type="objTx" preserve="1">
   <p:cSld name="Content with Caption">
     <p:spTree>
       <p:nvGrpSpPr>
@@ -2215,7 +2220,7 @@
           <a:p>
             <a:fld id="{7AB4D525-FEA6-4C46-A836-18AB099A0B80}" type="datetimeFigureOut">
               <a:rPr lang="en-US" smtClean="0"/>
-              <a:t>1/30/15</a:t>
+              <a:t>2/9/15</a:t>
             </a:fld>
             <a:endParaRPr lang="en-US"/>
           </a:p>
@@ -2257,7 +2262,7 @@
           <a:p>
             <a:fld id="{4F754926-63EB-4746-BA1D-DEED820DE9EA}" type="slidenum">
               <a:rPr lang="en-US" smtClean="0"/>
-              <a:t>‹#›</a:t>
+              <a:t>‹Nr.›</a:t>
             </a:fld>
             <a:endParaRPr lang="en-US"/>
           </a:p>
@@ -2272,7 +2277,7 @@
 </file>
 
 <file path=ppt/slideLayouts/slideLayout9.xml><?xml version="1.0" encoding="utf-8"?>
-<p:sldLayout xmlns:a="http://schemas.openxmlformats.org/drawingml/2006/main" xmlns:r="http://schemas.openxmlformats.org/officeDocument/2006/relationships" xmlns:mc="http://schemas.openxmlformats.org/markup-compatibility/2006" xmlns:mv="urn:schemas-microsoft-com:mac:vml" xmlns:p="http://schemas.openxmlformats.org/presentationml/2006/main" mc:Ignorable="mv" mc:PreserveAttributes="mv:*" type="picTx" preserve="1">
+<p:sldLayout xmlns:a="http://schemas.openxmlformats.org/drawingml/2006/main" xmlns:r="http://schemas.openxmlformats.org/officeDocument/2006/relationships" xmlns:p="http://schemas.openxmlformats.org/presentationml/2006/main" type="picTx" preserve="1">
   <p:cSld name="Picture with Caption">
     <p:spTree>
       <p:nvGrpSpPr>
@@ -2463,7 +2468,7 @@
           <a:p>
             <a:fld id="{7AB4D525-FEA6-4C46-A836-18AB099A0B80}" type="datetimeFigureOut">
               <a:rPr lang="en-US" smtClean="0"/>
-              <a:t>1/30/15</a:t>
+              <a:t>2/9/15</a:t>
             </a:fld>
             <a:endParaRPr lang="en-US"/>
           </a:p>
@@ -2505,7 +2510,7 @@
           <a:p>
             <a:fld id="{4F754926-63EB-4746-BA1D-DEED820DE9EA}" type="slidenum">
               <a:rPr lang="en-US" smtClean="0"/>
-              <a:t>‹#›</a:t>
+              <a:t>‹Nr.›</a:t>
             </a:fld>
             <a:endParaRPr lang="en-US"/>
           </a:p>
@@ -2520,7 +2525,7 @@
 </file>
 
 <file path=ppt/slideMasters/slideMaster1.xml><?xml version="1.0" encoding="utf-8"?>
-<p:sldMaster xmlns:a="http://schemas.openxmlformats.org/drawingml/2006/main" xmlns:r="http://schemas.openxmlformats.org/officeDocument/2006/relationships" xmlns:mc="http://schemas.openxmlformats.org/markup-compatibility/2006" xmlns:mv="urn:schemas-microsoft-com:mac:vml" xmlns:p="http://schemas.openxmlformats.org/presentationml/2006/main" mc:Ignorable="mv" mc:PreserveAttributes="mv:*">
+<p:sldMaster xmlns:a="http://schemas.openxmlformats.org/drawingml/2006/main" xmlns:r="http://schemas.openxmlformats.org/officeDocument/2006/relationships" xmlns:p="http://schemas.openxmlformats.org/presentationml/2006/main">
   <p:cSld>
     <p:bg>
       <p:bgRef idx="1001">
@@ -2671,7 +2676,7 @@
           <a:p>
             <a:fld id="{7AB4D525-FEA6-4C46-A836-18AB099A0B80}" type="datetimeFigureOut">
               <a:rPr lang="en-US" smtClean="0"/>
-              <a:t>1/30/15</a:t>
+              <a:t>2/9/15</a:t>
             </a:fld>
             <a:endParaRPr lang="en-US"/>
           </a:p>
@@ -2749,7 +2754,7 @@
           <a:p>
             <a:fld id="{4F754926-63EB-4746-BA1D-DEED820DE9EA}" type="slidenum">
               <a:rPr lang="en-US" smtClean="0"/>
-              <a:t>‹#›</a:t>
+              <a:t>‹Nr.›</a:t>
             </a:fld>
             <a:endParaRPr lang="en-US"/>
           </a:p>
@@ -3025,7 +3030,7 @@
 </file>
 
 <file path=ppt/slides/slide1.xml><?xml version="1.0" encoding="utf-8"?>
-<p:sld xmlns:a="http://schemas.openxmlformats.org/drawingml/2006/main" xmlns:r="http://schemas.openxmlformats.org/officeDocument/2006/relationships" xmlns:mc="http://schemas.openxmlformats.org/markup-compatibility/2006" xmlns:mv="urn:schemas-microsoft-com:mac:vml" xmlns:p="http://schemas.openxmlformats.org/presentationml/2006/main" mc:Ignorable="mv" mc:PreserveAttributes="mv:*">
+<p:sld xmlns:a="http://schemas.openxmlformats.org/drawingml/2006/main" xmlns:r="http://schemas.openxmlformats.org/officeDocument/2006/relationships" xmlns:p="http://schemas.openxmlformats.org/presentationml/2006/main">
   <p:cSld>
     <p:spTree>
       <p:nvGrpSpPr>
@@ -3163,11 +3168,7 @@
           <a:p>
             <a:r>
               <a:rPr lang="en-US" dirty="0" smtClean="0"/>
-              <a:t>What is version control?  What are version VCS (Version </a:t>
-            </a:r>
-            <a:r>
-              <a:rPr lang="en-US" dirty="0" smtClean="0"/>
-              <a:t>Control Systems)?</a:t>
+              <a:t>What is version control?  What are version VCS (Version Control Systems)?</a:t>
             </a:r>
             <a:br>
               <a:rPr lang="en-US" dirty="0" smtClean="0"/>
@@ -3177,15 +3178,7 @@
           <a:p>
             <a:r>
               <a:rPr lang="en-US" dirty="0" smtClean="0"/>
-              <a:t>	-&gt;software to automatically </a:t>
-            </a:r>
-            <a:r>
-              <a:rPr lang="en-US" dirty="0" smtClean="0"/>
-              <a:t>manage, save and restore changes to a 	set of files</a:t>
-            </a:r>
-            <a:r>
-              <a:rPr lang="en-US" dirty="0" smtClean="0"/>
-              <a:t> </a:t>
+              <a:t>	-&gt;software to automatically manage, save and restore changes to a 	set of files </a:t>
             </a:r>
           </a:p>
         </p:txBody>
@@ -3223,8 +3216,8 @@
 </p:sld>
 </file>
 
-<file path=ppt/slides/slide2.xml><?xml version="1.0" encoding="utf-8"?>
-<p:sld xmlns:a="http://schemas.openxmlformats.org/drawingml/2006/main" xmlns:r="http://schemas.openxmlformats.org/officeDocument/2006/relationships" xmlns:mc="http://schemas.openxmlformats.org/markup-compatibility/2006" xmlns:mv="urn:schemas-microsoft-com:mac:vml" xmlns:p="http://schemas.openxmlformats.org/presentationml/2006/main" mc:Ignorable="mv" mc:PreserveAttributes="mv:*">
+<file path=ppt/slides/slide10.xml><?xml version="1.0" encoding="utf-8"?>
+<p:sld xmlns:a="http://schemas.openxmlformats.org/drawingml/2006/main" xmlns:r="http://schemas.openxmlformats.org/officeDocument/2006/relationships" xmlns:p="http://schemas.openxmlformats.org/presentationml/2006/main">
   <p:cSld>
     <p:spTree>
       <p:nvGrpSpPr>
@@ -3248,8 +3241,8 @@
         </p:nvSpPr>
         <p:spPr>
           <a:xfrm>
-            <a:off x="715316" y="0"/>
-            <a:ext cx="7474322" cy="6463309"/>
+            <a:off x="581000" y="932188"/>
+            <a:ext cx="5593818" cy="369332"/>
           </a:xfrm>
           <a:prstGeom prst="rect">
             <a:avLst/>
@@ -3262,231 +3255,29 @@
           </a:bodyPr>
           <a:lstStyle/>
           <a:p>
-            <a:pPr marL="342900" indent="-342900"/>
-            <a:r>
-              <a:rPr lang="en-US" dirty="0" smtClean="0"/>
-              <a:t>Important terms</a:t>
-            </a:r>
-          </a:p>
-          <a:p>
-            <a:pPr marL="342900" indent="-342900"/>
-            <a:endParaRPr lang="en-US" dirty="0" smtClean="0"/>
-          </a:p>
-          <a:p>
-            <a:pPr marL="342900" indent="-342900">
-              <a:buFont typeface="Arial"/>
-              <a:buChar char="•"/>
-            </a:pPr>
-            <a:r>
-              <a:rPr lang="en-US" dirty="0" smtClean="0"/>
-              <a:t>Repository: </a:t>
-            </a:r>
-            <a:br>
-              <a:rPr lang="en-US" dirty="0" smtClean="0"/>
-            </a:br>
-            <a:r>
-              <a:rPr lang="en-US" dirty="0" smtClean="0"/>
-              <a:t>a set of files that the VCS knows about (may be in different folders),</a:t>
-            </a:r>
-            <a:br>
-              <a:rPr lang="en-US" dirty="0" smtClean="0"/>
-            </a:br>
-            <a:r>
-              <a:rPr lang="en-US" dirty="0" smtClean="0"/>
-              <a:t>	</a:t>
-            </a:r>
-            <a:r>
-              <a:rPr lang="en-US" i="1" dirty="0" smtClean="0"/>
-              <a:t>i.e. paper manuscript and graphics files</a:t>
-            </a:r>
-          </a:p>
-          <a:p>
-            <a:pPr marL="342900" indent="-342900"/>
-            <a:endParaRPr lang="en-US" dirty="0" smtClean="0"/>
-          </a:p>
-          <a:p>
-            <a:pPr marL="342900" indent="-342900">
-              <a:buFont typeface="Arial"/>
-              <a:buChar char="•"/>
-            </a:pPr>
-            <a:r>
-              <a:rPr lang="en-US" dirty="0" err="1" smtClean="0"/>
-              <a:t>Changeset</a:t>
-            </a:r>
-            <a:r>
-              <a:rPr lang="en-US" dirty="0" smtClean="0"/>
-              <a:t>: </a:t>
-            </a:r>
-            <a:br>
-              <a:rPr lang="en-US" dirty="0" smtClean="0"/>
-            </a:br>
-            <a:r>
-              <a:rPr lang="en-US" dirty="0" smtClean="0"/>
-              <a:t>a set of modifications or ‘</a:t>
-            </a:r>
-            <a:r>
-              <a:rPr lang="en-US" dirty="0" err="1" smtClean="0"/>
-              <a:t>diffs</a:t>
-            </a:r>
-            <a:r>
-              <a:rPr lang="en-US" dirty="0" smtClean="0"/>
-              <a:t>’ to the repository (changes to files, adding/deleting files/folders),</a:t>
-            </a:r>
-            <a:br>
-              <a:rPr lang="en-US" dirty="0" smtClean="0"/>
-            </a:br>
-            <a:r>
-              <a:rPr lang="en-US" dirty="0" smtClean="0"/>
-              <a:t>	 </a:t>
-            </a:r>
-            <a:r>
-              <a:rPr lang="en-US" i="1" dirty="0" smtClean="0"/>
-              <a:t>i.e. adding a paragraph to the manuscript and replacing a 	graphics files</a:t>
-            </a:r>
-          </a:p>
-          <a:p>
-            <a:pPr marL="342900" indent="-342900">
-              <a:buFont typeface="Arial"/>
-              <a:buChar char="•"/>
-            </a:pPr>
-            <a:endParaRPr lang="en-US" dirty="0" smtClean="0"/>
-          </a:p>
-          <a:p>
-            <a:pPr marL="342900" indent="-342900">
-              <a:buFont typeface="Arial"/>
-              <a:buChar char="•"/>
-            </a:pPr>
-            <a:r>
-              <a:rPr lang="en-US" dirty="0" smtClean="0"/>
-              <a:t>S</a:t>
-            </a:r>
-            <a:r>
-              <a:rPr lang="en-US" dirty="0" smtClean="0"/>
-              <a:t>napshot:</a:t>
-            </a:r>
-            <a:br>
-              <a:rPr lang="en-US" dirty="0" smtClean="0"/>
-            </a:br>
-            <a:r>
-              <a:rPr lang="en-US" dirty="0" smtClean="0"/>
-              <a:t>one state of the repository,</a:t>
-            </a:r>
-            <a:br>
-              <a:rPr lang="en-US" dirty="0" smtClean="0"/>
-            </a:br>
-            <a:r>
-              <a:rPr lang="en-US" dirty="0" smtClean="0"/>
-              <a:t>	 </a:t>
-            </a:r>
-            <a:r>
-              <a:rPr lang="en-US" i="1" dirty="0" smtClean="0"/>
-              <a:t>i.e. my paper on March 12, 2012, 8:26 PM)</a:t>
-            </a:r>
-            <a:endParaRPr lang="en-US" dirty="0" smtClean="0"/>
-          </a:p>
-          <a:p>
-            <a:pPr marL="342900" indent="-342900">
-              <a:buFont typeface="Arial"/>
-              <a:buChar char="•"/>
-            </a:pPr>
-            <a:endParaRPr lang="en-US" dirty="0" smtClean="0"/>
-          </a:p>
-          <a:p>
-            <a:pPr marL="342900" indent="-342900">
-              <a:buFont typeface="Arial"/>
-              <a:buChar char="•"/>
-            </a:pPr>
-            <a:r>
-              <a:rPr lang="en-US" dirty="0" smtClean="0"/>
-              <a:t>Commit:</a:t>
-            </a:r>
-            <a:br>
-              <a:rPr lang="en-US" dirty="0" smtClean="0"/>
-            </a:br>
-            <a:r>
-              <a:rPr lang="en-US" dirty="0" smtClean="0"/>
-              <a:t>An instruction to the VCS that the repository has changed, as detailed by a </a:t>
-            </a:r>
-            <a:r>
-              <a:rPr lang="en-US" dirty="0" err="1" smtClean="0"/>
-              <a:t>changeset</a:t>
-            </a:r>
-            <a:r>
-              <a:rPr lang="en-US" dirty="0" smtClean="0"/>
-              <a:t> or snapshot</a:t>
-            </a:r>
-          </a:p>
-          <a:p>
-            <a:pPr marL="342900" indent="-342900">
-              <a:buFont typeface="Arial"/>
-              <a:buChar char="•"/>
-            </a:pPr>
-            <a:endParaRPr lang="en-US" i="1" dirty="0" smtClean="0"/>
-          </a:p>
-          <a:p>
-            <a:pPr marL="342900" indent="-342900"/>
-            <a:r>
-              <a:rPr lang="en-US" i="1" dirty="0" smtClean="0"/>
-              <a:t>	</a:t>
-            </a:r>
-            <a:r>
-              <a:rPr lang="en-US" dirty="0" smtClean="0"/>
-              <a:t>(</a:t>
-            </a:r>
-            <a:r>
-              <a:rPr lang="en-US" dirty="0" err="1" smtClean="0"/>
-              <a:t>Changeset</a:t>
-            </a:r>
-            <a:r>
-              <a:rPr lang="en-US" dirty="0" smtClean="0"/>
-              <a:t>/Snapshot/Commit are used somewhat synonymous)</a:t>
-            </a:r>
-          </a:p>
-          <a:p>
-            <a:pPr marL="342900" indent="-342900">
-              <a:buFont typeface="Arial"/>
-              <a:buChar char="•"/>
-            </a:pPr>
-            <a:endParaRPr lang="en-US" dirty="0" smtClean="0"/>
-          </a:p>
-          <a:p>
-            <a:pPr marL="342900" indent="-342900">
-              <a:buFont typeface="Arial"/>
-              <a:buChar char="•"/>
-            </a:pPr>
-            <a:r>
-              <a:rPr lang="en-US" dirty="0"/>
-              <a:t>W</a:t>
-            </a:r>
-            <a:r>
-              <a:rPr lang="en-US" dirty="0" smtClean="0"/>
-              <a:t>orking directory: </a:t>
-            </a:r>
-            <a:br>
-              <a:rPr lang="en-US" dirty="0" smtClean="0"/>
-            </a:br>
-            <a:r>
-              <a:rPr lang="en-US" dirty="0" smtClean="0"/>
-              <a:t>top-level directory of the repository, abbreviated as </a:t>
-            </a:r>
-            <a:r>
-              <a:rPr lang="en-US" dirty="0" err="1" smtClean="0"/>
-              <a:t>workdir</a:t>
-            </a:r>
-            <a:endParaRPr lang="en-US" dirty="0" smtClean="0"/>
+            <a:r>
+              <a:rPr lang="en-US" dirty="0" smtClean="0"/>
+              <a:t>Merging 2</a:t>
+            </a:r>
           </a:p>
         </p:txBody>
       </p:sp>
     </p:spTree>
+    <p:extLst>
+      <p:ext uri="{BB962C8B-B14F-4D97-AF65-F5344CB8AC3E}">
+        <p14:creationId xmlns:p14="http://schemas.microsoft.com/office/powerpoint/2010/main" val="3388594987"/>
+      </p:ext>
+    </p:extLst>
   </p:cSld>
   <p:clrMapOvr>
     <a:masterClrMapping/>
   </p:clrMapOvr>
+  <p:transition xmlns:p14="http://schemas.microsoft.com/office/powerpoint/2010/main"/>
 </p:sld>
 </file>
 
-<file path=ppt/slides/slide3.xml><?xml version="1.0" encoding="utf-8"?>
-<p:sld xmlns:a="http://schemas.openxmlformats.org/drawingml/2006/main" xmlns:r="http://schemas.openxmlformats.org/officeDocument/2006/relationships" xmlns:mc="http://schemas.openxmlformats.org/markup-compatibility/2006" xmlns:mv="urn:schemas-microsoft-com:mac:vml" xmlns:p="http://schemas.openxmlformats.org/presentationml/2006/main" mc:Ignorable="mv" mc:PreserveAttributes="mv:*">
+<file path=ppt/slides/slide11.xml><?xml version="1.0" encoding="utf-8"?>
+<p:sld xmlns:a="http://schemas.openxmlformats.org/drawingml/2006/main" xmlns:r="http://schemas.openxmlformats.org/officeDocument/2006/relationships" xmlns:p="http://schemas.openxmlformats.org/presentationml/2006/main">
   <p:cSld>
     <p:spTree>
       <p:nvGrpSpPr>
@@ -3510,8 +3301,8 @@
         </p:nvSpPr>
         <p:spPr>
           <a:xfrm>
-            <a:off x="1880248" y="233588"/>
-            <a:ext cx="6250996" cy="646331"/>
+            <a:off x="581000" y="932188"/>
+            <a:ext cx="5593818" cy="369332"/>
           </a:xfrm>
           <a:prstGeom prst="rect">
             <a:avLst/>
@@ -3526,185 +3317,27 @@
           <a:p>
             <a:r>
               <a:rPr lang="en-US" dirty="0" smtClean="0"/>
-              <a:t>How do VCS work?  -  1. </a:t>
-            </a:r>
-            <a:r>
-              <a:rPr lang="en-US" dirty="0" smtClean="0"/>
-              <a:t>Tracking and logging modifications</a:t>
-            </a:r>
-          </a:p>
-          <a:p>
-            <a:endParaRPr lang="en-US" dirty="0" smtClean="0"/>
-          </a:p>
-        </p:txBody>
-      </p:sp>
-      <p:sp>
-        <p:nvSpPr>
-          <p:cNvPr id="3" name="TextBox 2"/>
-          <p:cNvSpPr txBox="1"/>
-          <p:nvPr/>
-        </p:nvSpPr>
-        <p:spPr>
-          <a:xfrm>
-            <a:off x="218974" y="1065746"/>
-            <a:ext cx="8685979" cy="4801315"/>
-          </a:xfrm>
-          <a:prstGeom prst="rect">
-            <a:avLst/>
-          </a:prstGeom>
-          <a:noFill/>
-        </p:spPr>
-        <p:txBody>
-          <a:bodyPr wrap="square" rtlCol="0">
-            <a:spAutoFit/>
-          </a:bodyPr>
-          <a:lstStyle/>
-          <a:p>
-            <a:pPr>
-              <a:buFont typeface="Arial"/>
-              <a:buChar char="•"/>
-            </a:pPr>
-            <a:r>
-              <a:rPr lang="en-US" dirty="0" smtClean="0"/>
-              <a:t>When ‘initializing’ a repository, the VCS creates a folder (the VCS database, often hidden) in the </a:t>
-            </a:r>
-            <a:r>
-              <a:rPr lang="en-US" dirty="0" err="1" smtClean="0"/>
-              <a:t>workdir</a:t>
-            </a:r>
-            <a:r>
-              <a:rPr lang="en-US" dirty="0" smtClean="0"/>
-              <a:t> and copies all initial files to it</a:t>
-            </a:r>
-          </a:p>
-          <a:p>
-            <a:pPr>
-              <a:buFont typeface="Arial"/>
-              <a:buChar char="•"/>
-            </a:pPr>
-            <a:endParaRPr lang="en-US" dirty="0" smtClean="0"/>
-          </a:p>
-          <a:p>
-            <a:pPr>
-              <a:buFont typeface="Arial"/>
-              <a:buChar char="•"/>
-            </a:pPr>
-            <a:endParaRPr lang="en-US" dirty="0" smtClean="0"/>
-          </a:p>
-          <a:p>
-            <a:pPr>
-              <a:buFont typeface="Arial"/>
-              <a:buChar char="•"/>
-            </a:pPr>
-            <a:endParaRPr lang="en-US" dirty="0"/>
-          </a:p>
-          <a:p>
-            <a:pPr>
-              <a:buFont typeface="Arial"/>
-              <a:buChar char="•"/>
-            </a:pPr>
-            <a:endParaRPr lang="en-US" dirty="0" smtClean="0"/>
-          </a:p>
-          <a:p>
-            <a:pPr>
-              <a:buFont typeface="Arial"/>
-              <a:buChar char="•"/>
-            </a:pPr>
-            <a:endParaRPr lang="en-US" dirty="0" smtClean="0"/>
-          </a:p>
-          <a:p>
-            <a:pPr>
-              <a:buFont typeface="Arial"/>
-              <a:buChar char="•"/>
-            </a:pPr>
-            <a:r>
-              <a:rPr lang="en-US" dirty="0" smtClean="0"/>
-              <a:t>User makes changes and tells VCS about them (‘committing’)</a:t>
-            </a:r>
-          </a:p>
-          <a:p>
-            <a:pPr>
-              <a:buFont typeface="Arial"/>
-              <a:buChar char="•"/>
-            </a:pPr>
-            <a:endParaRPr lang="en-US" dirty="0" smtClean="0"/>
-          </a:p>
-          <a:p>
-            <a:pPr>
-              <a:buFont typeface="Arial"/>
-              <a:buChar char="•"/>
-            </a:pPr>
-            <a:r>
-              <a:rPr lang="en-US" dirty="0" smtClean="0"/>
-              <a:t>VCS copies changed files from </a:t>
-            </a:r>
-            <a:r>
-              <a:rPr lang="en-US" dirty="0" err="1" smtClean="0"/>
-              <a:t>workdir</a:t>
-            </a:r>
-            <a:r>
-              <a:rPr lang="en-US" dirty="0" smtClean="0"/>
-              <a:t> to  database (either as ‘</a:t>
-            </a:r>
-            <a:r>
-              <a:rPr lang="en-US" dirty="0" err="1" smtClean="0"/>
-              <a:t>diffs’/changeset</a:t>
-            </a:r>
-            <a:r>
-              <a:rPr lang="en-US" dirty="0" smtClean="0"/>
-              <a:t> or as complete files/snapshot ) and assigns a unique identifier/version number to them</a:t>
-            </a:r>
-          </a:p>
-          <a:p>
-            <a:pPr>
-              <a:buFont typeface="Arial"/>
-              <a:buChar char="•"/>
-            </a:pPr>
-            <a:endParaRPr lang="en-US" dirty="0" smtClean="0"/>
-          </a:p>
-          <a:p>
-            <a:pPr>
-              <a:buFont typeface="Arial"/>
-              <a:buChar char="•"/>
-            </a:pPr>
-            <a:r>
-              <a:rPr lang="en-US" dirty="0" smtClean="0"/>
-              <a:t>And so on..</a:t>
-            </a:r>
-          </a:p>
-          <a:p>
-            <a:endParaRPr lang="en-US" dirty="0" smtClean="0"/>
-          </a:p>
-          <a:p>
-            <a:endParaRPr lang="en-US" dirty="0" smtClean="0"/>
-          </a:p>
-          <a:p>
-            <a:pPr>
-              <a:buFont typeface="Arial"/>
-              <a:buChar char="•"/>
-            </a:pPr>
-            <a:endParaRPr lang="en-US" dirty="0" smtClean="0"/>
-          </a:p>
-          <a:p>
-            <a:pPr>
-              <a:buFont typeface="Arial"/>
-              <a:buChar char="•"/>
-            </a:pPr>
-            <a:endParaRPr lang="en-US" dirty="0" smtClean="0"/>
+              <a:t>Merging 3</a:t>
+            </a:r>
           </a:p>
         </p:txBody>
       </p:sp>
     </p:spTree>
+    <p:extLst>
+      <p:ext uri="{BB962C8B-B14F-4D97-AF65-F5344CB8AC3E}">
+        <p14:creationId xmlns:p14="http://schemas.microsoft.com/office/powerpoint/2010/main" val="1708097681"/>
+      </p:ext>
+    </p:extLst>
   </p:cSld>
   <p:clrMapOvr>
     <a:masterClrMapping/>
   </p:clrMapOvr>
-  <p:transition/>
+  <p:transition xmlns:p14="http://schemas.microsoft.com/office/powerpoint/2010/main"/>
 </p:sld>
 </file>
 
-<file path=ppt/slides/slide4.xml><?xml version="1.0" encoding="utf-8"?>
-<p:sld xmlns:a="http://schemas.openxmlformats.org/drawingml/2006/main" xmlns:r="http://schemas.openxmlformats.org/officeDocument/2006/relationships" xmlns:mc="http://schemas.openxmlformats.org/markup-compatibility/2006" xmlns:mv="urn:schemas-microsoft-com:mac:vml" xmlns:p="http://schemas.openxmlformats.org/presentationml/2006/main" mc:Ignorable="mv" mc:PreserveAttributes="mv:*">
+<file path=ppt/slides/slide12.xml><?xml version="1.0" encoding="utf-8"?>
+<p:sld xmlns:a="http://schemas.openxmlformats.org/drawingml/2006/main" xmlns:r="http://schemas.openxmlformats.org/officeDocument/2006/relationships" xmlns:p="http://schemas.openxmlformats.org/presentationml/2006/main">
   <p:cSld>
     <p:spTree>
       <p:nvGrpSpPr>
@@ -3722,14 +3355,14 @@
       </p:grpSpPr>
       <p:sp>
         <p:nvSpPr>
-          <p:cNvPr id="3" name="TextBox 2"/>
+          <p:cNvPr id="4" name="TextBox 3"/>
           <p:cNvSpPr txBox="1"/>
           <p:nvPr/>
         </p:nvSpPr>
         <p:spPr>
           <a:xfrm>
-            <a:off x="1340112" y="233588"/>
-            <a:ext cx="6250996" cy="369332"/>
+            <a:off x="581000" y="932188"/>
+            <a:ext cx="5593818" cy="369332"/>
           </a:xfrm>
           <a:prstGeom prst="rect">
             <a:avLst/>
@@ -3744,157 +3377,27 @@
           <a:p>
             <a:r>
               <a:rPr lang="en-US" dirty="0" smtClean="0"/>
-              <a:t>How do VCS work?  -  1. </a:t>
-            </a:r>
-            <a:r>
-              <a:rPr lang="en-US" dirty="0" smtClean="0"/>
-              <a:t>Tracking and logging modifications</a:t>
-            </a:r>
-          </a:p>
-        </p:txBody>
-      </p:sp>
-      <p:sp>
-        <p:nvSpPr>
-          <p:cNvPr id="6" name="Rectangle 5"/>
-          <p:cNvSpPr/>
-          <p:nvPr/>
-        </p:nvSpPr>
-        <p:spPr>
-          <a:xfrm>
-            <a:off x="350358" y="1767006"/>
-            <a:ext cx="8072851" cy="2308324"/>
-          </a:xfrm>
-          <a:prstGeom prst="rect">
-            <a:avLst/>
-          </a:prstGeom>
-        </p:spPr>
-        <p:txBody>
-          <a:bodyPr wrap="square">
-            <a:spAutoFit/>
-          </a:bodyPr>
-          <a:lstStyle/>
-          <a:p>
-            <a:pPr>
-              <a:buFont typeface="Arial"/>
-              <a:buChar char="•"/>
-            </a:pPr>
-            <a:r>
-              <a:rPr lang="en-US" dirty="0" smtClean="0"/>
-              <a:t>The VCS can now restore the repository to any of the </a:t>
-            </a:r>
-            <a:r>
-              <a:rPr lang="en-US" dirty="0" err="1" smtClean="0"/>
-              <a:t>commited</a:t>
-            </a:r>
-            <a:r>
-              <a:rPr lang="en-US" dirty="0" smtClean="0"/>
-              <a:t> versions</a:t>
-            </a:r>
-            <a:br>
-              <a:rPr lang="en-US" dirty="0" smtClean="0"/>
-            </a:br>
-            <a:r>
-              <a:rPr lang="en-US" dirty="0" smtClean="0"/>
-              <a:t>	(by copying the database entry belonging to the version number to the </a:t>
-            </a:r>
-            <a:r>
-              <a:rPr lang="en-US" dirty="0" err="1" smtClean="0"/>
-              <a:t>workdir</a:t>
-            </a:r>
-            <a:r>
-              <a:rPr lang="en-US" dirty="0" smtClean="0"/>
-              <a:t>) </a:t>
-            </a:r>
-          </a:p>
-          <a:p>
-            <a:pPr>
-              <a:buFont typeface="Arial"/>
-              <a:buChar char="•"/>
-            </a:pPr>
-            <a:endParaRPr lang="en-US" dirty="0" smtClean="0"/>
-          </a:p>
-          <a:p>
-            <a:pPr>
-              <a:buFont typeface="Arial"/>
-              <a:buChar char="•"/>
-            </a:pPr>
-            <a:endParaRPr lang="en-US" dirty="0" smtClean="0"/>
-          </a:p>
-          <a:p>
-            <a:pPr>
-              <a:buFont typeface="Arial"/>
-              <a:buChar char="•"/>
-            </a:pPr>
-            <a:endParaRPr lang="en-US" dirty="0" smtClean="0"/>
-          </a:p>
-          <a:p>
-            <a:pPr>
-              <a:buFont typeface="Arial"/>
-              <a:buChar char="•"/>
-            </a:pPr>
-            <a:endParaRPr lang="en-US" dirty="0" smtClean="0"/>
-          </a:p>
-          <a:p>
-            <a:pPr>
-              <a:buFont typeface="Arial"/>
-              <a:buChar char="•"/>
-            </a:pPr>
-            <a:r>
-              <a:rPr lang="en-US" dirty="0" smtClean="0"/>
-              <a:t>The VCS can also report differences between any two arbitrary version numbers</a:t>
-            </a:r>
-            <a:br>
-              <a:rPr lang="en-US" dirty="0" smtClean="0"/>
-            </a:br>
-            <a:r>
-              <a:rPr lang="en-US" dirty="0" smtClean="0"/>
-              <a:t>	(by running a ‘diff’ between the two corresponding database entries)</a:t>
-            </a:r>
-            <a:endParaRPr lang="en-US" dirty="0" smtClean="0"/>
-          </a:p>
-        </p:txBody>
-      </p:sp>
-      <p:sp>
-        <p:nvSpPr>
-          <p:cNvPr id="7" name="TextBox 6"/>
-          <p:cNvSpPr txBox="1"/>
-          <p:nvPr/>
-        </p:nvSpPr>
-        <p:spPr>
-          <a:xfrm>
-            <a:off x="350358" y="5927297"/>
-            <a:ext cx="8072851" cy="369332"/>
-          </a:xfrm>
-          <a:prstGeom prst="rect">
-            <a:avLst/>
-          </a:prstGeom>
-          <a:noFill/>
-        </p:spPr>
-        <p:txBody>
-          <a:bodyPr wrap="square" rtlCol="0">
-            <a:spAutoFit/>
-          </a:bodyPr>
-          <a:lstStyle/>
-          <a:p>
-            <a:r>
-              <a:rPr lang="en-US" dirty="0" smtClean="0"/>
-              <a:t>That’s everything for use case 1 (Tracking and logging modifications)….   Pretty simple  </a:t>
-            </a:r>
-            <a:endParaRPr lang="en-US" dirty="0"/>
+              <a:t>Recommended workflow 1</a:t>
+            </a:r>
           </a:p>
         </p:txBody>
       </p:sp>
     </p:spTree>
+    <p:extLst>
+      <p:ext uri="{BB962C8B-B14F-4D97-AF65-F5344CB8AC3E}">
+        <p14:creationId xmlns:p14="http://schemas.microsoft.com/office/powerpoint/2010/main" val="1703534084"/>
+      </p:ext>
+    </p:extLst>
   </p:cSld>
   <p:clrMapOvr>
     <a:masterClrMapping/>
   </p:clrMapOvr>
-  <p:transition/>
+  <p:transition xmlns:p14="http://schemas.microsoft.com/office/powerpoint/2010/main"/>
 </p:sld>
 </file>
 
-<file path=ppt/slides/slide5.xml><?xml version="1.0" encoding="utf-8"?>
-<p:sld xmlns:a="http://schemas.openxmlformats.org/drawingml/2006/main" xmlns:r="http://schemas.openxmlformats.org/officeDocument/2006/relationships" xmlns:mc="http://schemas.openxmlformats.org/markup-compatibility/2006" xmlns:mv="urn:schemas-microsoft-com:mac:vml" xmlns:p="http://schemas.openxmlformats.org/presentationml/2006/main" mc:Ignorable="mv" mc:PreserveAttributes="mv:*">
+<file path=ppt/slides/slide2.xml><?xml version="1.0" encoding="utf-8"?>
+<p:sld xmlns:a="http://schemas.openxmlformats.org/drawingml/2006/main" xmlns:r="http://schemas.openxmlformats.org/officeDocument/2006/relationships" xmlns:p="http://schemas.openxmlformats.org/presentationml/2006/main">
   <p:cSld>
     <p:spTree>
       <p:nvGrpSpPr>
@@ -3912,14 +3415,14 @@
       </p:grpSpPr>
       <p:sp>
         <p:nvSpPr>
-          <p:cNvPr id="3" name="TextBox 2"/>
+          <p:cNvPr id="4" name="TextBox 3"/>
           <p:cNvSpPr txBox="1"/>
           <p:nvPr/>
         </p:nvSpPr>
         <p:spPr>
           <a:xfrm>
-            <a:off x="1340112" y="0"/>
-            <a:ext cx="6250996" cy="646331"/>
+            <a:off x="715316" y="0"/>
+            <a:ext cx="7474322" cy="6463309"/>
           </a:xfrm>
           <a:prstGeom prst="rect">
             <a:avLst/>
@@ -3932,180 +3435,214 @@
           </a:bodyPr>
           <a:lstStyle/>
           <a:p>
-            <a:r>
-              <a:rPr lang="en-US" dirty="0" smtClean="0"/>
-              <a:t>How do VCS work?  -  2. </a:t>
-            </a:r>
-            <a:r>
-              <a:rPr lang="en-US" dirty="0" smtClean="0"/>
-              <a:t>Backup of a complete project history</a:t>
-            </a:r>
-          </a:p>
-          <a:p>
+            <a:pPr marL="342900" indent="-342900"/>
+            <a:r>
+              <a:rPr lang="en-US" dirty="0" smtClean="0"/>
+              <a:t>Important terms</a:t>
+            </a:r>
+          </a:p>
+          <a:p>
+            <a:pPr marL="342900" indent="-342900"/>
             <a:endParaRPr lang="en-US" dirty="0" smtClean="0"/>
           </a:p>
-        </p:txBody>
-      </p:sp>
-      <p:sp>
-        <p:nvSpPr>
-          <p:cNvPr id="4" name="TextBox 3"/>
-          <p:cNvSpPr txBox="1"/>
-          <p:nvPr/>
-        </p:nvSpPr>
-        <p:spPr>
-          <a:xfrm>
-            <a:off x="248170" y="646331"/>
-            <a:ext cx="8895829" cy="923330"/>
-          </a:xfrm>
-          <a:prstGeom prst="rect">
-            <a:avLst/>
-          </a:prstGeom>
-          <a:noFill/>
-        </p:spPr>
-        <p:txBody>
-          <a:bodyPr wrap="square" rtlCol="0">
-            <a:spAutoFit/>
-          </a:bodyPr>
-          <a:lstStyle/>
-          <a:p>
-            <a:pPr>
+          <a:p>
+            <a:pPr marL="342900" indent="-342900">
               <a:buFont typeface="Arial"/>
               <a:buChar char="•"/>
             </a:pPr>
             <a:r>
               <a:rPr lang="en-US" dirty="0" smtClean="0"/>
-              <a:t>Backup: usually means copying files to a different hard drive or server</a:t>
-            </a:r>
-          </a:p>
-          <a:p>
-            <a:pPr>
+              <a:t>Repository: </a:t>
+            </a:r>
+            <a:br>
+              <a:rPr lang="en-US" dirty="0" smtClean="0"/>
+            </a:br>
+            <a:r>
+              <a:rPr lang="en-US" dirty="0" smtClean="0"/>
+              <a:t>a set of files that the VCS knows about (may be in different folders),</a:t>
+            </a:r>
+            <a:br>
+              <a:rPr lang="en-US" dirty="0" smtClean="0"/>
+            </a:br>
+            <a:r>
+              <a:rPr lang="en-US" dirty="0" smtClean="0"/>
+              <a:t>	</a:t>
+            </a:r>
+            <a:r>
+              <a:rPr lang="en-US" i="1" dirty="0" smtClean="0"/>
+              <a:t>i.e. paper manuscript and graphics files</a:t>
+            </a:r>
+          </a:p>
+          <a:p>
+            <a:pPr marL="342900" indent="-342900"/>
+            <a:endParaRPr lang="en-US" dirty="0" smtClean="0"/>
+          </a:p>
+          <a:p>
+            <a:pPr marL="342900" indent="-342900">
+              <a:buFont typeface="Arial"/>
+              <a:buChar char="•"/>
+            </a:pPr>
+            <a:r>
+              <a:rPr lang="en-US" dirty="0" err="1" smtClean="0"/>
+              <a:t>Changeset</a:t>
+            </a:r>
+            <a:r>
+              <a:rPr lang="en-US" dirty="0" smtClean="0"/>
+              <a:t>: </a:t>
+            </a:r>
+            <a:br>
+              <a:rPr lang="en-US" dirty="0" smtClean="0"/>
+            </a:br>
+            <a:r>
+              <a:rPr lang="en-US" dirty="0" smtClean="0"/>
+              <a:t>a set of modifications or ‘</a:t>
+            </a:r>
+            <a:r>
+              <a:rPr lang="en-US" dirty="0" err="1" smtClean="0"/>
+              <a:t>diffs</a:t>
+            </a:r>
+            <a:r>
+              <a:rPr lang="en-US" dirty="0" smtClean="0"/>
+              <a:t>’ to the repository (changes to files, adding/deleting files/folders),</a:t>
+            </a:r>
+            <a:br>
+              <a:rPr lang="en-US" dirty="0" smtClean="0"/>
+            </a:br>
+            <a:r>
+              <a:rPr lang="en-US" dirty="0" smtClean="0"/>
+              <a:t>	 </a:t>
+            </a:r>
+            <a:r>
+              <a:rPr lang="en-US" i="1" dirty="0" smtClean="0"/>
+              <a:t>i.e. adding a paragraph to the manuscript and replacing a 	graphics files</a:t>
+            </a:r>
+          </a:p>
+          <a:p>
+            <a:pPr marL="342900" indent="-342900">
               <a:buFont typeface="Arial"/>
               <a:buChar char="•"/>
             </a:pPr>
             <a:endParaRPr lang="en-US" dirty="0" smtClean="0"/>
           </a:p>
           <a:p>
-            <a:pPr>
+            <a:pPr marL="342900" indent="-342900">
               <a:buFont typeface="Arial"/>
               <a:buChar char="•"/>
             </a:pPr>
             <a:r>
               <a:rPr lang="en-US" dirty="0" smtClean="0"/>
-              <a:t>Backup using VCS: the complete </a:t>
+              <a:t>Snapshot:</a:t>
+            </a:r>
+            <a:br>
+              <a:rPr lang="en-US" dirty="0" smtClean="0"/>
+            </a:br>
+            <a:r>
+              <a:rPr lang="en-US" dirty="0" smtClean="0"/>
+              <a:t>one state of the repository,</a:t>
+            </a:r>
+            <a:br>
+              <a:rPr lang="en-US" dirty="0" smtClean="0"/>
+            </a:br>
+            <a:r>
+              <a:rPr lang="en-US" dirty="0" smtClean="0"/>
+              <a:t>	 </a:t>
+            </a:r>
+            <a:r>
+              <a:rPr lang="en-US" i="1" dirty="0" smtClean="0"/>
+              <a:t>i.e. my paper on March 12, 2012, 8:26 PM)</a:t>
+            </a:r>
+            <a:endParaRPr lang="en-US" dirty="0" smtClean="0"/>
+          </a:p>
+          <a:p>
+            <a:pPr marL="342900" indent="-342900">
+              <a:buFont typeface="Arial"/>
+              <a:buChar char="•"/>
+            </a:pPr>
+            <a:endParaRPr lang="en-US" dirty="0" smtClean="0"/>
+          </a:p>
+          <a:p>
+            <a:pPr marL="342900" indent="-342900">
+              <a:buFont typeface="Arial"/>
+              <a:buChar char="•"/>
+            </a:pPr>
+            <a:r>
+              <a:rPr lang="en-US" dirty="0" smtClean="0"/>
+              <a:t>Commit:</a:t>
+            </a:r>
+            <a:br>
+              <a:rPr lang="en-US" dirty="0" smtClean="0"/>
+            </a:br>
+            <a:r>
+              <a:rPr lang="en-US" dirty="0" smtClean="0"/>
+              <a:t>An instruction to the VCS that the repository has changed, as detailed by a </a:t>
+            </a:r>
+            <a:r>
+              <a:rPr lang="en-US" dirty="0" err="1" smtClean="0"/>
+              <a:t>changeset</a:t>
+            </a:r>
+            <a:r>
+              <a:rPr lang="en-US" dirty="0" smtClean="0"/>
+              <a:t> or snapshot</a:t>
+            </a:r>
+          </a:p>
+          <a:p>
+            <a:pPr marL="342900" indent="-342900">
+              <a:buFont typeface="Arial"/>
+              <a:buChar char="•"/>
+            </a:pPr>
+            <a:endParaRPr lang="en-US" i="1" dirty="0" smtClean="0"/>
+          </a:p>
+          <a:p>
+            <a:pPr marL="342900" indent="-342900"/>
+            <a:r>
+              <a:rPr lang="en-US" i="1" dirty="0" smtClean="0"/>
+              <a:t>	</a:t>
+            </a:r>
+            <a:r>
+              <a:rPr lang="en-US" dirty="0" smtClean="0"/>
+              <a:t>(</a:t>
+            </a:r>
+            <a:r>
+              <a:rPr lang="en-US" dirty="0" err="1" smtClean="0"/>
+              <a:t>Changeset</a:t>
+            </a:r>
+            <a:r>
+              <a:rPr lang="en-US" dirty="0" smtClean="0"/>
+              <a:t>/Snapshot/Commit are used somewhat synonymous)</a:t>
+            </a:r>
+          </a:p>
+          <a:p>
+            <a:pPr marL="342900" indent="-342900">
+              <a:buFont typeface="Arial"/>
+              <a:buChar char="•"/>
+            </a:pPr>
+            <a:endParaRPr lang="en-US" dirty="0" smtClean="0"/>
+          </a:p>
+          <a:p>
+            <a:pPr marL="342900" indent="-342900">
+              <a:buFont typeface="Arial"/>
+              <a:buChar char="•"/>
+            </a:pPr>
+            <a:r>
+              <a:rPr lang="en-US" dirty="0"/>
+              <a:t>W</a:t>
+            </a:r>
+            <a:r>
+              <a:rPr lang="en-US" dirty="0" smtClean="0"/>
+              <a:t>orking directory: </a:t>
+            </a:r>
+            <a:br>
+              <a:rPr lang="en-US" dirty="0" smtClean="0"/>
+            </a:br>
+            <a:r>
+              <a:rPr lang="en-US" dirty="0" smtClean="0"/>
+              <a:t>top-level directory of the repository, abbreviated as </a:t>
             </a:r>
             <a:r>
               <a:rPr lang="en-US" dirty="0" err="1" smtClean="0"/>
               <a:t>workdir</a:t>
             </a:r>
-            <a:r>
-              <a:rPr lang="en-US" dirty="0" smtClean="0"/>
-              <a:t> (current files + VCS database) is copied to a server</a:t>
-            </a:r>
-            <a:endParaRPr lang="en-US" dirty="0"/>
-          </a:p>
-        </p:txBody>
-      </p:sp>
-      <p:sp>
-        <p:nvSpPr>
-          <p:cNvPr id="6" name="TextBox 5"/>
-          <p:cNvSpPr txBox="1"/>
-          <p:nvPr/>
-        </p:nvSpPr>
-        <p:spPr>
-          <a:xfrm>
-            <a:off x="248170" y="3868803"/>
-            <a:ext cx="8612988" cy="1754327"/>
-          </a:xfrm>
-          <a:prstGeom prst="rect">
-            <a:avLst/>
-          </a:prstGeom>
-          <a:noFill/>
-        </p:spPr>
-        <p:txBody>
-          <a:bodyPr wrap="square" rtlCol="0">
-            <a:spAutoFit/>
-          </a:bodyPr>
-          <a:lstStyle/>
-          <a:p>
-            <a:r>
-              <a:rPr lang="en-US" dirty="0" smtClean="0"/>
-              <a:t>Slight complication: commits to </a:t>
-            </a:r>
-            <a:r>
-              <a:rPr lang="en-US" dirty="0" err="1" smtClean="0"/>
-              <a:t>workdir</a:t>
-            </a:r>
-            <a:r>
-              <a:rPr lang="en-US" dirty="0" smtClean="0"/>
-              <a:t> and backup to server are not necessarily synced</a:t>
-            </a:r>
-          </a:p>
-          <a:p>
             <a:endParaRPr lang="en-US" dirty="0" smtClean="0"/>
-          </a:p>
-          <a:p>
-            <a:r>
-              <a:rPr lang="en-US" dirty="0" smtClean="0"/>
-              <a:t>-&gt; Every time a backup is made:</a:t>
-            </a:r>
-          </a:p>
-          <a:p>
-            <a:pPr marL="342900" indent="342900">
-              <a:buFont typeface="+mj-lt"/>
-              <a:buAutoNum type="arabicPeriod"/>
-            </a:pPr>
-            <a:r>
-              <a:rPr lang="en-US" dirty="0" smtClean="0"/>
-              <a:t>The VCS determines which version numbers exist in the </a:t>
-            </a:r>
-            <a:r>
-              <a:rPr lang="en-US" dirty="0" err="1" smtClean="0"/>
-              <a:t>workdir</a:t>
-            </a:r>
-            <a:r>
-              <a:rPr lang="en-US" dirty="0" smtClean="0"/>
-              <a:t> but not on the server</a:t>
-            </a:r>
-          </a:p>
-          <a:p>
-            <a:pPr marL="342900" indent="342900">
-              <a:buFont typeface="+mj-lt"/>
-              <a:buAutoNum type="arabicPeriod"/>
-            </a:pPr>
-            <a:r>
-              <a:rPr lang="en-US" dirty="0" smtClean="0"/>
-              <a:t>Only the database entries belonging to these are copied to the server		</a:t>
-            </a:r>
-            <a:endParaRPr lang="en-US" dirty="0"/>
-          </a:p>
-        </p:txBody>
-      </p:sp>
-      <p:sp>
-        <p:nvSpPr>
-          <p:cNvPr id="7" name="Rectangle 6"/>
-          <p:cNvSpPr/>
-          <p:nvPr/>
-        </p:nvSpPr>
-        <p:spPr>
-          <a:xfrm>
-            <a:off x="493410" y="5888503"/>
-            <a:ext cx="8046585" cy="369332"/>
-          </a:xfrm>
-          <a:prstGeom prst="rect">
-            <a:avLst/>
-          </a:prstGeom>
-        </p:spPr>
-        <p:txBody>
-          <a:bodyPr wrap="square">
-            <a:spAutoFit/>
-          </a:bodyPr>
-          <a:lstStyle/>
-          <a:p>
-            <a:r>
-              <a:rPr lang="en-US" dirty="0" smtClean="0"/>
-              <a:t>That’s everything for use case 2 (Backing up)….   Pretty simple  </a:t>
-            </a:r>
-            <a:endParaRPr lang="en-US" dirty="0"/>
           </a:p>
         </p:txBody>
       </p:sp>
@@ -4114,12 +3651,11 @@
   <p:clrMapOvr>
     <a:masterClrMapping/>
   </p:clrMapOvr>
-  <p:transition/>
 </p:sld>
 </file>
 
-<file path=ppt/slides/slide6.xml><?xml version="1.0" encoding="utf-8"?>
-<p:sld xmlns:a="http://schemas.openxmlformats.org/drawingml/2006/main" xmlns:r="http://schemas.openxmlformats.org/officeDocument/2006/relationships" xmlns:mc="http://schemas.openxmlformats.org/markup-compatibility/2006" xmlns:mv="urn:schemas-microsoft-com:mac:vml" xmlns:p="http://schemas.openxmlformats.org/presentationml/2006/main" mc:Ignorable="mv" mc:PreserveAttributes="mv:*">
+<file path=ppt/slides/slide3.xml><?xml version="1.0" encoding="utf-8"?>
+<p:sld xmlns:a="http://schemas.openxmlformats.org/drawingml/2006/main" xmlns:r="http://schemas.openxmlformats.org/officeDocument/2006/relationships" xmlns:p="http://schemas.openxmlformats.org/presentationml/2006/main">
   <p:cSld>
     <p:spTree>
       <p:nvGrpSpPr>
@@ -4137,14 +3673,14 @@
       </p:grpSpPr>
       <p:sp>
         <p:nvSpPr>
-          <p:cNvPr id="3" name="TextBox 2"/>
+          <p:cNvPr id="4" name="TextBox 3"/>
           <p:cNvSpPr txBox="1"/>
           <p:nvPr/>
         </p:nvSpPr>
         <p:spPr>
           <a:xfrm>
-            <a:off x="715315" y="0"/>
-            <a:ext cx="8087449" cy="646331"/>
+            <a:off x="1880248" y="233588"/>
+            <a:ext cx="6250996" cy="646331"/>
           </a:xfrm>
           <a:prstGeom prst="rect">
             <a:avLst/>
@@ -4159,37 +3695,24 @@
           <a:p>
             <a:r>
               <a:rPr lang="en-US" dirty="0" smtClean="0"/>
-              <a:t>How do VCS work?  -  3. </a:t>
-            </a:r>
-            <a:r>
-              <a:rPr lang="en-US" dirty="0" smtClean="0"/>
-              <a:t>Collaboration of 2-∞ people on the same project</a:t>
-            </a:r>
-          </a:p>
-          <a:p>
-            <a:pPr algn="ctr"/>
-            <a:r>
-              <a:rPr lang="en-US" sz="1400" dirty="0" smtClean="0"/>
-              <a:t>(and things get complicated…)</a:t>
-            </a:r>
-            <a:r>
-              <a:rPr lang="en-US" dirty="0" smtClean="0"/>
-              <a:t> </a:t>
-            </a:r>
+              <a:t>How do VCS work?  -  1. Tracking and logging modifications</a:t>
+            </a:r>
+          </a:p>
+          <a:p>
             <a:endParaRPr lang="en-US" dirty="0" smtClean="0"/>
           </a:p>
         </p:txBody>
       </p:sp>
       <p:sp>
         <p:nvSpPr>
-          <p:cNvPr id="5" name="TextBox 4"/>
+          <p:cNvPr id="3" name="TextBox 2"/>
           <p:cNvSpPr txBox="1"/>
           <p:nvPr/>
         </p:nvSpPr>
         <p:spPr>
           <a:xfrm>
-            <a:off x="335761" y="1328532"/>
-            <a:ext cx="8808239" cy="923330"/>
+            <a:off x="218974" y="1065746"/>
+            <a:ext cx="8685979" cy="4801315"/>
           </a:xfrm>
           <a:prstGeom prst="rect">
             <a:avLst/>
@@ -4208,7 +3731,15 @@
             </a:pPr>
             <a:r>
               <a:rPr lang="en-US" dirty="0" smtClean="0"/>
-              <a:t>The basic problem: no more linear project history</a:t>
+              <a:t>When ‘initializing’ a repository, the VCS creates a folder (the VCS database, often hidden) in the </a:t>
+            </a:r>
+            <a:r>
+              <a:rPr lang="en-US" dirty="0" err="1" smtClean="0"/>
+              <a:t>workdir</a:t>
+            </a:r>
+            <a:r>
+              <a:rPr lang="en-US" dirty="0" smtClean="0"/>
+              <a:t> and copies all initial files to it</a:t>
             </a:r>
           </a:p>
           <a:p>
@@ -4223,11 +3754,108 @@
               <a:buFont typeface="Arial"/>
               <a:buChar char="•"/>
             </a:pPr>
-            <a:r>
-              <a:rPr lang="en-US" dirty="0" smtClean="0"/>
-              <a:t>Let’s assume: 2 developers (Alice and Bob) work on a project backed up on the same server</a:t>
-            </a:r>
+            <a:endParaRPr lang="en-US" dirty="0" smtClean="0"/>
+          </a:p>
+          <a:p>
+            <a:pPr>
+              <a:buFont typeface="Arial"/>
+              <a:buChar char="•"/>
+            </a:pPr>
             <a:endParaRPr lang="en-US" dirty="0"/>
+          </a:p>
+          <a:p>
+            <a:pPr>
+              <a:buFont typeface="Arial"/>
+              <a:buChar char="•"/>
+            </a:pPr>
+            <a:endParaRPr lang="en-US" dirty="0" smtClean="0"/>
+          </a:p>
+          <a:p>
+            <a:pPr>
+              <a:buFont typeface="Arial"/>
+              <a:buChar char="•"/>
+            </a:pPr>
+            <a:endParaRPr lang="en-US" dirty="0" smtClean="0"/>
+          </a:p>
+          <a:p>
+            <a:pPr>
+              <a:buFont typeface="Arial"/>
+              <a:buChar char="•"/>
+            </a:pPr>
+            <a:r>
+              <a:rPr lang="en-US" dirty="0" smtClean="0"/>
+              <a:t>User makes changes and tells VCS about them (‘committing’)</a:t>
+            </a:r>
+          </a:p>
+          <a:p>
+            <a:pPr>
+              <a:buFont typeface="Arial"/>
+              <a:buChar char="•"/>
+            </a:pPr>
+            <a:endParaRPr lang="en-US" dirty="0" smtClean="0"/>
+          </a:p>
+          <a:p>
+            <a:pPr>
+              <a:buFont typeface="Arial"/>
+              <a:buChar char="•"/>
+            </a:pPr>
+            <a:r>
+              <a:rPr lang="en-US" dirty="0" smtClean="0"/>
+              <a:t>VCS copies changed files from </a:t>
+            </a:r>
+            <a:r>
+              <a:rPr lang="en-US" dirty="0" err="1" smtClean="0"/>
+              <a:t>workdir</a:t>
+            </a:r>
+            <a:r>
+              <a:rPr lang="en-US" dirty="0" smtClean="0"/>
+              <a:t> to  database (either as ‘</a:t>
+            </a:r>
+            <a:r>
+              <a:rPr lang="en-US" dirty="0" err="1" smtClean="0"/>
+              <a:t>diffs’/changeset</a:t>
+            </a:r>
+            <a:r>
+              <a:rPr lang="en-US" dirty="0" smtClean="0"/>
+              <a:t> or as complete files/snapshot ) and assigns a unique identifier/version number to them</a:t>
+            </a:r>
+          </a:p>
+          <a:p>
+            <a:pPr>
+              <a:buFont typeface="Arial"/>
+              <a:buChar char="•"/>
+            </a:pPr>
+            <a:endParaRPr lang="en-US" dirty="0" smtClean="0"/>
+          </a:p>
+          <a:p>
+            <a:pPr>
+              <a:buFont typeface="Arial"/>
+              <a:buChar char="•"/>
+            </a:pPr>
+            <a:r>
+              <a:rPr lang="en-US" dirty="0" smtClean="0"/>
+              <a:t>And so on..</a:t>
+            </a:r>
+          </a:p>
+          <a:p>
+            <a:endParaRPr lang="en-US" dirty="0" smtClean="0"/>
+          </a:p>
+          <a:p>
+            <a:endParaRPr lang="en-US" dirty="0" smtClean="0"/>
+          </a:p>
+          <a:p>
+            <a:pPr>
+              <a:buFont typeface="Arial"/>
+              <a:buChar char="•"/>
+            </a:pPr>
+            <a:endParaRPr lang="en-US" dirty="0" smtClean="0"/>
+          </a:p>
+          <a:p>
+            <a:pPr>
+              <a:buFont typeface="Arial"/>
+              <a:buChar char="•"/>
+            </a:pPr>
+            <a:endParaRPr lang="en-US" dirty="0" smtClean="0"/>
           </a:p>
         </p:txBody>
       </p:sp>
@@ -4236,12 +3864,12 @@
   <p:clrMapOvr>
     <a:masterClrMapping/>
   </p:clrMapOvr>
-  <p:transition/>
+  <p:transition xmlns:p14="http://schemas.microsoft.com/office/powerpoint/2010/main"/>
 </p:sld>
 </file>
 
-<file path=ppt/slides/slide7.xml><?xml version="1.0" encoding="utf-8"?>
-<p:sld xmlns:a="http://schemas.openxmlformats.org/drawingml/2006/main" xmlns:r="http://schemas.openxmlformats.org/officeDocument/2006/relationships" xmlns:mc="http://schemas.openxmlformats.org/markup-compatibility/2006" xmlns:mv="urn:schemas-microsoft-com:mac:vml" xmlns:p="http://schemas.openxmlformats.org/presentationml/2006/main" mc:Ignorable="mv" mc:PreserveAttributes="mv:*">
+<file path=ppt/slides/slide4.xml><?xml version="1.0" encoding="utf-8"?>
+<p:sld xmlns:a="http://schemas.openxmlformats.org/drawingml/2006/main" xmlns:r="http://schemas.openxmlformats.org/officeDocument/2006/relationships" xmlns:p="http://schemas.openxmlformats.org/presentationml/2006/main">
   <p:cSld>
     <p:spTree>
       <p:nvGrpSpPr>
@@ -4259,14 +3887,14 @@
       </p:grpSpPr>
       <p:sp>
         <p:nvSpPr>
-          <p:cNvPr id="4" name="TextBox 3"/>
+          <p:cNvPr id="3" name="TextBox 2"/>
           <p:cNvSpPr txBox="1"/>
           <p:nvPr/>
         </p:nvSpPr>
         <p:spPr>
           <a:xfrm>
-            <a:off x="581000" y="932188"/>
-            <a:ext cx="5593818" cy="923330"/>
+            <a:off x="1340112" y="233588"/>
+            <a:ext cx="6250996" cy="369332"/>
           </a:xfrm>
           <a:prstGeom prst="rect">
             <a:avLst/>
@@ -4281,26 +3909,138 @@
           <a:p>
             <a:r>
               <a:rPr lang="en-US" dirty="0" smtClean="0"/>
-              <a:t>Web hosting of repositories</a:t>
-            </a:r>
-          </a:p>
-          <a:p>
+              <a:t>How do VCS work?  -  1. Tracking and logging modifications</a:t>
+            </a:r>
+          </a:p>
+        </p:txBody>
+      </p:sp>
+      <p:sp>
+        <p:nvSpPr>
+          <p:cNvPr id="6" name="Rectangle 5"/>
+          <p:cNvSpPr/>
+          <p:nvPr/>
+        </p:nvSpPr>
+        <p:spPr>
+          <a:xfrm>
+            <a:off x="350358" y="1767006"/>
+            <a:ext cx="8072851" cy="2308324"/>
+          </a:xfrm>
+          <a:prstGeom prst="rect">
+            <a:avLst/>
+          </a:prstGeom>
+        </p:spPr>
+        <p:txBody>
+          <a:bodyPr wrap="square">
+            <a:spAutoFit/>
+          </a:bodyPr>
+          <a:lstStyle/>
+          <a:p>
+            <a:pPr>
+              <a:buFont typeface="Arial"/>
+              <a:buChar char="•"/>
+            </a:pPr>
+            <a:r>
+              <a:rPr lang="en-US" dirty="0" smtClean="0"/>
+              <a:t>The VCS can now restore the repository to any of the </a:t>
+            </a:r>
+            <a:r>
+              <a:rPr lang="en-US" dirty="0" err="1" smtClean="0"/>
+              <a:t>commited</a:t>
+            </a:r>
+            <a:r>
+              <a:rPr lang="en-US" dirty="0" smtClean="0"/>
+              <a:t> versions</a:t>
+            </a:r>
+            <a:br>
+              <a:rPr lang="en-US" dirty="0" smtClean="0"/>
+            </a:br>
+            <a:r>
+              <a:rPr lang="en-US" dirty="0" smtClean="0"/>
+              <a:t>	(by copying the database entry belonging to the version number to the </a:t>
+            </a:r>
+            <a:r>
+              <a:rPr lang="en-US" dirty="0" err="1" smtClean="0"/>
+              <a:t>workdir</a:t>
+            </a:r>
+            <a:r>
+              <a:rPr lang="en-US" dirty="0" smtClean="0"/>
+              <a:t>) </a:t>
+            </a:r>
+          </a:p>
+          <a:p>
+            <a:pPr>
+              <a:buFont typeface="Arial"/>
+              <a:buChar char="•"/>
+            </a:pPr>
             <a:endParaRPr lang="en-US" dirty="0" smtClean="0"/>
           </a:p>
           <a:p>
-            <a:r>
-              <a:rPr lang="en-US" dirty="0" err="1" smtClean="0"/>
-              <a:t>Github</a:t>
-            </a:r>
-            <a:r>
-              <a:rPr lang="en-US" dirty="0" smtClean="0"/>
-              <a:t> + </a:t>
-            </a:r>
-            <a:r>
-              <a:rPr lang="en-US" dirty="0" err="1" smtClean="0"/>
-              <a:t>bitbucket</a:t>
-            </a:r>
+            <a:pPr>
+              <a:buFont typeface="Arial"/>
+              <a:buChar char="•"/>
+            </a:pPr>
             <a:endParaRPr lang="en-US" dirty="0" smtClean="0"/>
+          </a:p>
+          <a:p>
+            <a:pPr>
+              <a:buFont typeface="Arial"/>
+              <a:buChar char="•"/>
+            </a:pPr>
+            <a:endParaRPr lang="en-US" dirty="0" smtClean="0"/>
+          </a:p>
+          <a:p>
+            <a:pPr>
+              <a:buFont typeface="Arial"/>
+              <a:buChar char="•"/>
+            </a:pPr>
+            <a:endParaRPr lang="en-US" dirty="0" smtClean="0"/>
+          </a:p>
+          <a:p>
+            <a:pPr>
+              <a:buFont typeface="Arial"/>
+              <a:buChar char="•"/>
+            </a:pPr>
+            <a:r>
+              <a:rPr lang="en-US" dirty="0" smtClean="0"/>
+              <a:t>The VCS can also report differences between any two arbitrary version numbers</a:t>
+            </a:r>
+            <a:br>
+              <a:rPr lang="en-US" dirty="0" smtClean="0"/>
+            </a:br>
+            <a:r>
+              <a:rPr lang="en-US" dirty="0" smtClean="0"/>
+              <a:t>	(by running a ‘diff’ between the two corresponding database entries)</a:t>
+            </a:r>
+          </a:p>
+        </p:txBody>
+      </p:sp>
+      <p:sp>
+        <p:nvSpPr>
+          <p:cNvPr id="7" name="TextBox 6"/>
+          <p:cNvSpPr txBox="1"/>
+          <p:nvPr/>
+        </p:nvSpPr>
+        <p:spPr>
+          <a:xfrm>
+            <a:off x="350358" y="5927297"/>
+            <a:ext cx="8072851" cy="369332"/>
+          </a:xfrm>
+          <a:prstGeom prst="rect">
+            <a:avLst/>
+          </a:prstGeom>
+          <a:noFill/>
+        </p:spPr>
+        <p:txBody>
+          <a:bodyPr wrap="square" rtlCol="0">
+            <a:spAutoFit/>
+          </a:bodyPr>
+          <a:lstStyle/>
+          <a:p>
+            <a:r>
+              <a:rPr lang="en-US" dirty="0" smtClean="0"/>
+              <a:t>That’s everything for use case 1 (Tracking and logging modifications)….   Pretty simple  </a:t>
+            </a:r>
+            <a:endParaRPr lang="en-US" dirty="0"/>
           </a:p>
         </p:txBody>
       </p:sp>
@@ -4309,7 +4049,729 @@
   <p:clrMapOvr>
     <a:masterClrMapping/>
   </p:clrMapOvr>
-  <p:transition/>
+  <p:transition xmlns:p14="http://schemas.microsoft.com/office/powerpoint/2010/main"/>
+</p:sld>
+</file>
+
+<file path=ppt/slides/slide5.xml><?xml version="1.0" encoding="utf-8"?>
+<p:sld xmlns:a="http://schemas.openxmlformats.org/drawingml/2006/main" xmlns:r="http://schemas.openxmlformats.org/officeDocument/2006/relationships" xmlns:p="http://schemas.openxmlformats.org/presentationml/2006/main">
+  <p:cSld>
+    <p:spTree>
+      <p:nvGrpSpPr>
+        <p:cNvPr id="1" name=""/>
+        <p:cNvGrpSpPr/>
+        <p:nvPr/>
+      </p:nvGrpSpPr>
+      <p:grpSpPr>
+        <a:xfrm>
+          <a:off x="0" y="0"/>
+          <a:ext cx="0" cy="0"/>
+          <a:chOff x="0" y="0"/>
+          <a:chExt cx="0" cy="0"/>
+        </a:xfrm>
+      </p:grpSpPr>
+      <p:sp>
+        <p:nvSpPr>
+          <p:cNvPr id="3" name="TextBox 2"/>
+          <p:cNvSpPr txBox="1"/>
+          <p:nvPr/>
+        </p:nvSpPr>
+        <p:spPr>
+          <a:xfrm>
+            <a:off x="1340112" y="0"/>
+            <a:ext cx="6250996" cy="646331"/>
+          </a:xfrm>
+          <a:prstGeom prst="rect">
+            <a:avLst/>
+          </a:prstGeom>
+          <a:noFill/>
+        </p:spPr>
+        <p:txBody>
+          <a:bodyPr wrap="square" rtlCol="0">
+            <a:spAutoFit/>
+          </a:bodyPr>
+          <a:lstStyle/>
+          <a:p>
+            <a:r>
+              <a:rPr lang="en-US" dirty="0" smtClean="0"/>
+              <a:t>How do VCS work?  -  2. Backup of a complete project history</a:t>
+            </a:r>
+          </a:p>
+          <a:p>
+            <a:endParaRPr lang="en-US" dirty="0" smtClean="0"/>
+          </a:p>
+        </p:txBody>
+      </p:sp>
+      <p:sp>
+        <p:nvSpPr>
+          <p:cNvPr id="4" name="TextBox 3"/>
+          <p:cNvSpPr txBox="1"/>
+          <p:nvPr/>
+        </p:nvSpPr>
+        <p:spPr>
+          <a:xfrm>
+            <a:off x="248170" y="646331"/>
+            <a:ext cx="8895829" cy="923330"/>
+          </a:xfrm>
+          <a:prstGeom prst="rect">
+            <a:avLst/>
+          </a:prstGeom>
+          <a:noFill/>
+        </p:spPr>
+        <p:txBody>
+          <a:bodyPr wrap="square" rtlCol="0">
+            <a:spAutoFit/>
+          </a:bodyPr>
+          <a:lstStyle/>
+          <a:p>
+            <a:pPr>
+              <a:buFont typeface="Arial"/>
+              <a:buChar char="•"/>
+            </a:pPr>
+            <a:r>
+              <a:rPr lang="en-US" dirty="0" smtClean="0"/>
+              <a:t>Backup: usually means copying files to a different hard drive or server</a:t>
+            </a:r>
+          </a:p>
+          <a:p>
+            <a:pPr>
+              <a:buFont typeface="Arial"/>
+              <a:buChar char="•"/>
+            </a:pPr>
+            <a:endParaRPr lang="en-US" dirty="0" smtClean="0"/>
+          </a:p>
+          <a:p>
+            <a:pPr>
+              <a:buFont typeface="Arial"/>
+              <a:buChar char="•"/>
+            </a:pPr>
+            <a:r>
+              <a:rPr lang="en-US" dirty="0" smtClean="0"/>
+              <a:t>Backup using VCS: the complete </a:t>
+            </a:r>
+            <a:r>
+              <a:rPr lang="en-US" dirty="0" err="1" smtClean="0"/>
+              <a:t>workdir</a:t>
+            </a:r>
+            <a:r>
+              <a:rPr lang="en-US" dirty="0" smtClean="0"/>
+              <a:t> (current files + VCS database) is copied to a server</a:t>
+            </a:r>
+            <a:endParaRPr lang="en-US" dirty="0"/>
+          </a:p>
+        </p:txBody>
+      </p:sp>
+      <p:sp>
+        <p:nvSpPr>
+          <p:cNvPr id="6" name="TextBox 5"/>
+          <p:cNvSpPr txBox="1"/>
+          <p:nvPr/>
+        </p:nvSpPr>
+        <p:spPr>
+          <a:xfrm>
+            <a:off x="248170" y="3868803"/>
+            <a:ext cx="8612988" cy="1754327"/>
+          </a:xfrm>
+          <a:prstGeom prst="rect">
+            <a:avLst/>
+          </a:prstGeom>
+          <a:noFill/>
+        </p:spPr>
+        <p:txBody>
+          <a:bodyPr wrap="square" rtlCol="0">
+            <a:spAutoFit/>
+          </a:bodyPr>
+          <a:lstStyle/>
+          <a:p>
+            <a:r>
+              <a:rPr lang="en-US" dirty="0" smtClean="0"/>
+              <a:t>Slight complication: commits to </a:t>
+            </a:r>
+            <a:r>
+              <a:rPr lang="en-US" dirty="0" err="1" smtClean="0"/>
+              <a:t>workdir</a:t>
+            </a:r>
+            <a:r>
+              <a:rPr lang="en-US" dirty="0" smtClean="0"/>
+              <a:t> and backup to server are not necessarily synced</a:t>
+            </a:r>
+          </a:p>
+          <a:p>
+            <a:endParaRPr lang="en-US" dirty="0" smtClean="0"/>
+          </a:p>
+          <a:p>
+            <a:r>
+              <a:rPr lang="en-US" dirty="0" smtClean="0"/>
+              <a:t>-&gt; Every time a backup is made:</a:t>
+            </a:r>
+          </a:p>
+          <a:p>
+            <a:pPr marL="342900" indent="342900">
+              <a:buFont typeface="+mj-lt"/>
+              <a:buAutoNum type="arabicPeriod"/>
+            </a:pPr>
+            <a:r>
+              <a:rPr lang="en-US" dirty="0" smtClean="0"/>
+              <a:t>The VCS determines which version numbers exist in the </a:t>
+            </a:r>
+            <a:r>
+              <a:rPr lang="en-US" dirty="0" err="1" smtClean="0"/>
+              <a:t>workdir</a:t>
+            </a:r>
+            <a:r>
+              <a:rPr lang="en-US" dirty="0" smtClean="0"/>
+              <a:t> but not on the server</a:t>
+            </a:r>
+          </a:p>
+          <a:p>
+            <a:pPr marL="342900" indent="342900">
+              <a:buFont typeface="+mj-lt"/>
+              <a:buAutoNum type="arabicPeriod"/>
+            </a:pPr>
+            <a:r>
+              <a:rPr lang="en-US" dirty="0" smtClean="0"/>
+              <a:t>Only the database entries belonging to these are copied to the server		</a:t>
+            </a:r>
+            <a:endParaRPr lang="en-US" dirty="0"/>
+          </a:p>
+        </p:txBody>
+      </p:sp>
+      <p:sp>
+        <p:nvSpPr>
+          <p:cNvPr id="7" name="Rectangle 6"/>
+          <p:cNvSpPr/>
+          <p:nvPr/>
+        </p:nvSpPr>
+        <p:spPr>
+          <a:xfrm>
+            <a:off x="493410" y="5888503"/>
+            <a:ext cx="8046585" cy="369332"/>
+          </a:xfrm>
+          <a:prstGeom prst="rect">
+            <a:avLst/>
+          </a:prstGeom>
+        </p:spPr>
+        <p:txBody>
+          <a:bodyPr wrap="square">
+            <a:spAutoFit/>
+          </a:bodyPr>
+          <a:lstStyle/>
+          <a:p>
+            <a:r>
+              <a:rPr lang="en-US" dirty="0" smtClean="0"/>
+              <a:t>That’s everything for use case 2 (Backing up)….   Pretty simple  </a:t>
+            </a:r>
+            <a:endParaRPr lang="en-US" dirty="0"/>
+          </a:p>
+        </p:txBody>
+      </p:sp>
+    </p:spTree>
+  </p:cSld>
+  <p:clrMapOvr>
+    <a:masterClrMapping/>
+  </p:clrMapOvr>
+  <p:transition xmlns:p14="http://schemas.microsoft.com/office/powerpoint/2010/main"/>
+</p:sld>
+</file>
+
+<file path=ppt/slides/slide6.xml><?xml version="1.0" encoding="utf-8"?>
+<p:sld xmlns:a="http://schemas.openxmlformats.org/drawingml/2006/main" xmlns:r="http://schemas.openxmlformats.org/officeDocument/2006/relationships" xmlns:p="http://schemas.openxmlformats.org/presentationml/2006/main">
+  <p:cSld>
+    <p:spTree>
+      <p:nvGrpSpPr>
+        <p:cNvPr id="1" name=""/>
+        <p:cNvGrpSpPr/>
+        <p:nvPr/>
+      </p:nvGrpSpPr>
+      <p:grpSpPr>
+        <a:xfrm>
+          <a:off x="0" y="0"/>
+          <a:ext cx="0" cy="0"/>
+          <a:chOff x="0" y="0"/>
+          <a:chExt cx="0" cy="0"/>
+        </a:xfrm>
+      </p:grpSpPr>
+      <p:sp>
+        <p:nvSpPr>
+          <p:cNvPr id="3" name="TextBox 2"/>
+          <p:cNvSpPr txBox="1"/>
+          <p:nvPr/>
+        </p:nvSpPr>
+        <p:spPr>
+          <a:xfrm>
+            <a:off x="715315" y="0"/>
+            <a:ext cx="8087449" cy="646331"/>
+          </a:xfrm>
+          <a:prstGeom prst="rect">
+            <a:avLst/>
+          </a:prstGeom>
+          <a:noFill/>
+        </p:spPr>
+        <p:txBody>
+          <a:bodyPr wrap="square" rtlCol="0">
+            <a:spAutoFit/>
+          </a:bodyPr>
+          <a:lstStyle/>
+          <a:p>
+            <a:r>
+              <a:rPr lang="en-US" dirty="0" smtClean="0"/>
+              <a:t>How do VCS work?  -  3. Collaboration of 2-∞ people on the same project</a:t>
+            </a:r>
+          </a:p>
+          <a:p>
+            <a:pPr algn="ctr"/>
+            <a:r>
+              <a:rPr lang="en-US" sz="1400" dirty="0" smtClean="0"/>
+              <a:t>(and things get complicated…)</a:t>
+            </a:r>
+            <a:r>
+              <a:rPr lang="en-US" dirty="0" smtClean="0"/>
+              <a:t> </a:t>
+            </a:r>
+          </a:p>
+        </p:txBody>
+      </p:sp>
+      <p:sp>
+        <p:nvSpPr>
+          <p:cNvPr id="5" name="TextBox 4"/>
+          <p:cNvSpPr txBox="1"/>
+          <p:nvPr/>
+        </p:nvSpPr>
+        <p:spPr>
+          <a:xfrm>
+            <a:off x="335761" y="1328532"/>
+            <a:ext cx="8808239" cy="1754327"/>
+          </a:xfrm>
+          <a:prstGeom prst="rect">
+            <a:avLst/>
+          </a:prstGeom>
+          <a:noFill/>
+        </p:spPr>
+        <p:txBody>
+          <a:bodyPr wrap="square" rtlCol="0">
+            <a:spAutoFit/>
+          </a:bodyPr>
+          <a:lstStyle/>
+          <a:p>
+            <a:pPr>
+              <a:buFont typeface="Arial"/>
+              <a:buChar char="•"/>
+            </a:pPr>
+            <a:r>
+              <a:rPr lang="en-US" dirty="0" smtClean="0"/>
+              <a:t>The basic problem: no more linear project history</a:t>
+            </a:r>
+          </a:p>
+          <a:p>
+            <a:pPr>
+              <a:buFont typeface="Arial"/>
+              <a:buChar char="•"/>
+            </a:pPr>
+            <a:endParaRPr lang="en-US" dirty="0" smtClean="0"/>
+          </a:p>
+          <a:p>
+            <a:pPr>
+              <a:buFont typeface="Arial"/>
+              <a:buChar char="•"/>
+            </a:pPr>
+            <a:r>
+              <a:rPr lang="en-US" dirty="0" smtClean="0"/>
+              <a:t>Let’s assume: 2 developers (Alice and Bob) work on a project backed up on the same server</a:t>
+            </a:r>
+          </a:p>
+          <a:p>
+            <a:pPr>
+              <a:buFont typeface="Arial"/>
+              <a:buChar char="•"/>
+            </a:pPr>
+            <a:endParaRPr lang="en-US" dirty="0" smtClean="0"/>
+          </a:p>
+          <a:p>
+            <a:pPr>
+              <a:buFont typeface="Arial"/>
+              <a:buChar char="•"/>
+            </a:pPr>
+            <a:r>
+              <a:rPr lang="en-US" dirty="0" smtClean="0"/>
+              <a:t>Both A+B make commits to the project on their local machine</a:t>
+            </a:r>
+          </a:p>
+          <a:p>
+            <a:r>
+              <a:rPr lang="en-US" dirty="0" smtClean="0"/>
+              <a:t>(but eventually all </a:t>
+            </a:r>
+            <a:r>
+              <a:rPr lang="en-US" dirty="0" err="1" smtClean="0"/>
+              <a:t>changesets</a:t>
+            </a:r>
+            <a:r>
+              <a:rPr lang="en-US" dirty="0" smtClean="0"/>
+              <a:t> should be combined in the same </a:t>
+            </a:r>
+            <a:r>
+              <a:rPr lang="en-US" dirty="0" err="1" smtClean="0"/>
+              <a:t>workdir</a:t>
+            </a:r>
+            <a:r>
+              <a:rPr lang="en-US" dirty="0" smtClean="0"/>
+              <a:t>)</a:t>
+            </a:r>
+            <a:endParaRPr lang="en-US" dirty="0"/>
+          </a:p>
+        </p:txBody>
+      </p:sp>
+      <p:sp>
+        <p:nvSpPr>
+          <p:cNvPr id="4" name="TextBox 3"/>
+          <p:cNvSpPr txBox="1"/>
+          <p:nvPr/>
+        </p:nvSpPr>
+        <p:spPr>
+          <a:xfrm>
+            <a:off x="335761" y="5314129"/>
+            <a:ext cx="8014457" cy="923330"/>
+          </a:xfrm>
+          <a:prstGeom prst="rect">
+            <a:avLst/>
+          </a:prstGeom>
+          <a:noFill/>
+        </p:spPr>
+        <p:txBody>
+          <a:bodyPr wrap="square" rtlCol="0">
+            <a:spAutoFit/>
+          </a:bodyPr>
+          <a:lstStyle/>
+          <a:p>
+            <a:pPr>
+              <a:buFont typeface="Arial"/>
+              <a:buChar char="•"/>
+            </a:pPr>
+            <a:r>
+              <a:rPr lang="en-US" dirty="0" smtClean="0"/>
+              <a:t>The commit history is ‘diverged’ or ‘branched’</a:t>
+            </a:r>
+          </a:p>
+          <a:p>
+            <a:pPr>
+              <a:buFont typeface="Arial"/>
+              <a:buChar char="•"/>
+            </a:pPr>
+            <a:endParaRPr lang="en-US" dirty="0" smtClean="0"/>
+          </a:p>
+          <a:p>
+            <a:pPr>
+              <a:buFont typeface="Arial"/>
+              <a:buChar char="•"/>
+            </a:pPr>
+            <a:r>
+              <a:rPr lang="en-US" dirty="0" smtClean="0"/>
+              <a:t>To manage this, a VCS can perform two operations: ‘branching’ and ‘merging’  </a:t>
+            </a:r>
+            <a:endParaRPr lang="en-US" dirty="0"/>
+          </a:p>
+        </p:txBody>
+      </p:sp>
+    </p:spTree>
+    <p:extLst>
+      <p:ext uri="{BB962C8B-B14F-4D97-AF65-F5344CB8AC3E}">
+        <p14:creationId xmlns:p14="http://schemas.microsoft.com/office/powerpoint/2010/main" val="653782836"/>
+      </p:ext>
+    </p:extLst>
+  </p:cSld>
+  <p:clrMapOvr>
+    <a:masterClrMapping/>
+  </p:clrMapOvr>
+  <p:transition xmlns:p14="http://schemas.microsoft.com/office/powerpoint/2010/main"/>
+</p:sld>
+</file>
+
+<file path=ppt/slides/slide7.xml><?xml version="1.0" encoding="utf-8"?>
+<p:sld xmlns:a="http://schemas.openxmlformats.org/drawingml/2006/main" xmlns:r="http://schemas.openxmlformats.org/officeDocument/2006/relationships" xmlns:p="http://schemas.openxmlformats.org/presentationml/2006/main">
+  <p:cSld>
+    <p:spTree>
+      <p:nvGrpSpPr>
+        <p:cNvPr id="1" name=""/>
+        <p:cNvGrpSpPr/>
+        <p:nvPr/>
+      </p:nvGrpSpPr>
+      <p:grpSpPr>
+        <a:xfrm>
+          <a:off x="0" y="0"/>
+          <a:ext cx="0" cy="0"/>
+          <a:chOff x="0" y="0"/>
+          <a:chExt cx="0" cy="0"/>
+        </a:xfrm>
+      </p:grpSpPr>
+      <p:sp>
+        <p:nvSpPr>
+          <p:cNvPr id="4" name="TextBox 3"/>
+          <p:cNvSpPr txBox="1"/>
+          <p:nvPr/>
+        </p:nvSpPr>
+        <p:spPr>
+          <a:xfrm>
+            <a:off x="581000" y="932188"/>
+            <a:ext cx="8221764" cy="2031325"/>
+          </a:xfrm>
+          <a:prstGeom prst="rect">
+            <a:avLst/>
+          </a:prstGeom>
+          <a:noFill/>
+        </p:spPr>
+        <p:txBody>
+          <a:bodyPr wrap="square" rtlCol="0">
+            <a:spAutoFit/>
+          </a:bodyPr>
+          <a:lstStyle/>
+          <a:p>
+            <a:pPr>
+              <a:buFont typeface="Arial"/>
+              <a:buChar char="•"/>
+            </a:pPr>
+            <a:r>
+              <a:rPr lang="en-US" dirty="0" smtClean="0"/>
+              <a:t>A ‘branch’ is a </a:t>
+            </a:r>
+            <a:r>
+              <a:rPr lang="en-US" dirty="0" err="1" smtClean="0"/>
+              <a:t>wdsflk</a:t>
+            </a:r>
+            <a:endParaRPr lang="en-US" dirty="0" smtClean="0"/>
+          </a:p>
+          <a:p>
+            <a:pPr>
+              <a:buFont typeface="Arial"/>
+              <a:buChar char="•"/>
+            </a:pPr>
+            <a:endParaRPr lang="en-US" dirty="0" smtClean="0"/>
+          </a:p>
+          <a:p>
+            <a:pPr>
+              <a:buFont typeface="Arial"/>
+              <a:buChar char="•"/>
+            </a:pPr>
+            <a:r>
+              <a:rPr lang="en-US" dirty="0" smtClean="0"/>
+              <a:t>An arbitrary number of branches can exist (and also backed up to the server), e.g. Alice’s and Bob’s changes </a:t>
+            </a:r>
+          </a:p>
+          <a:p>
+            <a:pPr>
+              <a:buFont typeface="Arial"/>
+              <a:buChar char="•"/>
+            </a:pPr>
+            <a:endParaRPr lang="en-US" dirty="0" smtClean="0"/>
+          </a:p>
+          <a:p>
+            <a:pPr>
+              <a:buFont typeface="Arial"/>
+              <a:buChar char="•"/>
+            </a:pPr>
+            <a:r>
+              <a:rPr lang="en-US" dirty="0" smtClean="0"/>
+              <a:t>The VCS can set the files in the </a:t>
+            </a:r>
+            <a:r>
+              <a:rPr lang="en-US" dirty="0" err="1" smtClean="0"/>
+              <a:t>workdir</a:t>
+            </a:r>
+            <a:r>
+              <a:rPr lang="en-US" dirty="0" smtClean="0"/>
+              <a:t> to any of the branch commits (e.g. Bob can see Alice’s work without changing his own)</a:t>
+            </a:r>
+          </a:p>
+        </p:txBody>
+      </p:sp>
+      <p:sp>
+        <p:nvSpPr>
+          <p:cNvPr id="3" name="TextBox 2"/>
+          <p:cNvSpPr txBox="1"/>
+          <p:nvPr/>
+        </p:nvSpPr>
+        <p:spPr>
+          <a:xfrm>
+            <a:off x="715315" y="0"/>
+            <a:ext cx="8087449" cy="369332"/>
+          </a:xfrm>
+          <a:prstGeom prst="rect">
+            <a:avLst/>
+          </a:prstGeom>
+          <a:noFill/>
+        </p:spPr>
+        <p:txBody>
+          <a:bodyPr wrap="square" rtlCol="0">
+            <a:spAutoFit/>
+          </a:bodyPr>
+          <a:lstStyle/>
+          <a:p>
+            <a:r>
+              <a:rPr lang="en-US" dirty="0" smtClean="0"/>
+              <a:t>How do VCS work?  -  3. Collaboration of 2-∞ people on the same project</a:t>
+            </a:r>
+          </a:p>
+        </p:txBody>
+      </p:sp>
+    </p:spTree>
+    <p:extLst>
+      <p:ext uri="{BB962C8B-B14F-4D97-AF65-F5344CB8AC3E}">
+        <p14:creationId xmlns:p14="http://schemas.microsoft.com/office/powerpoint/2010/main" val="502525717"/>
+      </p:ext>
+    </p:extLst>
+  </p:cSld>
+  <p:clrMapOvr>
+    <a:masterClrMapping/>
+  </p:clrMapOvr>
+  <p:transition xmlns:p14="http://schemas.microsoft.com/office/powerpoint/2010/main"/>
+</p:sld>
+</file>
+
+<file path=ppt/slides/slide8.xml><?xml version="1.0" encoding="utf-8"?>
+<p:sld xmlns:a="http://schemas.openxmlformats.org/drawingml/2006/main" xmlns:r="http://schemas.openxmlformats.org/officeDocument/2006/relationships" xmlns:p="http://schemas.openxmlformats.org/presentationml/2006/main">
+  <p:cSld>
+    <p:spTree>
+      <p:nvGrpSpPr>
+        <p:cNvPr id="1" name=""/>
+        <p:cNvGrpSpPr/>
+        <p:nvPr/>
+      </p:nvGrpSpPr>
+      <p:grpSpPr>
+        <a:xfrm>
+          <a:off x="0" y="0"/>
+          <a:ext cx="0" cy="0"/>
+          <a:chOff x="0" y="0"/>
+          <a:chExt cx="0" cy="0"/>
+        </a:xfrm>
+      </p:grpSpPr>
+      <p:sp>
+        <p:nvSpPr>
+          <p:cNvPr id="4" name="TextBox 3"/>
+          <p:cNvSpPr txBox="1"/>
+          <p:nvPr/>
+        </p:nvSpPr>
+        <p:spPr>
+          <a:xfrm>
+            <a:off x="581000" y="932188"/>
+            <a:ext cx="5593818" cy="369332"/>
+          </a:xfrm>
+          <a:prstGeom prst="rect">
+            <a:avLst/>
+          </a:prstGeom>
+          <a:noFill/>
+        </p:spPr>
+        <p:txBody>
+          <a:bodyPr wrap="square" rtlCol="0">
+            <a:spAutoFit/>
+          </a:bodyPr>
+          <a:lstStyle/>
+          <a:p>
+            <a:r>
+              <a:rPr lang="en-US" dirty="0" smtClean="0"/>
+              <a:t>Branching 2</a:t>
+            </a:r>
+          </a:p>
+        </p:txBody>
+      </p:sp>
+      <p:sp>
+        <p:nvSpPr>
+          <p:cNvPr id="3" name="TextBox 2"/>
+          <p:cNvSpPr txBox="1"/>
+          <p:nvPr/>
+        </p:nvSpPr>
+        <p:spPr>
+          <a:xfrm>
+            <a:off x="715315" y="0"/>
+            <a:ext cx="8087449" cy="369332"/>
+          </a:xfrm>
+          <a:prstGeom prst="rect">
+            <a:avLst/>
+          </a:prstGeom>
+          <a:noFill/>
+        </p:spPr>
+        <p:txBody>
+          <a:bodyPr wrap="square" rtlCol="0">
+            <a:spAutoFit/>
+          </a:bodyPr>
+          <a:lstStyle/>
+          <a:p>
+            <a:r>
+              <a:rPr lang="en-US" dirty="0" smtClean="0"/>
+              <a:t>How do VCS work?  -  3. Collaboration of 2-∞ people on the same project</a:t>
+            </a:r>
+          </a:p>
+        </p:txBody>
+      </p:sp>
+    </p:spTree>
+    <p:extLst>
+      <p:ext uri="{BB962C8B-B14F-4D97-AF65-F5344CB8AC3E}">
+        <p14:creationId xmlns:p14="http://schemas.microsoft.com/office/powerpoint/2010/main" val="2278185650"/>
+      </p:ext>
+    </p:extLst>
+  </p:cSld>
+  <p:clrMapOvr>
+    <a:masterClrMapping/>
+  </p:clrMapOvr>
+  <p:transition xmlns:p14="http://schemas.microsoft.com/office/powerpoint/2010/main"/>
+</p:sld>
+</file>
+
+<file path=ppt/slides/slide9.xml><?xml version="1.0" encoding="utf-8"?>
+<p:sld xmlns:a="http://schemas.openxmlformats.org/drawingml/2006/main" xmlns:r="http://schemas.openxmlformats.org/officeDocument/2006/relationships" xmlns:p="http://schemas.openxmlformats.org/presentationml/2006/main">
+  <p:cSld>
+    <p:spTree>
+      <p:nvGrpSpPr>
+        <p:cNvPr id="1" name=""/>
+        <p:cNvGrpSpPr/>
+        <p:nvPr/>
+      </p:nvGrpSpPr>
+      <p:grpSpPr>
+        <a:xfrm>
+          <a:off x="0" y="0"/>
+          <a:ext cx="0" cy="0"/>
+          <a:chOff x="0" y="0"/>
+          <a:chExt cx="0" cy="0"/>
+        </a:xfrm>
+      </p:grpSpPr>
+      <p:sp>
+        <p:nvSpPr>
+          <p:cNvPr id="4" name="TextBox 3"/>
+          <p:cNvSpPr txBox="1"/>
+          <p:nvPr/>
+        </p:nvSpPr>
+        <p:spPr>
+          <a:xfrm>
+            <a:off x="581000" y="932188"/>
+            <a:ext cx="5593818" cy="369332"/>
+          </a:xfrm>
+          <a:prstGeom prst="rect">
+            <a:avLst/>
+          </a:prstGeom>
+          <a:noFill/>
+        </p:spPr>
+        <p:txBody>
+          <a:bodyPr wrap="square" rtlCol="0">
+            <a:spAutoFit/>
+          </a:bodyPr>
+          <a:lstStyle/>
+          <a:p>
+            <a:r>
+              <a:rPr lang="en-US" dirty="0" smtClean="0"/>
+              <a:t>Merging 1</a:t>
+            </a:r>
+          </a:p>
+        </p:txBody>
+      </p:sp>
+    </p:spTree>
+    <p:extLst>
+      <p:ext uri="{BB962C8B-B14F-4D97-AF65-F5344CB8AC3E}">
+        <p14:creationId xmlns:p14="http://schemas.microsoft.com/office/powerpoint/2010/main" val="2864348573"/>
+      </p:ext>
+    </p:extLst>
+  </p:cSld>
+  <p:clrMapOvr>
+    <a:masterClrMapping/>
+  </p:clrMapOvr>
+  <p:transition xmlns:p14="http://schemas.microsoft.com/office/powerpoint/2010/main"/>
 </p:sld>
 </file>
 

</xml_diff>

<commit_message>
final final version of ppt
</commit_message>
<xml_diff>
--- a/git_python_kurs.pptx
+++ b/git_python_kurs.pptx
@@ -1,6 +1,6 @@
 
 <file path=ppt/presentation.xml><?xml version="1.0" encoding="utf-8"?>
-<p:presentation xmlns:a="http://schemas.openxmlformats.org/drawingml/2006/main" xmlns:r="http://schemas.openxmlformats.org/officeDocument/2006/relationships" xmlns:p="http://schemas.openxmlformats.org/presentationml/2006/main" saveSubsetFonts="1" autoCompressPictures="0">
+<p:presentation xmlns:a="http://schemas.openxmlformats.org/drawingml/2006/main" xmlns:r="http://schemas.openxmlformats.org/officeDocument/2006/relationships" xmlns:mc="http://schemas.openxmlformats.org/markup-compatibility/2006" xmlns:mv="urn:schemas-microsoft-com:mac:vml" xmlns:p="http://schemas.openxmlformats.org/presentationml/2006/main" mc:Ignorable="mv" mc:PreserveAttributes="mv:*" saveSubsetFonts="1" autoCompressPictures="0">
   <p:sldMasterIdLst>
     <p:sldMasterId id="2147483648" r:id="rId1"/>
   </p:sldMasterIdLst>
@@ -22,6 +22,7 @@
     <p:sldId id="267" r:id="rId16"/>
     <p:sldId id="268" r:id="rId17"/>
     <p:sldId id="274" r:id="rId18"/>
+    <p:sldId id="276" r:id="rId19"/>
   </p:sldIdLst>
   <p:sldSz cx="9144000" cy="6858000" type="screen4x3"/>
   <p:notesSz cx="6858000" cy="9144000"/>
@@ -124,7 +125,7 @@
 </file>
 
 <file path=ppt/slideLayouts/slideLayout1.xml><?xml version="1.0" encoding="utf-8"?>
-<p:sldLayout xmlns:a="http://schemas.openxmlformats.org/drawingml/2006/main" xmlns:r="http://schemas.openxmlformats.org/officeDocument/2006/relationships" xmlns:p="http://schemas.openxmlformats.org/presentationml/2006/main" type="title" preserve="1">
+<p:sldLayout xmlns:a="http://schemas.openxmlformats.org/drawingml/2006/main" xmlns:r="http://schemas.openxmlformats.org/officeDocument/2006/relationships" xmlns:mc="http://schemas.openxmlformats.org/markup-compatibility/2006" xmlns:mv="urn:schemas-microsoft-com:mac:vml" xmlns:p="http://schemas.openxmlformats.org/presentationml/2006/main" mc:Ignorable="mv" mc:PreserveAttributes="mv:*" type="title" preserve="1">
   <p:cSld name="Title Slide">
     <p:spTree>
       <p:nvGrpSpPr>
@@ -305,7 +306,7 @@
             <a:fld id="{7AB4D525-FEA6-4C46-A836-18AB099A0B80}" type="datetimeFigureOut">
               <a:rPr lang="en-US" smtClean="0"/>
               <a:pPr/>
-              <a:t>2/16/15</a:t>
+              <a:t>2/19/15</a:t>
             </a:fld>
             <a:endParaRPr lang="en-US"/>
           </a:p>
@@ -348,7 +349,7 @@
             <a:fld id="{4F754926-63EB-4746-BA1D-DEED820DE9EA}" type="slidenum">
               <a:rPr lang="en-US" smtClean="0"/>
               <a:pPr/>
-              <a:t>‹Nr.›</a:t>
+              <a:t>‹#›</a:t>
             </a:fld>
             <a:endParaRPr lang="en-US"/>
           </a:p>
@@ -363,7 +364,7 @@
 </file>
 
 <file path=ppt/slideLayouts/slideLayout10.xml><?xml version="1.0" encoding="utf-8"?>
-<p:sldLayout xmlns:a="http://schemas.openxmlformats.org/drawingml/2006/main" xmlns:r="http://schemas.openxmlformats.org/officeDocument/2006/relationships" xmlns:p="http://schemas.openxmlformats.org/presentationml/2006/main" type="vertTx" preserve="1">
+<p:sldLayout xmlns:a="http://schemas.openxmlformats.org/drawingml/2006/main" xmlns:r="http://schemas.openxmlformats.org/officeDocument/2006/relationships" xmlns:mc="http://schemas.openxmlformats.org/markup-compatibility/2006" xmlns:mv="urn:schemas-microsoft-com:mac:vml" xmlns:p="http://schemas.openxmlformats.org/presentationml/2006/main" mc:Ignorable="mv" mc:PreserveAttributes="mv:*" type="vertTx" preserve="1">
   <p:cSld name="Title and Vertical Text">
     <p:spTree>
       <p:nvGrpSpPr>
@@ -472,7 +473,7 @@
             <a:fld id="{7AB4D525-FEA6-4C46-A836-18AB099A0B80}" type="datetimeFigureOut">
               <a:rPr lang="en-US" smtClean="0"/>
               <a:pPr/>
-              <a:t>2/16/15</a:t>
+              <a:t>2/19/15</a:t>
             </a:fld>
             <a:endParaRPr lang="en-US"/>
           </a:p>
@@ -515,7 +516,7 @@
             <a:fld id="{4F754926-63EB-4746-BA1D-DEED820DE9EA}" type="slidenum">
               <a:rPr lang="en-US" smtClean="0"/>
               <a:pPr/>
-              <a:t>‹Nr.›</a:t>
+              <a:t>‹#›</a:t>
             </a:fld>
             <a:endParaRPr lang="en-US"/>
           </a:p>
@@ -530,7 +531,7 @@
 </file>
 
 <file path=ppt/slideLayouts/slideLayout11.xml><?xml version="1.0" encoding="utf-8"?>
-<p:sldLayout xmlns:a="http://schemas.openxmlformats.org/drawingml/2006/main" xmlns:r="http://schemas.openxmlformats.org/officeDocument/2006/relationships" xmlns:p="http://schemas.openxmlformats.org/presentationml/2006/main" type="vertTitleAndTx" preserve="1">
+<p:sldLayout xmlns:a="http://schemas.openxmlformats.org/drawingml/2006/main" xmlns:r="http://schemas.openxmlformats.org/officeDocument/2006/relationships" xmlns:mc="http://schemas.openxmlformats.org/markup-compatibility/2006" xmlns:mv="urn:schemas-microsoft-com:mac:vml" xmlns:p="http://schemas.openxmlformats.org/presentationml/2006/main" mc:Ignorable="mv" mc:PreserveAttributes="mv:*" type="vertTitleAndTx" preserve="1">
   <p:cSld name="Vertical Title and Text">
     <p:spTree>
       <p:nvGrpSpPr>
@@ -649,7 +650,7 @@
             <a:fld id="{7AB4D525-FEA6-4C46-A836-18AB099A0B80}" type="datetimeFigureOut">
               <a:rPr lang="en-US" smtClean="0"/>
               <a:pPr/>
-              <a:t>2/16/15</a:t>
+              <a:t>2/19/15</a:t>
             </a:fld>
             <a:endParaRPr lang="en-US"/>
           </a:p>
@@ -692,7 +693,7 @@
             <a:fld id="{4F754926-63EB-4746-BA1D-DEED820DE9EA}" type="slidenum">
               <a:rPr lang="en-US" smtClean="0"/>
               <a:pPr/>
-              <a:t>‹Nr.›</a:t>
+              <a:t>‹#›</a:t>
             </a:fld>
             <a:endParaRPr lang="en-US"/>
           </a:p>
@@ -707,7 +708,7 @@
 </file>
 
 <file path=ppt/slideLayouts/slideLayout2.xml><?xml version="1.0" encoding="utf-8"?>
-<p:sldLayout xmlns:a="http://schemas.openxmlformats.org/drawingml/2006/main" xmlns:r="http://schemas.openxmlformats.org/officeDocument/2006/relationships" xmlns:p="http://schemas.openxmlformats.org/presentationml/2006/main" type="obj" preserve="1">
+<p:sldLayout xmlns:a="http://schemas.openxmlformats.org/drawingml/2006/main" xmlns:r="http://schemas.openxmlformats.org/officeDocument/2006/relationships" xmlns:mc="http://schemas.openxmlformats.org/markup-compatibility/2006" xmlns:mv="urn:schemas-microsoft-com:mac:vml" xmlns:p="http://schemas.openxmlformats.org/presentationml/2006/main" mc:Ignorable="mv" mc:PreserveAttributes="mv:*" type="obj" preserve="1">
   <p:cSld name="Title and Content">
     <p:spTree>
       <p:nvGrpSpPr>
@@ -816,7 +817,7 @@
             <a:fld id="{7AB4D525-FEA6-4C46-A836-18AB099A0B80}" type="datetimeFigureOut">
               <a:rPr lang="en-US" smtClean="0"/>
               <a:pPr/>
-              <a:t>2/16/15</a:t>
+              <a:t>2/19/15</a:t>
             </a:fld>
             <a:endParaRPr lang="en-US"/>
           </a:p>
@@ -859,7 +860,7 @@
             <a:fld id="{4F754926-63EB-4746-BA1D-DEED820DE9EA}" type="slidenum">
               <a:rPr lang="en-US" smtClean="0"/>
               <a:pPr/>
-              <a:t>‹Nr.›</a:t>
+              <a:t>‹#›</a:t>
             </a:fld>
             <a:endParaRPr lang="en-US"/>
           </a:p>
@@ -874,7 +875,7 @@
 </file>
 
 <file path=ppt/slideLayouts/slideLayout3.xml><?xml version="1.0" encoding="utf-8"?>
-<p:sldLayout xmlns:a="http://schemas.openxmlformats.org/drawingml/2006/main" xmlns:r="http://schemas.openxmlformats.org/officeDocument/2006/relationships" xmlns:p="http://schemas.openxmlformats.org/presentationml/2006/main" type="secHead" preserve="1">
+<p:sldLayout xmlns:a="http://schemas.openxmlformats.org/drawingml/2006/main" xmlns:r="http://schemas.openxmlformats.org/officeDocument/2006/relationships" xmlns:mc="http://schemas.openxmlformats.org/markup-compatibility/2006" xmlns:mv="urn:schemas-microsoft-com:mac:vml" xmlns:p="http://schemas.openxmlformats.org/presentationml/2006/main" mc:Ignorable="mv" mc:PreserveAttributes="mv:*" type="secHead" preserve="1">
   <p:cSld name="Section Header">
     <p:spTree>
       <p:nvGrpSpPr>
@@ -1059,7 +1060,7 @@
             <a:fld id="{7AB4D525-FEA6-4C46-A836-18AB099A0B80}" type="datetimeFigureOut">
               <a:rPr lang="en-US" smtClean="0"/>
               <a:pPr/>
-              <a:t>2/16/15</a:t>
+              <a:t>2/19/15</a:t>
             </a:fld>
             <a:endParaRPr lang="en-US"/>
           </a:p>
@@ -1102,7 +1103,7 @@
             <a:fld id="{4F754926-63EB-4746-BA1D-DEED820DE9EA}" type="slidenum">
               <a:rPr lang="en-US" smtClean="0"/>
               <a:pPr/>
-              <a:t>‹Nr.›</a:t>
+              <a:t>‹#›</a:t>
             </a:fld>
             <a:endParaRPr lang="en-US"/>
           </a:p>
@@ -1117,7 +1118,7 @@
 </file>
 
 <file path=ppt/slideLayouts/slideLayout4.xml><?xml version="1.0" encoding="utf-8"?>
-<p:sldLayout xmlns:a="http://schemas.openxmlformats.org/drawingml/2006/main" xmlns:r="http://schemas.openxmlformats.org/officeDocument/2006/relationships" xmlns:p="http://schemas.openxmlformats.org/presentationml/2006/main" type="twoObj" preserve="1">
+<p:sldLayout xmlns:a="http://schemas.openxmlformats.org/drawingml/2006/main" xmlns:r="http://schemas.openxmlformats.org/officeDocument/2006/relationships" xmlns:mc="http://schemas.openxmlformats.org/markup-compatibility/2006" xmlns:mv="urn:schemas-microsoft-com:mac:vml" xmlns:p="http://schemas.openxmlformats.org/presentationml/2006/main" mc:Ignorable="mv" mc:PreserveAttributes="mv:*" type="twoObj" preserve="1">
   <p:cSld name="Two Content">
     <p:spTree>
       <p:nvGrpSpPr>
@@ -1344,7 +1345,7 @@
             <a:fld id="{7AB4D525-FEA6-4C46-A836-18AB099A0B80}" type="datetimeFigureOut">
               <a:rPr lang="en-US" smtClean="0"/>
               <a:pPr/>
-              <a:t>2/16/15</a:t>
+              <a:t>2/19/15</a:t>
             </a:fld>
             <a:endParaRPr lang="en-US"/>
           </a:p>
@@ -1387,7 +1388,7 @@
             <a:fld id="{4F754926-63EB-4746-BA1D-DEED820DE9EA}" type="slidenum">
               <a:rPr lang="en-US" smtClean="0"/>
               <a:pPr/>
-              <a:t>‹Nr.›</a:t>
+              <a:t>‹#›</a:t>
             </a:fld>
             <a:endParaRPr lang="en-US"/>
           </a:p>
@@ -1402,7 +1403,7 @@
 </file>
 
 <file path=ppt/slideLayouts/slideLayout5.xml><?xml version="1.0" encoding="utf-8"?>
-<p:sldLayout xmlns:a="http://schemas.openxmlformats.org/drawingml/2006/main" xmlns:r="http://schemas.openxmlformats.org/officeDocument/2006/relationships" xmlns:p="http://schemas.openxmlformats.org/presentationml/2006/main" type="twoTxTwoObj" preserve="1">
+<p:sldLayout xmlns:a="http://schemas.openxmlformats.org/drawingml/2006/main" xmlns:r="http://schemas.openxmlformats.org/officeDocument/2006/relationships" xmlns:mc="http://schemas.openxmlformats.org/markup-compatibility/2006" xmlns:mv="urn:schemas-microsoft-com:mac:vml" xmlns:p="http://schemas.openxmlformats.org/presentationml/2006/main" mc:Ignorable="mv" mc:PreserveAttributes="mv:*" type="twoTxTwoObj" preserve="1">
   <p:cSld name="Comparison">
     <p:spTree>
       <p:nvGrpSpPr>
@@ -1763,7 +1764,7 @@
             <a:fld id="{7AB4D525-FEA6-4C46-A836-18AB099A0B80}" type="datetimeFigureOut">
               <a:rPr lang="en-US" smtClean="0"/>
               <a:pPr/>
-              <a:t>2/16/15</a:t>
+              <a:t>2/19/15</a:t>
             </a:fld>
             <a:endParaRPr lang="en-US"/>
           </a:p>
@@ -1806,7 +1807,7 @@
             <a:fld id="{4F754926-63EB-4746-BA1D-DEED820DE9EA}" type="slidenum">
               <a:rPr lang="en-US" smtClean="0"/>
               <a:pPr/>
-              <a:t>‹Nr.›</a:t>
+              <a:t>‹#›</a:t>
             </a:fld>
             <a:endParaRPr lang="en-US"/>
           </a:p>
@@ -1821,7 +1822,7 @@
 </file>
 
 <file path=ppt/slideLayouts/slideLayout6.xml><?xml version="1.0" encoding="utf-8"?>
-<p:sldLayout xmlns:a="http://schemas.openxmlformats.org/drawingml/2006/main" xmlns:r="http://schemas.openxmlformats.org/officeDocument/2006/relationships" xmlns:p="http://schemas.openxmlformats.org/presentationml/2006/main" type="titleOnly" preserve="1">
+<p:sldLayout xmlns:a="http://schemas.openxmlformats.org/drawingml/2006/main" xmlns:r="http://schemas.openxmlformats.org/officeDocument/2006/relationships" xmlns:mc="http://schemas.openxmlformats.org/markup-compatibility/2006" xmlns:mv="urn:schemas-microsoft-com:mac:vml" xmlns:p="http://schemas.openxmlformats.org/presentationml/2006/main" mc:Ignorable="mv" mc:PreserveAttributes="mv:*" type="titleOnly" preserve="1">
   <p:cSld name="Title Only">
     <p:spTree>
       <p:nvGrpSpPr>
@@ -1878,7 +1879,7 @@
             <a:fld id="{7AB4D525-FEA6-4C46-A836-18AB099A0B80}" type="datetimeFigureOut">
               <a:rPr lang="en-US" smtClean="0"/>
               <a:pPr/>
-              <a:t>2/16/15</a:t>
+              <a:t>2/19/15</a:t>
             </a:fld>
             <a:endParaRPr lang="en-US"/>
           </a:p>
@@ -1921,7 +1922,7 @@
             <a:fld id="{4F754926-63EB-4746-BA1D-DEED820DE9EA}" type="slidenum">
               <a:rPr lang="en-US" smtClean="0"/>
               <a:pPr/>
-              <a:t>‹Nr.›</a:t>
+              <a:t>‹#›</a:t>
             </a:fld>
             <a:endParaRPr lang="en-US"/>
           </a:p>
@@ -1936,7 +1937,7 @@
 </file>
 
 <file path=ppt/slideLayouts/slideLayout7.xml><?xml version="1.0" encoding="utf-8"?>
-<p:sldLayout xmlns:a="http://schemas.openxmlformats.org/drawingml/2006/main" xmlns:r="http://schemas.openxmlformats.org/officeDocument/2006/relationships" xmlns:p="http://schemas.openxmlformats.org/presentationml/2006/main" type="blank" preserve="1">
+<p:sldLayout xmlns:a="http://schemas.openxmlformats.org/drawingml/2006/main" xmlns:r="http://schemas.openxmlformats.org/officeDocument/2006/relationships" xmlns:mc="http://schemas.openxmlformats.org/markup-compatibility/2006" xmlns:mv="urn:schemas-microsoft-com:mac:vml" xmlns:p="http://schemas.openxmlformats.org/presentationml/2006/main" mc:Ignorable="mv" mc:PreserveAttributes="mv:*" type="blank" preserve="1">
   <p:cSld name="Blank">
     <p:spTree>
       <p:nvGrpSpPr>
@@ -1970,7 +1971,7 @@
             <a:fld id="{7AB4D525-FEA6-4C46-A836-18AB099A0B80}" type="datetimeFigureOut">
               <a:rPr lang="en-US" smtClean="0"/>
               <a:pPr/>
-              <a:t>2/16/15</a:t>
+              <a:t>2/19/15</a:t>
             </a:fld>
             <a:endParaRPr lang="en-US"/>
           </a:p>
@@ -2013,7 +2014,7 @@
             <a:fld id="{4F754926-63EB-4746-BA1D-DEED820DE9EA}" type="slidenum">
               <a:rPr lang="en-US" smtClean="0"/>
               <a:pPr/>
-              <a:t>‹Nr.›</a:t>
+              <a:t>‹#›</a:t>
             </a:fld>
             <a:endParaRPr lang="en-US"/>
           </a:p>
@@ -2028,7 +2029,7 @@
 </file>
 
 <file path=ppt/slideLayouts/slideLayout8.xml><?xml version="1.0" encoding="utf-8"?>
-<p:sldLayout xmlns:a="http://schemas.openxmlformats.org/drawingml/2006/main" xmlns:r="http://schemas.openxmlformats.org/officeDocument/2006/relationships" xmlns:p="http://schemas.openxmlformats.org/presentationml/2006/main" type="objTx" preserve="1">
+<p:sldLayout xmlns:a="http://schemas.openxmlformats.org/drawingml/2006/main" xmlns:r="http://schemas.openxmlformats.org/officeDocument/2006/relationships" xmlns:mc="http://schemas.openxmlformats.org/markup-compatibility/2006" xmlns:mv="urn:schemas-microsoft-com:mac:vml" xmlns:p="http://schemas.openxmlformats.org/presentationml/2006/main" mc:Ignorable="mv" mc:PreserveAttributes="mv:*" type="objTx" preserve="1">
   <p:cSld name="Content with Caption">
     <p:spTree>
       <p:nvGrpSpPr>
@@ -2244,7 +2245,7 @@
             <a:fld id="{7AB4D525-FEA6-4C46-A836-18AB099A0B80}" type="datetimeFigureOut">
               <a:rPr lang="en-US" smtClean="0"/>
               <a:pPr/>
-              <a:t>2/16/15</a:t>
+              <a:t>2/19/15</a:t>
             </a:fld>
             <a:endParaRPr lang="en-US"/>
           </a:p>
@@ -2287,7 +2288,7 @@
             <a:fld id="{4F754926-63EB-4746-BA1D-DEED820DE9EA}" type="slidenum">
               <a:rPr lang="en-US" smtClean="0"/>
               <a:pPr/>
-              <a:t>‹Nr.›</a:t>
+              <a:t>‹#›</a:t>
             </a:fld>
             <a:endParaRPr lang="en-US"/>
           </a:p>
@@ -2302,7 +2303,7 @@
 </file>
 
 <file path=ppt/slideLayouts/slideLayout9.xml><?xml version="1.0" encoding="utf-8"?>
-<p:sldLayout xmlns:a="http://schemas.openxmlformats.org/drawingml/2006/main" xmlns:r="http://schemas.openxmlformats.org/officeDocument/2006/relationships" xmlns:p="http://schemas.openxmlformats.org/presentationml/2006/main" type="picTx" preserve="1">
+<p:sldLayout xmlns:a="http://schemas.openxmlformats.org/drawingml/2006/main" xmlns:r="http://schemas.openxmlformats.org/officeDocument/2006/relationships" xmlns:mc="http://schemas.openxmlformats.org/markup-compatibility/2006" xmlns:mv="urn:schemas-microsoft-com:mac:vml" xmlns:p="http://schemas.openxmlformats.org/presentationml/2006/main" mc:Ignorable="mv" mc:PreserveAttributes="mv:*" type="picTx" preserve="1">
   <p:cSld name="Picture with Caption">
     <p:spTree>
       <p:nvGrpSpPr>
@@ -2494,7 +2495,7 @@
             <a:fld id="{7AB4D525-FEA6-4C46-A836-18AB099A0B80}" type="datetimeFigureOut">
               <a:rPr lang="en-US" smtClean="0"/>
               <a:pPr/>
-              <a:t>2/16/15</a:t>
+              <a:t>2/19/15</a:t>
             </a:fld>
             <a:endParaRPr lang="en-US"/>
           </a:p>
@@ -2537,7 +2538,7 @@
             <a:fld id="{4F754926-63EB-4746-BA1D-DEED820DE9EA}" type="slidenum">
               <a:rPr lang="en-US" smtClean="0"/>
               <a:pPr/>
-              <a:t>‹Nr.›</a:t>
+              <a:t>‹#›</a:t>
             </a:fld>
             <a:endParaRPr lang="en-US"/>
           </a:p>
@@ -2552,7 +2553,7 @@
 </file>
 
 <file path=ppt/slideMasters/slideMaster1.xml><?xml version="1.0" encoding="utf-8"?>
-<p:sldMaster xmlns:a="http://schemas.openxmlformats.org/drawingml/2006/main" xmlns:r="http://schemas.openxmlformats.org/officeDocument/2006/relationships" xmlns:p="http://schemas.openxmlformats.org/presentationml/2006/main">
+<p:sldMaster xmlns:a="http://schemas.openxmlformats.org/drawingml/2006/main" xmlns:r="http://schemas.openxmlformats.org/officeDocument/2006/relationships" xmlns:mc="http://schemas.openxmlformats.org/markup-compatibility/2006" xmlns:mv="urn:schemas-microsoft-com:mac:vml" xmlns:p="http://schemas.openxmlformats.org/presentationml/2006/main" mc:Ignorable="mv" mc:PreserveAttributes="mv:*">
   <p:cSld>
     <p:bg>
       <p:bgRef idx="1001">
@@ -2704,7 +2705,7 @@
             <a:fld id="{7AB4D525-FEA6-4C46-A836-18AB099A0B80}" type="datetimeFigureOut">
               <a:rPr lang="en-US" smtClean="0"/>
               <a:pPr/>
-              <a:t>2/16/15</a:t>
+              <a:t>2/19/15</a:t>
             </a:fld>
             <a:endParaRPr lang="en-US"/>
           </a:p>
@@ -2783,7 +2784,7 @@
             <a:fld id="{4F754926-63EB-4746-BA1D-DEED820DE9EA}" type="slidenum">
               <a:rPr lang="en-US" smtClean="0"/>
               <a:pPr/>
-              <a:t>‹Nr.›</a:t>
+              <a:t>‹#›</a:t>
             </a:fld>
             <a:endParaRPr lang="en-US"/>
           </a:p>
@@ -3059,7 +3060,7 @@
 </file>
 
 <file path=ppt/slides/slide1.xml><?xml version="1.0" encoding="utf-8"?>
-<p:sld xmlns:a="http://schemas.openxmlformats.org/drawingml/2006/main" xmlns:r="http://schemas.openxmlformats.org/officeDocument/2006/relationships" xmlns:p="http://schemas.openxmlformats.org/presentationml/2006/main">
+<p:sld xmlns:a="http://schemas.openxmlformats.org/drawingml/2006/main" xmlns:r="http://schemas.openxmlformats.org/officeDocument/2006/relationships" xmlns:mc="http://schemas.openxmlformats.org/markup-compatibility/2006" xmlns:mv="urn:schemas-microsoft-com:mac:vml" xmlns:p="http://schemas.openxmlformats.org/presentationml/2006/main" mc:Ignorable="mv" mc:PreserveAttributes="mv:*">
   <p:cSld>
     <p:spTree>
       <p:nvGrpSpPr>
@@ -3313,7 +3314,7 @@
   <p:timing>
     <p:tnLst>
       <p:par>
-        <p:cTn xmlns:p14="http://schemas.microsoft.com/office/powerpoint/2010/main" id="1" dur="indefinite" restart="never" nodeType="tmRoot"/>
+        <p:cTn id="1" dur="indefinite" restart="never" nodeType="tmRoot"/>
       </p:par>
     </p:tnLst>
   </p:timing>
@@ -3321,7 +3322,7 @@
 </file>
 
 <file path=ppt/slides/slide10.xml><?xml version="1.0" encoding="utf-8"?>
-<p:sld xmlns:a="http://schemas.openxmlformats.org/drawingml/2006/main" xmlns:r="http://schemas.openxmlformats.org/officeDocument/2006/relationships" xmlns:p="http://schemas.openxmlformats.org/presentationml/2006/main">
+<p:sld xmlns:a="http://schemas.openxmlformats.org/drawingml/2006/main" xmlns:r="http://schemas.openxmlformats.org/officeDocument/2006/relationships" xmlns:mc="http://schemas.openxmlformats.org/markup-compatibility/2006" xmlns:mv="urn:schemas-microsoft-com:mac:vml" xmlns:p="http://schemas.openxmlformats.org/presentationml/2006/main" mc:Ignorable="mv" mc:PreserveAttributes="mv:*">
   <p:cSld>
     <p:spTree>
       <p:nvGrpSpPr>
@@ -3430,27 +3431,7 @@
           <a:p>
             <a:r>
               <a:rPr lang="en-US" dirty="0" smtClean="0"/>
-              <a:t>-&gt; Problem 1: </a:t>
-            </a:r>
-            <a:r>
-              <a:rPr lang="en-US" dirty="0" smtClean="0"/>
-              <a:t>commits </a:t>
-            </a:r>
-            <a:r>
-              <a:rPr lang="en-US" dirty="0" smtClean="0"/>
-              <a:t>can’t be saved </a:t>
-            </a:r>
-            <a:r>
-              <a:rPr lang="en-US" dirty="0" smtClean="0"/>
-              <a:t>as</a:t>
-            </a:r>
-            <a:r>
-              <a:rPr lang="en-US" dirty="0" smtClean="0"/>
-              <a:t> </a:t>
-            </a:r>
-            <a:r>
-              <a:rPr lang="en-US" dirty="0" smtClean="0"/>
-              <a:t>‘V1’, ‘V2’, ‘V3’, etc..</a:t>
+              <a:t>-&gt; Problem 1: commits can’t be saved as ‘V1’, ‘V2’, ‘V3’, etc..</a:t>
             </a:r>
           </a:p>
           <a:p>
@@ -4305,26 +4286,97 @@
     </p:spTree>
     <p:extLst>
       <p:ext uri="{BB962C8B-B14F-4D97-AF65-F5344CB8AC3E}">
-        <p14:creationId xmlns:p14="http://schemas.microsoft.com/office/powerpoint/2010/main" val="2278185650"/>
+        <p14:creationId xmlns:p14="http://schemas.microsoft.com/office/powerpoint/2010/main" xmlns:p="http://schemas.openxmlformats.org/presentationml/2006/main" xmlns:r="http://schemas.openxmlformats.org/officeDocument/2006/relationships" xmlns:a="http://schemas.openxmlformats.org/drawingml/2006/main" xmlns="" val="2278185650"/>
       </p:ext>
     </p:extLst>
   </p:cSld>
   <p:clrMapOvr>
     <a:masterClrMapping/>
   </p:clrMapOvr>
-  <p:transition xmlns:p14="http://schemas.microsoft.com/office/powerpoint/2010/main"/>
+  <p:transition/>
   <p:timing>
     <p:tnLst>
       <p:par>
-        <p:cTn xmlns:p14="http://schemas.microsoft.com/office/powerpoint/2010/main" id="1" dur="indefinite" restart="never" nodeType="tmRoot"/>
+        <p:cTn id="1" dur="indefinite" restart="never" nodeType="tmRoot">
+          <p:childTnLst>
+            <p:seq concurrent="1" nextAc="seek">
+              <p:cTn id="2" dur="indefinite" nodeType="mainSeq">
+                <p:childTnLst>
+                  <p:par>
+                    <p:cTn id="3" fill="hold">
+                      <p:stCondLst>
+                        <p:cond delay="indefinite"/>
+                      </p:stCondLst>
+                      <p:childTnLst>
+                        <p:par>
+                          <p:cTn id="4" fill="hold">
+                            <p:stCondLst>
+                              <p:cond delay="0"/>
+                            </p:stCondLst>
+                            <p:childTnLst>
+                              <p:par>
+                                <p:cTn id="5" presetID="1" presetClass="entr" presetSubtype="0" fill="hold" grpId="0" nodeType="clickEffect">
+                                  <p:stCondLst>
+                                    <p:cond delay="0"/>
+                                  </p:stCondLst>
+                                  <p:childTnLst>
+                                    <p:set>
+                                      <p:cBhvr>
+                                        <p:cTn id="6" dur="1" fill="hold">
+                                          <p:stCondLst>
+                                            <p:cond delay="0"/>
+                                          </p:stCondLst>
+                                        </p:cTn>
+                                        <p:tgtEl>
+                                          <p:spTgt spid="6"/>
+                                        </p:tgtEl>
+                                        <p:attrNameLst>
+                                          <p:attrName>style.visibility</p:attrName>
+                                        </p:attrNameLst>
+                                      </p:cBhvr>
+                                      <p:to>
+                                        <p:strVal val="visible"/>
+                                      </p:to>
+                                    </p:set>
+                                  </p:childTnLst>
+                                </p:cTn>
+                              </p:par>
+                            </p:childTnLst>
+                          </p:cTn>
+                        </p:par>
+                      </p:childTnLst>
+                    </p:cTn>
+                  </p:par>
+                </p:childTnLst>
+              </p:cTn>
+              <p:prevCondLst>
+                <p:cond evt="onPrev" delay="0">
+                  <p:tgtEl>
+                    <p:sldTgt/>
+                  </p:tgtEl>
+                </p:cond>
+              </p:prevCondLst>
+              <p:nextCondLst>
+                <p:cond evt="onNext" delay="0">
+                  <p:tgtEl>
+                    <p:sldTgt/>
+                  </p:tgtEl>
+                </p:cond>
+              </p:nextCondLst>
+            </p:seq>
+          </p:childTnLst>
+        </p:cTn>
       </p:par>
     </p:tnLst>
+    <p:bldLst>
+      <p:bldP spid="6" grpId="0"/>
+    </p:bldLst>
   </p:timing>
 </p:sld>
 </file>
 
 <file path=ppt/slides/slide11.xml><?xml version="1.0" encoding="utf-8"?>
-<p:sld xmlns:a="http://schemas.openxmlformats.org/drawingml/2006/main" xmlns:r="http://schemas.openxmlformats.org/officeDocument/2006/relationships" xmlns:p="http://schemas.openxmlformats.org/presentationml/2006/main">
+<p:sld xmlns:a="http://schemas.openxmlformats.org/drawingml/2006/main" xmlns:r="http://schemas.openxmlformats.org/officeDocument/2006/relationships" xmlns:mc="http://schemas.openxmlformats.org/markup-compatibility/2006" xmlns:mv="urn:schemas-microsoft-com:mac:vml" xmlns:p="http://schemas.openxmlformats.org/presentationml/2006/main" mc:Ignorable="mv" mc:PreserveAttributes="mv:*">
   <p:cSld>
     <p:spTree>
       <p:nvGrpSpPr>
@@ -4699,18 +4751,18 @@
     </p:spTree>
     <p:extLst>
       <p:ext uri="{BB962C8B-B14F-4D97-AF65-F5344CB8AC3E}">
-        <p14:creationId xmlns:p14="http://schemas.microsoft.com/office/powerpoint/2010/main" val="2864348573"/>
+        <p14:creationId xmlns:p14="http://schemas.microsoft.com/office/powerpoint/2010/main" xmlns:p="http://schemas.openxmlformats.org/presentationml/2006/main" xmlns:r="http://schemas.openxmlformats.org/officeDocument/2006/relationships" xmlns:a="http://schemas.openxmlformats.org/drawingml/2006/main" xmlns="" val="2864348573"/>
       </p:ext>
     </p:extLst>
   </p:cSld>
   <p:clrMapOvr>
     <a:masterClrMapping/>
   </p:clrMapOvr>
-  <p:transition xmlns:p14="http://schemas.microsoft.com/office/powerpoint/2010/main"/>
+  <p:transition/>
   <p:timing>
     <p:tnLst>
       <p:par>
-        <p:cTn xmlns:p14="http://schemas.microsoft.com/office/powerpoint/2010/main" id="1" dur="indefinite" restart="never" nodeType="tmRoot">
+        <p:cTn id="1" dur="indefinite" restart="never" nodeType="tmRoot">
           <p:childTnLst>
             <p:seq concurrent="1" nextAc="seek">
               <p:cTn id="2" dur="indefinite" nodeType="mainSeq">
@@ -4962,7 +5014,7 @@
 </file>
 
 <file path=ppt/slides/slide12.xml><?xml version="1.0" encoding="utf-8"?>
-<p:sld xmlns:a="http://schemas.openxmlformats.org/drawingml/2006/main" xmlns:r="http://schemas.openxmlformats.org/officeDocument/2006/relationships" xmlns:p="http://schemas.openxmlformats.org/presentationml/2006/main">
+<p:sld xmlns:a="http://schemas.openxmlformats.org/drawingml/2006/main" xmlns:r="http://schemas.openxmlformats.org/officeDocument/2006/relationships" xmlns:mc="http://schemas.openxmlformats.org/markup-compatibility/2006" xmlns:mv="urn:schemas-microsoft-com:mac:vml" xmlns:p="http://schemas.openxmlformats.org/presentationml/2006/main" mc:Ignorable="mv" mc:PreserveAttributes="mv:*">
   <p:cSld>
     <p:spTree>
       <p:nvGrpSpPr>
@@ -5862,11 +5914,7 @@
             </a:r>
             <a:r>
               <a:rPr lang="en-US" dirty="0" smtClean="0"/>
-              <a:t>’s case, after B has pushed his changes ) </a:t>
-            </a:r>
-            <a:r>
-              <a:rPr lang="en-US" dirty="0" smtClean="0"/>
-              <a:t>would look like:</a:t>
+              <a:t>’s case, after B has pushed his changes ) would look like:</a:t>
             </a:r>
           </a:p>
           <a:p>
@@ -6425,18 +6473,18 @@
     </p:spTree>
     <p:extLst>
       <p:ext uri="{BB962C8B-B14F-4D97-AF65-F5344CB8AC3E}">
-        <p14:creationId xmlns:p14="http://schemas.microsoft.com/office/powerpoint/2010/main" val="2278185650"/>
+        <p14:creationId xmlns:p14="http://schemas.microsoft.com/office/powerpoint/2010/main" xmlns:p="http://schemas.openxmlformats.org/presentationml/2006/main" xmlns:r="http://schemas.openxmlformats.org/officeDocument/2006/relationships" xmlns:a="http://schemas.openxmlformats.org/drawingml/2006/main" xmlns="" val="2278185650"/>
       </p:ext>
     </p:extLst>
   </p:cSld>
   <p:clrMapOvr>
     <a:masterClrMapping/>
   </p:clrMapOvr>
-  <p:transition xmlns:p14="http://schemas.microsoft.com/office/powerpoint/2010/main"/>
+  <p:transition/>
   <p:timing>
     <p:tnLst>
       <p:par>
-        <p:cTn xmlns:p14="http://schemas.microsoft.com/office/powerpoint/2010/main" id="1" dur="indefinite" restart="never" nodeType="tmRoot">
+        <p:cTn id="1" dur="indefinite" restart="never" nodeType="tmRoot">
           <p:childTnLst>
             <p:seq concurrent="1" nextAc="seek">
               <p:cTn id="2" dur="indefinite" nodeType="mainSeq">
@@ -6570,7 +6618,7 @@
 </file>
 
 <file path=ppt/slides/slide13.xml><?xml version="1.0" encoding="utf-8"?>
-<p:sld xmlns:a="http://schemas.openxmlformats.org/drawingml/2006/main" xmlns:r="http://schemas.openxmlformats.org/officeDocument/2006/relationships" xmlns:p="http://schemas.openxmlformats.org/presentationml/2006/main">
+<p:sld xmlns:a="http://schemas.openxmlformats.org/drawingml/2006/main" xmlns:r="http://schemas.openxmlformats.org/officeDocument/2006/relationships" xmlns:mc="http://schemas.openxmlformats.org/markup-compatibility/2006" xmlns:mv="urn:schemas-microsoft-com:mac:vml" xmlns:p="http://schemas.openxmlformats.org/presentationml/2006/main" mc:Ignorable="mv" mc:PreserveAttributes="mv:*">
   <p:cSld>
     <p:spTree>
       <p:nvGrpSpPr>
@@ -6617,11 +6665,7 @@
             </a:pPr>
             <a:r>
               <a:rPr lang="en-US" dirty="0" smtClean="0"/>
-              <a:t>An arbitrary number of branches can exist (and also pushed to server), e.g. Alice’s and Bob’s </a:t>
-            </a:r>
-            <a:r>
-              <a:rPr lang="en-US" dirty="0" smtClean="0"/>
-              <a:t>changes</a:t>
+              <a:t>An arbitrary number of branches can exist (and also pushed to server), e.g. Alice’s and Bob’s changes</a:t>
             </a:r>
           </a:p>
           <a:p>
@@ -6642,13 +6686,8 @@
             </a:r>
             <a:r>
               <a:rPr lang="en-US" dirty="0" smtClean="0"/>
-              <a:t>database</a:t>
-            </a:r>
-            <a:r>
-              <a:rPr lang="en-US" dirty="0" smtClean="0"/>
-              <a:t> </a:t>
-            </a:r>
-            <a:endParaRPr lang="en-US" dirty="0" smtClean="0"/>
+              <a:t>database </a:t>
+            </a:r>
           </a:p>
         </p:txBody>
       </p:sp>
@@ -7259,18 +7298,18 @@
     </p:spTree>
     <p:extLst>
       <p:ext uri="{BB962C8B-B14F-4D97-AF65-F5344CB8AC3E}">
-        <p14:creationId xmlns:p14="http://schemas.microsoft.com/office/powerpoint/2010/main" val="502525717"/>
+        <p14:creationId xmlns:p14="http://schemas.microsoft.com/office/powerpoint/2010/main" xmlns:p="http://schemas.openxmlformats.org/presentationml/2006/main" xmlns:r="http://schemas.openxmlformats.org/officeDocument/2006/relationships" xmlns:a="http://schemas.openxmlformats.org/drawingml/2006/main" xmlns="" val="502525717"/>
       </p:ext>
     </p:extLst>
   </p:cSld>
   <p:clrMapOvr>
     <a:masterClrMapping/>
   </p:clrMapOvr>
-  <p:transition xmlns:p14="http://schemas.microsoft.com/office/powerpoint/2010/main"/>
+  <p:transition/>
   <p:timing>
     <p:tnLst>
       <p:par>
-        <p:cTn xmlns:p14="http://schemas.microsoft.com/office/powerpoint/2010/main" id="1" dur="indefinite" restart="never" nodeType="tmRoot"/>
+        <p:cTn id="1" dur="indefinite" restart="never" nodeType="tmRoot"/>
       </p:par>
     </p:tnLst>
   </p:timing>
@@ -7278,7 +7317,7 @@
 </file>
 
 <file path=ppt/slides/slide14.xml><?xml version="1.0" encoding="utf-8"?>
-<p:sld xmlns:a="http://schemas.openxmlformats.org/drawingml/2006/main" xmlns:r="http://schemas.openxmlformats.org/officeDocument/2006/relationships" xmlns:p="http://schemas.openxmlformats.org/presentationml/2006/main">
+<p:sld xmlns:a="http://schemas.openxmlformats.org/drawingml/2006/main" xmlns:r="http://schemas.openxmlformats.org/officeDocument/2006/relationships" xmlns:mc="http://schemas.openxmlformats.org/markup-compatibility/2006" xmlns:mv="urn:schemas-microsoft-com:mac:vml" xmlns:p="http://schemas.openxmlformats.org/presentationml/2006/main" mc:Ignorable="mv" mc:PreserveAttributes="mv:*">
   <p:cSld>
     <p:spTree>
       <p:nvGrpSpPr>
@@ -7421,11 +7460,7 @@
             </a:pPr>
             <a:r>
               <a:rPr lang="en-US" dirty="0" smtClean="0"/>
-              <a:t>The combined repository should </a:t>
-            </a:r>
-            <a:r>
-              <a:rPr lang="en-US" dirty="0" smtClean="0"/>
-              <a:t>contain (compared to </a:t>
+              <a:t>The combined repository should contain (compared to </a:t>
             </a:r>
             <a:r>
               <a:rPr lang="en-US" b="1" dirty="0" smtClean="0">
@@ -7438,7 +7473,6 @@
               <a:rPr lang="en-US" dirty="0" smtClean="0"/>
               <a:t> branch point)</a:t>
             </a:r>
-            <a:endParaRPr lang="en-US" dirty="0" smtClean="0"/>
           </a:p>
           <a:p>
             <a:pPr lvl="1">
@@ -8205,18 +8239,18 @@
     </p:spTree>
     <p:extLst>
       <p:ext uri="{BB962C8B-B14F-4D97-AF65-F5344CB8AC3E}">
-        <p14:creationId xmlns:p14="http://schemas.microsoft.com/office/powerpoint/2010/main" val="2864348573"/>
+        <p14:creationId xmlns:p14="http://schemas.microsoft.com/office/powerpoint/2010/main" xmlns:p="http://schemas.openxmlformats.org/presentationml/2006/main" xmlns:r="http://schemas.openxmlformats.org/officeDocument/2006/relationships" xmlns:a="http://schemas.openxmlformats.org/drawingml/2006/main" xmlns="" val="2864348573"/>
       </p:ext>
     </p:extLst>
   </p:cSld>
   <p:clrMapOvr>
     <a:masterClrMapping/>
   </p:clrMapOvr>
-  <p:transition xmlns:p14="http://schemas.microsoft.com/office/powerpoint/2010/main"/>
+  <p:transition/>
   <p:timing>
     <p:tnLst>
       <p:par>
-        <p:cTn xmlns:p14="http://schemas.microsoft.com/office/powerpoint/2010/main" id="1" dur="indefinite" restart="never" nodeType="tmRoot">
+        <p:cTn id="1" dur="indefinite" restart="never" nodeType="tmRoot">
           <p:childTnLst>
             <p:seq concurrent="1" nextAc="seek">
               <p:cTn id="2" dur="indefinite" nodeType="mainSeq">
@@ -8295,7 +8329,7 @@
 </file>
 
 <file path=ppt/slides/slide15.xml><?xml version="1.0" encoding="utf-8"?>
-<p:sld xmlns:a="http://schemas.openxmlformats.org/drawingml/2006/main" xmlns:r="http://schemas.openxmlformats.org/officeDocument/2006/relationships" xmlns:p="http://schemas.openxmlformats.org/presentationml/2006/main">
+<p:sld xmlns:a="http://schemas.openxmlformats.org/drawingml/2006/main" xmlns:r="http://schemas.openxmlformats.org/officeDocument/2006/relationships" xmlns:mc="http://schemas.openxmlformats.org/markup-compatibility/2006" xmlns:mv="urn:schemas-microsoft-com:mac:vml" xmlns:p="http://schemas.openxmlformats.org/presentationml/2006/main" mc:Ignorable="mv" mc:PreserveAttributes="mv:*">
   <p:cSld>
     <p:spTree>
       <p:nvGrpSpPr>
@@ -9326,18 +9360,18 @@
     </p:spTree>
     <p:extLst>
       <p:ext uri="{BB962C8B-B14F-4D97-AF65-F5344CB8AC3E}">
-        <p14:creationId xmlns:p14="http://schemas.microsoft.com/office/powerpoint/2010/main" val="3388594987"/>
+        <p14:creationId xmlns:p14="http://schemas.microsoft.com/office/powerpoint/2010/main" xmlns:p="http://schemas.openxmlformats.org/presentationml/2006/main" xmlns:r="http://schemas.openxmlformats.org/officeDocument/2006/relationships" xmlns:a="http://schemas.openxmlformats.org/drawingml/2006/main" xmlns="" val="3388594987"/>
       </p:ext>
     </p:extLst>
   </p:cSld>
   <p:clrMapOvr>
     <a:masterClrMapping/>
   </p:clrMapOvr>
-  <p:transition xmlns:p14="http://schemas.microsoft.com/office/powerpoint/2010/main"/>
+  <p:transition/>
   <p:timing>
     <p:tnLst>
       <p:par>
-        <p:cTn xmlns:p14="http://schemas.microsoft.com/office/powerpoint/2010/main" id="1" dur="indefinite" restart="never" nodeType="tmRoot">
+        <p:cTn id="1" dur="indefinite" restart="never" nodeType="tmRoot">
           <p:childTnLst>
             <p:seq concurrent="1" nextAc="seek">
               <p:cTn id="2" dur="indefinite" nodeType="mainSeq">
@@ -9498,7 +9532,7 @@
 </file>
 
 <file path=ppt/slides/slide16.xml><?xml version="1.0" encoding="utf-8"?>
-<p:sld xmlns:a="http://schemas.openxmlformats.org/drawingml/2006/main" xmlns:r="http://schemas.openxmlformats.org/officeDocument/2006/relationships" xmlns:p="http://schemas.openxmlformats.org/presentationml/2006/main">
+<p:sld xmlns:a="http://schemas.openxmlformats.org/drawingml/2006/main" xmlns:r="http://schemas.openxmlformats.org/officeDocument/2006/relationships" xmlns:mc="http://schemas.openxmlformats.org/markup-compatibility/2006" xmlns:mv="urn:schemas-microsoft-com:mac:vml" xmlns:p="http://schemas.openxmlformats.org/presentationml/2006/main" mc:Ignorable="mv" mc:PreserveAttributes="mv:*">
   <p:cSld>
     <p:spTree>
       <p:nvGrpSpPr>
@@ -9608,11 +9642,7 @@
             </a:pPr>
             <a:r>
               <a:rPr lang="en-US" dirty="0" smtClean="0"/>
-              <a:t> Alice merges her changes into </a:t>
-            </a:r>
-            <a:r>
-              <a:rPr lang="en-US" dirty="0" smtClean="0"/>
-              <a:t>master (</a:t>
+              <a:t> Alice merges her changes into master (</a:t>
             </a:r>
             <a:r>
               <a:rPr lang="en-US" sz="1600" b="1" dirty="0" smtClean="0">
@@ -9634,26 +9664,14 @@
             </a:r>
             <a:r>
               <a:rPr lang="en-US" dirty="0" smtClean="0"/>
-              <a:t>) on </a:t>
-            </a:r>
-            <a:r>
-              <a:rPr lang="en-US" dirty="0" smtClean="0"/>
-              <a:t>her machine and pushes to server</a:t>
+              <a:t>) on her machine and pushes to server</a:t>
             </a:r>
             <a:br>
               <a:rPr lang="en-US" dirty="0" smtClean="0"/>
             </a:br>
             <a:r>
               <a:rPr lang="en-US" dirty="0" smtClean="0"/>
-              <a:t>  </a:t>
-            </a:r>
-            <a:r>
-              <a:rPr lang="en-US" dirty="0" smtClean="0"/>
-              <a:t>-&gt; easy</a:t>
-            </a:r>
-            <a:r>
-              <a:rPr lang="en-US" dirty="0" smtClean="0"/>
-              <a:t>, because master hasn’t changed since Alice branched </a:t>
+              <a:t>  -&gt; easy, because master hasn’t changed since Alice branched </a:t>
             </a:r>
             <a:br>
               <a:rPr lang="en-US" dirty="0" smtClean="0"/>
@@ -11458,18 +11476,18 @@
     </p:spTree>
     <p:extLst>
       <p:ext uri="{BB962C8B-B14F-4D97-AF65-F5344CB8AC3E}">
-        <p14:creationId xmlns:p14="http://schemas.microsoft.com/office/powerpoint/2010/main" val="1708097681"/>
+        <p14:creationId xmlns:p14="http://schemas.microsoft.com/office/powerpoint/2010/main" xmlns:p="http://schemas.openxmlformats.org/presentationml/2006/main" xmlns:r="http://schemas.openxmlformats.org/officeDocument/2006/relationships" xmlns:a="http://schemas.openxmlformats.org/drawingml/2006/main" xmlns="" val="1708097681"/>
       </p:ext>
     </p:extLst>
   </p:cSld>
   <p:clrMapOvr>
     <a:masterClrMapping/>
   </p:clrMapOvr>
-  <p:transition xmlns:p14="http://schemas.microsoft.com/office/powerpoint/2010/main"/>
+  <p:transition/>
   <p:timing>
     <p:tnLst>
       <p:par>
-        <p:cTn xmlns:p14="http://schemas.microsoft.com/office/powerpoint/2010/main" id="1" dur="indefinite" restart="never" nodeType="tmRoot">
+        <p:cTn id="1" dur="indefinite" restart="never" nodeType="tmRoot">
           <p:childTnLst>
             <p:seq concurrent="1" nextAc="seek">
               <p:cTn id="2" dur="indefinite" nodeType="mainSeq">
@@ -11630,7 +11648,7 @@
 </file>
 
 <file path=ppt/slides/slide17.xml><?xml version="1.0" encoding="utf-8"?>
-<p:sld xmlns:a="http://schemas.openxmlformats.org/drawingml/2006/main" xmlns:r="http://schemas.openxmlformats.org/officeDocument/2006/relationships" xmlns:p="http://schemas.openxmlformats.org/presentationml/2006/main">
+<p:sld xmlns:a="http://schemas.openxmlformats.org/drawingml/2006/main" xmlns:r="http://schemas.openxmlformats.org/officeDocument/2006/relationships" xmlns:mc="http://schemas.openxmlformats.org/markup-compatibility/2006" xmlns:mv="urn:schemas-microsoft-com:mac:vml" xmlns:p="http://schemas.openxmlformats.org/presentationml/2006/main" mc:Ignorable="mv" mc:PreserveAttributes="mv:*">
   <p:cSld>
     <p:spTree>
       <p:nvGrpSpPr>
@@ -11796,11 +11814,7 @@
             </a:r>
             <a:r>
               <a:rPr lang="en-US" dirty="0" smtClean="0"/>
-              <a:t>, </a:t>
-            </a:r>
-            <a:r>
-              <a:rPr lang="en-US" dirty="0" smtClean="0"/>
-              <a:t>and pushes the combined master to server</a:t>
+              <a:t>, and pushes the combined master to server</a:t>
             </a:r>
           </a:p>
         </p:txBody>
@@ -13105,14 +13119,7 @@
                   <a:latin typeface="Courier"/>
                   <a:cs typeface="Courier"/>
                 </a:rPr>
-                <a:t>fa8</a:t>
-              </a:r>
-              <a:r>
-                <a:rPr lang="en-US" sz="1400" b="1" dirty="0" smtClean="0">
-                  <a:latin typeface="Courier"/>
-                  <a:cs typeface="Courier"/>
-                </a:rPr>
-                <a:t>…</a:t>
+                <a:t>fa8…</a:t>
               </a:r>
               <a:endParaRPr lang="en-US" sz="1400" b="1" dirty="0">
                 <a:latin typeface="Courier"/>
@@ -13840,18 +13847,18 @@
     </p:spTree>
     <p:extLst>
       <p:ext uri="{BB962C8B-B14F-4D97-AF65-F5344CB8AC3E}">
-        <p14:creationId xmlns:p14="http://schemas.microsoft.com/office/powerpoint/2010/main" val="1708097681"/>
+        <p14:creationId xmlns:p14="http://schemas.microsoft.com/office/powerpoint/2010/main" xmlns:p="http://schemas.openxmlformats.org/presentationml/2006/main" xmlns:r="http://schemas.openxmlformats.org/officeDocument/2006/relationships" xmlns:a="http://schemas.openxmlformats.org/drawingml/2006/main" xmlns="" val="1708097681"/>
       </p:ext>
     </p:extLst>
   </p:cSld>
   <p:clrMapOvr>
     <a:masterClrMapping/>
   </p:clrMapOvr>
-  <p:transition xmlns:p14="http://schemas.microsoft.com/office/powerpoint/2010/main"/>
+  <p:transition/>
   <p:timing>
     <p:tnLst>
       <p:par>
-        <p:cTn xmlns:p14="http://schemas.microsoft.com/office/powerpoint/2010/main" id="1" dur="indefinite" restart="never" nodeType="tmRoot">
+        <p:cTn id="1" dur="indefinite" restart="never" nodeType="tmRoot">
           <p:childTnLst>
             <p:seq concurrent="1" nextAc="seek">
               <p:cTn id="2" dur="indefinite" nodeType="mainSeq">
@@ -14065,8 +14072,288 @@
 </p:sld>
 </file>
 
+<file path=ppt/slides/slide18.xml><?xml version="1.0" encoding="utf-8"?>
+<p:sld xmlns:a="http://schemas.openxmlformats.org/drawingml/2006/main" xmlns:r="http://schemas.openxmlformats.org/officeDocument/2006/relationships" xmlns:mc="http://schemas.openxmlformats.org/markup-compatibility/2006" xmlns:mv="urn:schemas-microsoft-com:mac:vml" xmlns:p="http://schemas.openxmlformats.org/presentationml/2006/main" mc:Ignorable="mv" mc:PreserveAttributes="mv:*">
+  <p:cSld>
+    <p:spTree>
+      <p:nvGrpSpPr>
+        <p:cNvPr id="1" name=""/>
+        <p:cNvGrpSpPr/>
+        <p:nvPr/>
+      </p:nvGrpSpPr>
+      <p:grpSpPr>
+        <a:xfrm>
+          <a:off x="0" y="0"/>
+          <a:ext cx="0" cy="0"/>
+          <a:chOff x="0" y="0"/>
+          <a:chExt cx="0" cy="0"/>
+        </a:xfrm>
+      </p:grpSpPr>
+      <p:sp>
+        <p:nvSpPr>
+          <p:cNvPr id="4" name="TextBox 3"/>
+          <p:cNvSpPr txBox="1"/>
+          <p:nvPr/>
+        </p:nvSpPr>
+        <p:spPr>
+          <a:xfrm>
+            <a:off x="857250" y="329168"/>
+            <a:ext cx="8016875" cy="738664"/>
+          </a:xfrm>
+          <a:prstGeom prst="rect">
+            <a:avLst/>
+          </a:prstGeom>
+          <a:noFill/>
+        </p:spPr>
+        <p:txBody>
+          <a:bodyPr wrap="square" rtlCol="0">
+            <a:spAutoFit/>
+          </a:bodyPr>
+          <a:lstStyle/>
+          <a:p>
+            <a:r>
+              <a:rPr lang="en-US" sz="2400" dirty="0" smtClean="0"/>
+              <a:t>(incomplete) </a:t>
+            </a:r>
+            <a:r>
+              <a:rPr lang="en-US" sz="2400" dirty="0" err="1" smtClean="0"/>
+              <a:t>git</a:t>
+            </a:r>
+            <a:r>
+              <a:rPr lang="en-US" sz="2400" dirty="0" smtClean="0"/>
+              <a:t> command overview</a:t>
+            </a:r>
+            <a:br>
+              <a:rPr lang="en-US" sz="2400" dirty="0" smtClean="0"/>
+            </a:br>
+            <a:r>
+              <a:rPr lang="en-US" dirty="0" smtClean="0"/>
+              <a:t>(for exact syntax check out Katharina’s part) </a:t>
+            </a:r>
+            <a:endParaRPr lang="en-US" sz="2400" dirty="0"/>
+          </a:p>
+        </p:txBody>
+      </p:sp>
+      <p:sp>
+        <p:nvSpPr>
+          <p:cNvPr id="5" name="TextBox 4"/>
+          <p:cNvSpPr txBox="1"/>
+          <p:nvPr/>
+        </p:nvSpPr>
+        <p:spPr>
+          <a:xfrm>
+            <a:off x="365125" y="1952625"/>
+            <a:ext cx="8508999" cy="1200329"/>
+          </a:xfrm>
+          <a:prstGeom prst="rect">
+            <a:avLst/>
+          </a:prstGeom>
+          <a:noFill/>
+        </p:spPr>
+        <p:txBody>
+          <a:bodyPr wrap="square" rtlCol="0">
+            <a:spAutoFit/>
+          </a:bodyPr>
+          <a:lstStyle/>
+          <a:p>
+            <a:r>
+              <a:rPr lang="en-US" u="sng" dirty="0" smtClean="0"/>
+              <a:t>Use case 1: tracking and logging modifications</a:t>
+            </a:r>
+            <a:endParaRPr lang="en-US" dirty="0" smtClean="0"/>
+          </a:p>
+          <a:p>
+            <a:r>
+              <a:rPr lang="en-US" dirty="0" err="1" smtClean="0"/>
+              <a:t>git</a:t>
+            </a:r>
+            <a:r>
+              <a:rPr lang="en-US" dirty="0" smtClean="0"/>
+              <a:t> init, </a:t>
+            </a:r>
+            <a:r>
+              <a:rPr lang="en-US" dirty="0" err="1" smtClean="0"/>
+              <a:t>git</a:t>
+            </a:r>
+            <a:r>
+              <a:rPr lang="en-US" dirty="0" smtClean="0"/>
+              <a:t> clone		start a new repository or download an existing one</a:t>
+            </a:r>
+          </a:p>
+          <a:p>
+            <a:r>
+              <a:rPr lang="en-US" dirty="0" err="1" smtClean="0"/>
+              <a:t>git</a:t>
+            </a:r>
+            <a:r>
+              <a:rPr lang="en-US" dirty="0" smtClean="0"/>
+              <a:t> add, </a:t>
+            </a:r>
+            <a:r>
+              <a:rPr lang="en-US" dirty="0" err="1" smtClean="0"/>
+              <a:t>git</a:t>
+            </a:r>
+            <a:r>
+              <a:rPr lang="en-US" dirty="0" smtClean="0"/>
+              <a:t> commit          add commits to a repository</a:t>
+            </a:r>
+          </a:p>
+          <a:p>
+            <a:r>
+              <a:rPr lang="en-US" dirty="0" err="1" smtClean="0"/>
+              <a:t>git</a:t>
+            </a:r>
+            <a:r>
+              <a:rPr lang="en-US" dirty="0" smtClean="0"/>
+              <a:t> diff, </a:t>
+            </a:r>
+            <a:r>
+              <a:rPr lang="en-US" dirty="0" err="1" smtClean="0"/>
+              <a:t>git</a:t>
+            </a:r>
+            <a:r>
+              <a:rPr lang="en-US" dirty="0" smtClean="0"/>
+              <a:t> checkout         compare versions, set the repository to a previous version</a:t>
+            </a:r>
+            <a:endParaRPr lang="en-US" dirty="0"/>
+          </a:p>
+        </p:txBody>
+      </p:sp>
+      <p:sp>
+        <p:nvSpPr>
+          <p:cNvPr id="6" name="TextBox 5"/>
+          <p:cNvSpPr txBox="1"/>
+          <p:nvPr/>
+        </p:nvSpPr>
+        <p:spPr>
+          <a:xfrm>
+            <a:off x="365125" y="3593921"/>
+            <a:ext cx="8508999" cy="923330"/>
+          </a:xfrm>
+          <a:prstGeom prst="rect">
+            <a:avLst/>
+          </a:prstGeom>
+          <a:noFill/>
+        </p:spPr>
+        <p:txBody>
+          <a:bodyPr wrap="square" rtlCol="0">
+            <a:spAutoFit/>
+          </a:bodyPr>
+          <a:lstStyle/>
+          <a:p>
+            <a:r>
+              <a:rPr lang="en-US" u="sng" dirty="0" smtClean="0"/>
+              <a:t>Use case 2: backing up</a:t>
+            </a:r>
+            <a:endParaRPr lang="en-US" dirty="0" smtClean="0"/>
+          </a:p>
+          <a:p>
+            <a:r>
+              <a:rPr lang="en-US" dirty="0" err="1" smtClean="0"/>
+              <a:t>git</a:t>
+            </a:r>
+            <a:r>
+              <a:rPr lang="en-US" dirty="0" smtClean="0"/>
+              <a:t> fetch, </a:t>
+            </a:r>
+            <a:r>
+              <a:rPr lang="en-US" dirty="0" err="1" smtClean="0"/>
+              <a:t>git</a:t>
+            </a:r>
+            <a:r>
+              <a:rPr lang="en-US" dirty="0" smtClean="0"/>
+              <a:t> pull		download from remote</a:t>
+            </a:r>
+          </a:p>
+          <a:p>
+            <a:r>
+              <a:rPr lang="en-US" dirty="0" err="1" smtClean="0"/>
+              <a:t>g</a:t>
+            </a:r>
+            <a:r>
+              <a:rPr lang="en-US" dirty="0" err="1" smtClean="0"/>
+              <a:t>it</a:t>
+            </a:r>
+            <a:r>
+              <a:rPr lang="en-US" dirty="0" smtClean="0"/>
+              <a:t> push				upload to remote</a:t>
+            </a:r>
+            <a:endParaRPr lang="en-US" dirty="0"/>
+          </a:p>
+        </p:txBody>
+      </p:sp>
+      <p:sp>
+        <p:nvSpPr>
+          <p:cNvPr id="7" name="TextBox 6"/>
+          <p:cNvSpPr txBox="1"/>
+          <p:nvPr/>
+        </p:nvSpPr>
+        <p:spPr>
+          <a:xfrm>
+            <a:off x="365125" y="5016500"/>
+            <a:ext cx="8508999" cy="923330"/>
+          </a:xfrm>
+          <a:prstGeom prst="rect">
+            <a:avLst/>
+          </a:prstGeom>
+          <a:noFill/>
+        </p:spPr>
+        <p:txBody>
+          <a:bodyPr wrap="square" rtlCol="0">
+            <a:spAutoFit/>
+          </a:bodyPr>
+          <a:lstStyle/>
+          <a:p>
+            <a:r>
+              <a:rPr lang="en-US" u="sng" dirty="0" smtClean="0"/>
+              <a:t>Use case 3:collaboration</a:t>
+            </a:r>
+            <a:endParaRPr lang="en-US" dirty="0" smtClean="0"/>
+          </a:p>
+          <a:p>
+            <a:r>
+              <a:rPr lang="en-US" dirty="0" err="1" smtClean="0"/>
+              <a:t>git</a:t>
+            </a:r>
+            <a:r>
+              <a:rPr lang="en-US" dirty="0" smtClean="0"/>
+              <a:t> branch			start a new branch</a:t>
+            </a:r>
+          </a:p>
+          <a:p>
+            <a:r>
+              <a:rPr lang="en-US" dirty="0" err="1" smtClean="0"/>
+              <a:t>g</a:t>
+            </a:r>
+            <a:r>
+              <a:rPr lang="en-US" dirty="0" err="1" smtClean="0"/>
+              <a:t>it</a:t>
+            </a:r>
+            <a:r>
+              <a:rPr lang="en-US" dirty="0" smtClean="0"/>
+              <a:t> merge				merge two branches</a:t>
+            </a:r>
+            <a:endParaRPr lang="en-US" dirty="0"/>
+          </a:p>
+        </p:txBody>
+      </p:sp>
+    </p:spTree>
+  </p:cSld>
+  <p:clrMapOvr>
+    <a:masterClrMapping/>
+  </p:clrMapOvr>
+  <p:timing>
+    <p:tnLst>
+      <p:par>
+        <p:cTn id="1" dur="indefinite" restart="never" nodeType="tmRoot"/>
+      </p:par>
+    </p:tnLst>
+  </p:timing>
+</p:sld>
+</file>
+
 <file path=ppt/slides/slide2.xml><?xml version="1.0" encoding="utf-8"?>
-<p:sld xmlns:a="http://schemas.openxmlformats.org/drawingml/2006/main" xmlns:r="http://schemas.openxmlformats.org/officeDocument/2006/relationships" xmlns:p="http://schemas.openxmlformats.org/presentationml/2006/main">
+<p:sld xmlns:a="http://schemas.openxmlformats.org/drawingml/2006/main" xmlns:r="http://schemas.openxmlformats.org/officeDocument/2006/relationships" xmlns:mc="http://schemas.openxmlformats.org/markup-compatibility/2006" xmlns:mv="urn:schemas-microsoft-com:mac:vml" xmlns:p="http://schemas.openxmlformats.org/presentationml/2006/main" mc:Ignorable="mv" mc:PreserveAttributes="mv:*">
   <p:cSld>
     <p:spTree>
       <p:nvGrpSpPr>
@@ -14341,7 +14628,7 @@
     </p:spTree>
     <p:extLst>
       <p:ext uri="{BB962C8B-B14F-4D97-AF65-F5344CB8AC3E}">
-        <p14:creationId xmlns:p14="http://schemas.microsoft.com/office/powerpoint/2010/main" val="133045856"/>
+        <p14:creationId xmlns:p14="http://schemas.microsoft.com/office/powerpoint/2010/main" xmlns:p="http://schemas.openxmlformats.org/presentationml/2006/main" xmlns:r="http://schemas.openxmlformats.org/officeDocument/2006/relationships" xmlns:a="http://schemas.openxmlformats.org/drawingml/2006/main" xmlns="" val="133045856"/>
       </p:ext>
     </p:extLst>
   </p:cSld>
@@ -14351,7 +14638,7 @@
   <p:timing>
     <p:tnLst>
       <p:par>
-        <p:cTn xmlns:p14="http://schemas.microsoft.com/office/powerpoint/2010/main" id="1" dur="indefinite" restart="never" nodeType="tmRoot">
+        <p:cTn id="1" dur="indefinite" restart="never" nodeType="tmRoot">
           <p:childTnLst>
             <p:seq concurrent="1" nextAc="seek">
               <p:cTn id="2" dur="indefinite" nodeType="mainSeq">
@@ -14576,7 +14863,7 @@
 </file>
 
 <file path=ppt/slides/slide3.xml><?xml version="1.0" encoding="utf-8"?>
-<p:sld xmlns:a="http://schemas.openxmlformats.org/drawingml/2006/main" xmlns:r="http://schemas.openxmlformats.org/officeDocument/2006/relationships" xmlns:p="http://schemas.openxmlformats.org/presentationml/2006/main">
+<p:sld xmlns:a="http://schemas.openxmlformats.org/drawingml/2006/main" xmlns:r="http://schemas.openxmlformats.org/officeDocument/2006/relationships" xmlns:mc="http://schemas.openxmlformats.org/markup-compatibility/2006" xmlns:mv="urn:schemas-microsoft-com:mac:vml" xmlns:p="http://schemas.openxmlformats.org/presentationml/2006/main" mc:Ignorable="mv" mc:PreserveAttributes="mv:*">
   <p:cSld>
     <p:spTree>
       <p:nvGrpSpPr>
@@ -14728,11 +15015,7 @@
             </a:r>
             <a:r>
               <a:rPr lang="en-US" i="1" dirty="0" smtClean="0"/>
-              <a:t>i.e. my paper on March 12, 2012, 8:26 </a:t>
-            </a:r>
-            <a:r>
-              <a:rPr lang="en-US" i="1" dirty="0" smtClean="0"/>
-              <a:t>PM</a:t>
+              <a:t>i.e. my paper on March 12, 2012, 8:26 PM</a:t>
             </a:r>
             <a:endParaRPr lang="en-US" dirty="0" smtClean="0"/>
           </a:p>
@@ -14837,7 +15120,7 @@
   <p:timing>
     <p:tnLst>
       <p:par>
-        <p:cTn xmlns:p14="http://schemas.microsoft.com/office/powerpoint/2010/main" id="1" dur="indefinite" restart="never" nodeType="tmRoot"/>
+        <p:cTn id="1" dur="indefinite" restart="never" nodeType="tmRoot"/>
       </p:par>
     </p:tnLst>
   </p:timing>
@@ -14845,7 +15128,7 @@
 </file>
 
 <file path=ppt/slides/slide4.xml><?xml version="1.0" encoding="utf-8"?>
-<p:sld xmlns:a="http://schemas.openxmlformats.org/drawingml/2006/main" xmlns:r="http://schemas.openxmlformats.org/officeDocument/2006/relationships" xmlns:p="http://schemas.openxmlformats.org/presentationml/2006/main">
+<p:sld xmlns:a="http://schemas.openxmlformats.org/drawingml/2006/main" xmlns:r="http://schemas.openxmlformats.org/officeDocument/2006/relationships" xmlns:mc="http://schemas.openxmlformats.org/markup-compatibility/2006" xmlns:mv="urn:schemas-microsoft-com:mac:vml" xmlns:p="http://schemas.openxmlformats.org/presentationml/2006/main" mc:Ignorable="mv" mc:PreserveAttributes="mv:*">
   <p:cSld>
     <p:spTree>
       <p:nvGrpSpPr>
@@ -15631,11 +15914,11 @@
   <p:clrMapOvr>
     <a:masterClrMapping/>
   </p:clrMapOvr>
-  <p:transition xmlns:p14="http://schemas.microsoft.com/office/powerpoint/2010/main"/>
+  <p:transition/>
   <p:timing>
     <p:tnLst>
       <p:par>
-        <p:cTn xmlns:p14="http://schemas.microsoft.com/office/powerpoint/2010/main" id="1" dur="indefinite" restart="never" nodeType="tmRoot">
+        <p:cTn id="1" dur="indefinite" restart="never" nodeType="tmRoot">
           <p:childTnLst>
             <p:seq concurrent="1" nextAc="seek">
               <p:cTn id="2" dur="indefinite" nodeType="mainSeq">
@@ -15942,7 +16225,7 @@
 </file>
 
 <file path=ppt/slides/slide5.xml><?xml version="1.0" encoding="utf-8"?>
-<p:sld xmlns:a="http://schemas.openxmlformats.org/drawingml/2006/main" xmlns:r="http://schemas.openxmlformats.org/officeDocument/2006/relationships" xmlns:p="http://schemas.openxmlformats.org/presentationml/2006/main">
+<p:sld xmlns:a="http://schemas.openxmlformats.org/drawingml/2006/main" xmlns:r="http://schemas.openxmlformats.org/officeDocument/2006/relationships" xmlns:mc="http://schemas.openxmlformats.org/markup-compatibility/2006" xmlns:mv="urn:schemas-microsoft-com:mac:vml" xmlns:p="http://schemas.openxmlformats.org/presentationml/2006/main" mc:Ignorable="mv" mc:PreserveAttributes="mv:*">
   <p:cSld>
     <p:spTree>
       <p:nvGrpSpPr>
@@ -16651,11 +16934,11 @@
   <p:clrMapOvr>
     <a:masterClrMapping/>
   </p:clrMapOvr>
-  <p:transition xmlns:p14="http://schemas.microsoft.com/office/powerpoint/2010/main"/>
+  <p:transition/>
   <p:timing>
     <p:tnLst>
       <p:par>
-        <p:cTn xmlns:p14="http://schemas.microsoft.com/office/powerpoint/2010/main" id="1" dur="indefinite" restart="never" nodeType="tmRoot"/>
+        <p:cTn id="1" dur="indefinite" restart="never" nodeType="tmRoot"/>
       </p:par>
     </p:tnLst>
   </p:timing>
@@ -16663,7 +16946,7 @@
 </file>
 
 <file path=ppt/slides/slide6.xml><?xml version="1.0" encoding="utf-8"?>
-<p:sld xmlns:a="http://schemas.openxmlformats.org/drawingml/2006/main" xmlns:r="http://schemas.openxmlformats.org/officeDocument/2006/relationships" xmlns:p="http://schemas.openxmlformats.org/presentationml/2006/main">
+<p:sld xmlns:a="http://schemas.openxmlformats.org/drawingml/2006/main" xmlns:r="http://schemas.openxmlformats.org/officeDocument/2006/relationships" xmlns:mc="http://schemas.openxmlformats.org/markup-compatibility/2006" xmlns:mv="urn:schemas-microsoft-com:mac:vml" xmlns:p="http://schemas.openxmlformats.org/presentationml/2006/main" mc:Ignorable="mv" mc:PreserveAttributes="mv:*">
   <p:cSld>
     <p:spTree>
       <p:nvGrpSpPr>
@@ -16781,19 +17064,7 @@
             </a:br>
             <a:r>
               <a:rPr lang="en-US" dirty="0" smtClean="0"/>
-              <a:t>	(</a:t>
-            </a:r>
-            <a:r>
-              <a:rPr lang="en-US" dirty="0" smtClean="0"/>
-              <a:t>by copying the database entry belonging to the version </a:t>
-            </a:r>
-            <a:r>
-              <a:rPr lang="en-US" dirty="0" smtClean="0"/>
-              <a:t>	number </a:t>
-            </a:r>
-            <a:r>
-              <a:rPr lang="en-US" dirty="0" smtClean="0"/>
-              <a:t>to the </a:t>
+              <a:t>	(by copying the database entry belonging to the version 	number to the </a:t>
             </a:r>
             <a:r>
               <a:rPr lang="en-US" dirty="0" err="1" smtClean="0"/>
@@ -16839,19 +17110,7 @@
             </a:r>
             <a:r>
               <a:rPr lang="en-US" dirty="0" smtClean="0"/>
-              <a:t>(</a:t>
-            </a:r>
-            <a:r>
-              <a:rPr lang="en-US" dirty="0" smtClean="0"/>
-              <a:t>by running a ‘diff’ between the two corresponding database </a:t>
-            </a:r>
-            <a:r>
-              <a:rPr lang="en-US" dirty="0" smtClean="0"/>
-              <a:t>	entries</a:t>
-            </a:r>
-            <a:r>
-              <a:rPr lang="en-US" dirty="0" smtClean="0"/>
-              <a:t>)</a:t>
+              <a:t>(by running a ‘diff’ between the two corresponding database 	entries)</a:t>
             </a:r>
           </a:p>
         </p:txBody>
@@ -17226,11 +17485,11 @@
   <p:clrMapOvr>
     <a:masterClrMapping/>
   </p:clrMapOvr>
-  <p:transition xmlns:p14="http://schemas.microsoft.com/office/powerpoint/2010/main"/>
+  <p:transition/>
   <p:timing>
     <p:tnLst>
       <p:par>
-        <p:cTn xmlns:p14="http://schemas.microsoft.com/office/powerpoint/2010/main" id="1" dur="indefinite" restart="never" nodeType="tmRoot"/>
+        <p:cTn id="1" dur="indefinite" restart="never" nodeType="tmRoot"/>
       </p:par>
     </p:tnLst>
   </p:timing>
@@ -17238,7 +17497,7 @@
 </file>
 
 <file path=ppt/slides/slide7.xml><?xml version="1.0" encoding="utf-8"?>
-<p:sld xmlns:a="http://schemas.openxmlformats.org/drawingml/2006/main" xmlns:r="http://schemas.openxmlformats.org/officeDocument/2006/relationships" xmlns:p="http://schemas.openxmlformats.org/presentationml/2006/main">
+<p:sld xmlns:a="http://schemas.openxmlformats.org/drawingml/2006/main" xmlns:r="http://schemas.openxmlformats.org/officeDocument/2006/relationships" xmlns:mc="http://schemas.openxmlformats.org/markup-compatibility/2006" xmlns:mv="urn:schemas-microsoft-com:mac:vml" xmlns:p="http://schemas.openxmlformats.org/presentationml/2006/main" mc:Ignorable="mv" mc:PreserveAttributes="mv:*">
   <p:cSld>
     <p:spTree>
       <p:nvGrpSpPr>
@@ -17387,8 +17646,13 @@
             </a:r>
             <a:r>
               <a:rPr lang="en-US" dirty="0" smtClean="0"/>
-              <a:t> but not on the server</a:t>
-            </a:r>
+              <a:t> but not on the</a:t>
+            </a:r>
+            <a:r>
+              <a:rPr lang="en-US" dirty="0" smtClean="0"/>
+              <a:t> remote server</a:t>
+            </a:r>
+            <a:endParaRPr lang="en-US" dirty="0" smtClean="0"/>
           </a:p>
           <a:p>
             <a:pPr marL="342900" indent="342900">
@@ -17397,7 +17661,15 @@
             </a:pPr>
             <a:r>
               <a:rPr lang="en-US" dirty="0" smtClean="0"/>
-              <a:t>Only the database entries belonging to these are copied to the server		</a:t>
+              <a:t>Only the database entries belonging to these are copied to </a:t>
+            </a:r>
+            <a:r>
+              <a:rPr lang="en-US" dirty="0" smtClean="0"/>
+              <a:t>the remote	</a:t>
+            </a:r>
+            <a:r>
+              <a:rPr lang="en-US" dirty="0" smtClean="0"/>
+              <a:t>	</a:t>
             </a:r>
             <a:endParaRPr lang="en-US" dirty="0"/>
           </a:p>
@@ -17412,7 +17684,7 @@
         <p:spPr>
           <a:xfrm>
             <a:off x="303799" y="6121843"/>
-            <a:ext cx="8810280" cy="584776"/>
+            <a:ext cx="8810280" cy="369332"/>
           </a:xfrm>
           <a:prstGeom prst="rect">
             <a:avLst/>
@@ -17430,15 +17702,13 @@
             </a:pPr>
             <a:r>
               <a:rPr lang="en-US" dirty="0" smtClean="0"/>
-              <a:t>That’s everything for use case 2 (Backing up)….   Pretty simple</a:t>
-            </a:r>
-          </a:p>
-          <a:p>
-            <a:r>
-              <a:rPr lang="en-US" sz="1400" dirty="0" smtClean="0"/>
-              <a:t>Note that often the server copy is called the ‘master’  (because that’s what everybody sees)</a:t>
-            </a:r>
-            <a:endParaRPr lang="en-US" sz="1400" dirty="0"/>
+              <a:t>That’s everything for use case 2 (Backing up)….   Pretty </a:t>
+            </a:r>
+            <a:r>
+              <a:rPr lang="en-US" dirty="0" smtClean="0"/>
+              <a:t>simple</a:t>
+            </a:r>
+            <a:endParaRPr lang="en-US" dirty="0" smtClean="0"/>
           </a:p>
         </p:txBody>
       </p:sp>
@@ -19714,23 +19984,7 @@
             </a:br>
             <a:r>
               <a:rPr lang="en-US" sz="1400" dirty="0" smtClean="0"/>
-              <a:t>(=</a:t>
-            </a:r>
-            <a:r>
-              <a:rPr lang="en-US" sz="1400" dirty="0" smtClean="0"/>
-              <a:t>‘</a:t>
-            </a:r>
-            <a:r>
-              <a:rPr lang="en-US" sz="1400" dirty="0" smtClean="0"/>
-              <a:t>remote</a:t>
-            </a:r>
-            <a:r>
-              <a:rPr lang="en-US" sz="1400" dirty="0" smtClean="0"/>
-              <a:t>’</a:t>
-            </a:r>
-            <a:r>
-              <a:rPr lang="en-US" sz="1400" dirty="0" smtClean="0"/>
-              <a:t>)</a:t>
+              <a:t>(=‘remote’)</a:t>
             </a:r>
             <a:endParaRPr lang="en-US" sz="1400" dirty="0"/>
           </a:p>
@@ -19793,11 +20047,7 @@
           <a:p>
             <a:r>
               <a:rPr lang="en-US" sz="1400" dirty="0" smtClean="0"/>
-              <a:t>Push to </a:t>
-            </a:r>
-            <a:r>
-              <a:rPr lang="en-US" sz="1400" dirty="0" smtClean="0"/>
-              <a:t>remote</a:t>
+              <a:t>Push to remote</a:t>
             </a:r>
             <a:endParaRPr lang="en-US" sz="1400" dirty="0"/>
           </a:p>
@@ -19875,11 +20125,11 @@
   <p:clrMapOvr>
     <a:masterClrMapping/>
   </p:clrMapOvr>
-  <p:transition xmlns:p14="http://schemas.microsoft.com/office/powerpoint/2010/main"/>
+  <p:transition/>
   <p:timing>
     <p:tnLst>
       <p:par>
-        <p:cTn xmlns:p14="http://schemas.microsoft.com/office/powerpoint/2010/main" id="1" dur="indefinite" restart="never" nodeType="tmRoot">
+        <p:cTn id="1" dur="indefinite" restart="never" nodeType="tmRoot">
           <p:childTnLst>
             <p:seq concurrent="1" nextAc="seek">
               <p:cTn id="2" dur="indefinite" nodeType="mainSeq">
@@ -20370,7 +20620,7 @@
 </file>
 
 <file path=ppt/slides/slide8.xml><?xml version="1.0" encoding="utf-8"?>
-<p:sld xmlns:a="http://schemas.openxmlformats.org/drawingml/2006/main" xmlns:r="http://schemas.openxmlformats.org/officeDocument/2006/relationships" xmlns:p="http://schemas.openxmlformats.org/presentationml/2006/main">
+<p:sld xmlns:a="http://schemas.openxmlformats.org/drawingml/2006/main" xmlns:r="http://schemas.openxmlformats.org/officeDocument/2006/relationships" xmlns:mc="http://schemas.openxmlformats.org/markup-compatibility/2006" xmlns:mv="urn:schemas-microsoft-com:mac:vml" xmlns:p="http://schemas.openxmlformats.org/presentationml/2006/main" mc:Ignorable="mv" mc:PreserveAttributes="mv:*">
   <p:cSld>
     <p:spTree>
       <p:nvGrpSpPr>
@@ -20471,7 +20721,7 @@
         <p:spPr>
           <a:xfrm>
             <a:off x="423350" y="2700862"/>
-            <a:ext cx="8175039" cy="1754327"/>
+            <a:ext cx="8175039" cy="2862323"/>
           </a:xfrm>
           <a:prstGeom prst="rect">
             <a:avLst/>
@@ -20486,7 +20736,15 @@
           <a:p>
             <a:r>
               <a:rPr lang="en-US" dirty="0" smtClean="0"/>
-              <a:t>This necessitates two things:</a:t>
+              <a:t>This necessitates </a:t>
+            </a:r>
+            <a:r>
+              <a:rPr lang="en-US" dirty="0" smtClean="0"/>
+              <a:t>three </a:t>
+            </a:r>
+            <a:r>
+              <a:rPr lang="en-US" dirty="0" smtClean="0"/>
+              <a:t>things:</a:t>
             </a:r>
           </a:p>
           <a:p>
@@ -20496,11 +20754,7 @@
             </a:pPr>
             <a:r>
               <a:rPr lang="en-US" dirty="0" smtClean="0"/>
-              <a:t>Users can work on an isolated version of the repository without interfering with </a:t>
-            </a:r>
-            <a:r>
-              <a:rPr lang="en-US" dirty="0" smtClean="0"/>
-              <a:t>others</a:t>
+              <a:t>Users can work on an isolated version of the repository without interfering with others</a:t>
             </a:r>
           </a:p>
           <a:p>
@@ -20523,7 +20777,37 @@
               <a:rPr lang="en-US" dirty="0" smtClean="0"/>
               <a:t>made</a:t>
             </a:r>
-            <a:endParaRPr lang="en-US" dirty="0"/>
+          </a:p>
+          <a:p>
+            <a:pPr marL="342900" indent="-342900">
+              <a:buFont typeface="+mj-lt"/>
+              <a:buAutoNum type="arabicPeriod"/>
+            </a:pPr>
+            <a:endParaRPr lang="en-US" dirty="0" smtClean="0"/>
+          </a:p>
+          <a:p>
+            <a:pPr marL="342900" indent="-342900">
+              <a:buFont typeface="+mj-lt"/>
+              <a:buAutoNum type="arabicPeriod"/>
+            </a:pPr>
+            <a:r>
+              <a:rPr lang="en-US" dirty="0" smtClean="0"/>
+              <a:t>There exists a version of the repository considered to be the most relevant one</a:t>
+            </a:r>
+            <a:br>
+              <a:rPr lang="en-US" dirty="0" smtClean="0"/>
+            </a:br>
+            <a:r>
+              <a:rPr lang="en-US" dirty="0" smtClean="0"/>
+              <a:t>(usually called ‘master’)</a:t>
+            </a:r>
+          </a:p>
+          <a:p>
+            <a:pPr marL="342900" indent="-342900">
+              <a:buFont typeface="+mj-lt"/>
+              <a:buAutoNum type="arabicPeriod"/>
+            </a:pPr>
+            <a:endParaRPr lang="en-US" dirty="0" smtClean="0"/>
           </a:p>
         </p:txBody>
       </p:sp>
@@ -20535,7 +20819,7 @@
         </p:nvSpPr>
         <p:spPr>
           <a:xfrm>
-            <a:off x="218974" y="5357927"/>
+            <a:off x="423349" y="5727259"/>
             <a:ext cx="8379415" cy="369332"/>
           </a:xfrm>
           <a:prstGeom prst="rect">
@@ -20560,26 +20844,143 @@
     </p:spTree>
     <p:extLst>
       <p:ext uri="{BB962C8B-B14F-4D97-AF65-F5344CB8AC3E}">
-        <p14:creationId xmlns:p14="http://schemas.microsoft.com/office/powerpoint/2010/main" val="653782836"/>
+        <p14:creationId xmlns:p14="http://schemas.microsoft.com/office/powerpoint/2010/main" xmlns:p="http://schemas.openxmlformats.org/presentationml/2006/main" xmlns:r="http://schemas.openxmlformats.org/officeDocument/2006/relationships" xmlns:a="http://schemas.openxmlformats.org/drawingml/2006/main" xmlns="" val="653782836"/>
       </p:ext>
     </p:extLst>
   </p:cSld>
   <p:clrMapOvr>
     <a:masterClrMapping/>
   </p:clrMapOvr>
-  <p:transition xmlns:p14="http://schemas.microsoft.com/office/powerpoint/2010/main"/>
+  <p:transition/>
   <p:timing>
     <p:tnLst>
       <p:par>
-        <p:cTn xmlns:p14="http://schemas.microsoft.com/office/powerpoint/2010/main" id="1" dur="indefinite" restart="never" nodeType="tmRoot"/>
+        <p:cTn id="1" dur="indefinite" restart="never" nodeType="tmRoot">
+          <p:childTnLst>
+            <p:seq concurrent="1" nextAc="seek">
+              <p:cTn id="2" dur="indefinite" nodeType="mainSeq">
+                <p:childTnLst>
+                  <p:par>
+                    <p:cTn id="3" fill="hold">
+                      <p:stCondLst>
+                        <p:cond delay="indefinite"/>
+                      </p:stCondLst>
+                      <p:childTnLst>
+                        <p:par>
+                          <p:cTn id="4" fill="hold">
+                            <p:stCondLst>
+                              <p:cond delay="0"/>
+                            </p:stCondLst>
+                            <p:childTnLst>
+                              <p:par>
+                                <p:cTn id="5" presetID="1" presetClass="entr" presetSubtype="0" fill="hold" grpId="1" nodeType="clickEffect">
+                                  <p:stCondLst>
+                                    <p:cond delay="0"/>
+                                  </p:stCondLst>
+                                  <p:childTnLst>
+                                    <p:set>
+                                      <p:cBhvr>
+                                        <p:cTn id="6" dur="1" fill="hold">
+                                          <p:stCondLst>
+                                            <p:cond delay="0"/>
+                                          </p:stCondLst>
+                                        </p:cTn>
+                                        <p:tgtEl>
+                                          <p:spTgt spid="7"/>
+                                        </p:tgtEl>
+                                        <p:attrNameLst>
+                                          <p:attrName>style.visibility</p:attrName>
+                                        </p:attrNameLst>
+                                      </p:cBhvr>
+                                      <p:to>
+                                        <p:strVal val="visible"/>
+                                      </p:to>
+                                    </p:set>
+                                  </p:childTnLst>
+                                </p:cTn>
+                              </p:par>
+                            </p:childTnLst>
+                          </p:cTn>
+                        </p:par>
+                      </p:childTnLst>
+                    </p:cTn>
+                  </p:par>
+                  <p:par>
+                    <p:cTn id="7" fill="hold">
+                      <p:stCondLst>
+                        <p:cond delay="indefinite"/>
+                      </p:stCondLst>
+                      <p:childTnLst>
+                        <p:par>
+                          <p:cTn id="8" fill="hold">
+                            <p:stCondLst>
+                              <p:cond delay="0"/>
+                            </p:stCondLst>
+                            <p:childTnLst>
+                              <p:par>
+                                <p:cTn id="9" presetID="1" presetClass="entr" presetSubtype="0" fill="hold" grpId="0" nodeType="clickEffect">
+                                  <p:stCondLst>
+                                    <p:cond delay="0"/>
+                                  </p:stCondLst>
+                                  <p:childTnLst>
+                                    <p:set>
+                                      <p:cBhvr>
+                                        <p:cTn id="10" dur="1" fill="hold">
+                                          <p:stCondLst>
+                                            <p:cond delay="0"/>
+                                          </p:stCondLst>
+                                        </p:cTn>
+                                        <p:tgtEl>
+                                          <p:spTgt spid="8"/>
+                                        </p:tgtEl>
+                                        <p:attrNameLst>
+                                          <p:attrName>style.visibility</p:attrName>
+                                        </p:attrNameLst>
+                                      </p:cBhvr>
+                                      <p:to>
+                                        <p:strVal val="visible"/>
+                                      </p:to>
+                                    </p:set>
+                                  </p:childTnLst>
+                                </p:cTn>
+                              </p:par>
+                            </p:childTnLst>
+                          </p:cTn>
+                        </p:par>
+                      </p:childTnLst>
+                    </p:cTn>
+                  </p:par>
+                </p:childTnLst>
+              </p:cTn>
+              <p:prevCondLst>
+                <p:cond evt="onPrev" delay="0">
+                  <p:tgtEl>
+                    <p:sldTgt/>
+                  </p:tgtEl>
+                </p:cond>
+              </p:prevCondLst>
+              <p:nextCondLst>
+                <p:cond evt="onNext" delay="0">
+                  <p:tgtEl>
+                    <p:sldTgt/>
+                  </p:tgtEl>
+                </p:cond>
+              </p:nextCondLst>
+            </p:seq>
+          </p:childTnLst>
+        </p:cTn>
       </p:par>
     </p:tnLst>
+    <p:bldLst>
+      <p:bldP spid="7" grpId="1"/>
+      <p:bldP spid="8" grpId="0"/>
+    </p:bldLst>
   </p:timing>
 </p:sld>
 </file>
 
 <file path=ppt/slides/slide9.xml><?xml version="1.0" encoding="utf-8"?>
-<p:sld xmlns:a="http://schemas.openxmlformats.org/drawingml/2006/main" xmlns:r="http://schemas.openxmlformats.org/officeDocument/2006/relationships" xmlns:p="http://schemas.openxmlformats.org/presentationml/2006/main">
+<p:sld xmlns:a="http://schemas.openxmlformats.org/drawingml/2006/main" xmlns:r="http://schemas.openxmlformats.org/officeDocument/2006/relationships" xmlns:mc="http://schemas.openxmlformats.org/markup-compatibility/2006" xmlns:mv="urn:schemas-microsoft-com:mac:vml" xmlns:p="http://schemas.openxmlformats.org/presentationml/2006/main" mc:Ignorable="mv" mc:PreserveAttributes="mv:*">
   <p:cSld>
     <p:spTree>
       <p:nvGrpSpPr>
@@ -20716,8 +21117,8 @@
         </p:nvSpPr>
         <p:spPr>
           <a:xfrm>
-            <a:off x="335761" y="5842000"/>
-            <a:ext cx="8014457" cy="923330"/>
+            <a:off x="291745" y="6211332"/>
+            <a:ext cx="8014457" cy="369332"/>
           </a:xfrm>
           <a:prstGeom prst="rect">
             <a:avLst/>
@@ -20736,24 +21137,11 @@
             </a:pPr>
             <a:r>
               <a:rPr lang="en-US" dirty="0" smtClean="0"/>
-              <a:t>The commit history is ‘diverged’ or ‘branched’</a:t>
-            </a:r>
-          </a:p>
-          <a:p>
-            <a:pPr>
-              <a:buFont typeface="Arial"/>
-              <a:buChar char="•"/>
-            </a:pPr>
-            <a:endParaRPr lang="en-US" dirty="0" smtClean="0"/>
-          </a:p>
-          <a:p>
-            <a:pPr>
-              <a:buFont typeface="Arial"/>
-              <a:buChar char="•"/>
-            </a:pPr>
+              <a:t>The commit history is ‘diverged’ or ‘branched</a:t>
+            </a:r>
             <a:r>
               <a:rPr lang="en-US" dirty="0" smtClean="0"/>
-              <a:t>Problem: no more linear project history!!!</a:t>
+              <a:t>’</a:t>
             </a:r>
           </a:p>
         </p:txBody>
@@ -20766,7 +21154,7 @@
         </p:nvSpPr>
         <p:spPr>
           <a:xfrm>
-            <a:off x="291745" y="3141364"/>
+            <a:off x="291745" y="3326030"/>
             <a:ext cx="709314" cy="646331"/>
           </a:xfrm>
           <a:prstGeom prst="rect">
@@ -20819,7 +21207,7 @@
         </p:nvSpPr>
         <p:spPr>
           <a:xfrm>
-            <a:off x="1228716" y="3141364"/>
+            <a:off x="1228716" y="3326030"/>
             <a:ext cx="709314" cy="646331"/>
           </a:xfrm>
           <a:prstGeom prst="rect">
@@ -20872,7 +21260,7 @@
         </p:nvSpPr>
         <p:spPr>
           <a:xfrm>
-            <a:off x="2131502" y="3141364"/>
+            <a:off x="2131502" y="3326030"/>
             <a:ext cx="709314" cy="646331"/>
           </a:xfrm>
           <a:prstGeom prst="rect">
@@ -21084,7 +21472,7 @@
         </p:nvSpPr>
         <p:spPr>
           <a:xfrm>
-            <a:off x="3196390" y="3969682"/>
+            <a:off x="3196390" y="4616012"/>
             <a:ext cx="709314" cy="646331"/>
           </a:xfrm>
           <a:prstGeom prst="rect">
@@ -21137,7 +21525,7 @@
         </p:nvSpPr>
         <p:spPr>
           <a:xfrm>
-            <a:off x="5745461" y="3969682"/>
+            <a:off x="5745461" y="4616012"/>
             <a:ext cx="709314" cy="646331"/>
           </a:xfrm>
           <a:prstGeom prst="rect">
@@ -21190,7 +21578,7 @@
         </p:nvCxnSpPr>
         <p:spPr>
           <a:xfrm>
-            <a:off x="218974" y="5153878"/>
+            <a:off x="218974" y="5472668"/>
             <a:ext cx="7912270" cy="1588"/>
           </a:xfrm>
           <a:prstGeom prst="straightConnector1">
@@ -21226,7 +21614,7 @@
         </p:nvSpPr>
         <p:spPr>
           <a:xfrm>
-            <a:off x="218974" y="5153878"/>
+            <a:off x="218974" y="5472668"/>
             <a:ext cx="828744" cy="369332"/>
           </a:xfrm>
           <a:prstGeom prst="rect">
@@ -21256,7 +21644,7 @@
         </p:nvSpPr>
         <p:spPr>
           <a:xfrm>
-            <a:off x="8131244" y="2324268"/>
+            <a:off x="7865848" y="2324268"/>
             <a:ext cx="968740" cy="646331"/>
           </a:xfrm>
           <a:prstGeom prst="rect">
@@ -21293,7 +21681,7 @@
         </p:nvSpPr>
         <p:spPr>
           <a:xfrm>
-            <a:off x="8131244" y="3969682"/>
+            <a:off x="6454775" y="4617600"/>
             <a:ext cx="968740" cy="646331"/>
           </a:xfrm>
           <a:prstGeom prst="rect">
@@ -21334,7 +21722,7 @@
         <p:spPr>
           <a:xfrm flipV="1">
             <a:off x="2840816" y="2647434"/>
-            <a:ext cx="1064888" cy="817096"/>
+            <a:ext cx="1064888" cy="1001762"/>
           </a:xfrm>
           <a:prstGeom prst="straightConnector1">
             <a:avLst/>
@@ -21369,7 +21757,7 @@
         </p:nvCxnSpPr>
         <p:spPr>
           <a:xfrm>
-            <a:off x="1001059" y="3464530"/>
+            <a:off x="1001059" y="3649196"/>
             <a:ext cx="227657" cy="1588"/>
           </a:xfrm>
           <a:prstGeom prst="straightConnector1">
@@ -21405,7 +21793,7 @@
         </p:nvCxnSpPr>
         <p:spPr>
           <a:xfrm>
-            <a:off x="1938030" y="3464530"/>
+            <a:off x="1938030" y="3649196"/>
             <a:ext cx="193472" cy="1588"/>
           </a:xfrm>
           <a:prstGeom prst="straightConnector1">
@@ -21441,8 +21829,8 @@
         </p:nvCxnSpPr>
         <p:spPr>
           <a:xfrm>
-            <a:off x="2840816" y="3464530"/>
-            <a:ext cx="355574" cy="828318"/>
+            <a:off x="2840816" y="3649196"/>
+            <a:ext cx="355574" cy="1289982"/>
           </a:xfrm>
           <a:prstGeom prst="straightConnector1">
             <a:avLst/>
@@ -21549,7 +21937,7 @@
         </p:nvCxnSpPr>
         <p:spPr>
           <a:xfrm>
-            <a:off x="3905704" y="4292848"/>
+            <a:off x="3905704" y="4939178"/>
             <a:ext cx="1839757" cy="1588"/>
           </a:xfrm>
           <a:prstGeom prst="straightConnector1">
@@ -21574,21 +21962,62 @@
           </a:fontRef>
         </p:style>
       </p:cxnSp>
+      <p:sp>
+        <p:nvSpPr>
+          <p:cNvPr id="25" name="TextBox 24"/>
+          <p:cNvSpPr txBox="1"/>
+          <p:nvPr/>
+        </p:nvSpPr>
+        <p:spPr>
+          <a:xfrm>
+            <a:off x="3196390" y="3327618"/>
+            <a:ext cx="968740" cy="646331"/>
+          </a:xfrm>
+          <a:prstGeom prst="rect">
+            <a:avLst/>
+          </a:prstGeom>
+          <a:noFill/>
+        </p:spPr>
+        <p:txBody>
+          <a:bodyPr wrap="square" rtlCol="0">
+            <a:spAutoFit/>
+          </a:bodyPr>
+          <a:lstStyle/>
+          <a:p>
+            <a:r>
+              <a:rPr lang="en-US" dirty="0" smtClean="0"/>
+              <a:t>m</a:t>
+            </a:r>
+            <a:r>
+              <a:rPr lang="en-US" dirty="0" smtClean="0"/>
+              <a:t>aster</a:t>
+            </a:r>
+            <a:br>
+              <a:rPr lang="en-US" dirty="0" smtClean="0"/>
+            </a:br>
+            <a:r>
+              <a:rPr lang="en-US" dirty="0" smtClean="0"/>
+              <a:t>branch</a:t>
+            </a:r>
+            <a:endParaRPr lang="en-US" dirty="0"/>
+          </a:p>
+        </p:txBody>
+      </p:sp>
     </p:spTree>
     <p:extLst>
       <p:ext uri="{BB962C8B-B14F-4D97-AF65-F5344CB8AC3E}">
-        <p14:creationId xmlns:p14="http://schemas.microsoft.com/office/powerpoint/2010/main" val="653782836"/>
+        <p14:creationId xmlns:p14="http://schemas.microsoft.com/office/powerpoint/2010/main" xmlns:p="http://schemas.openxmlformats.org/presentationml/2006/main" xmlns:r="http://schemas.openxmlformats.org/officeDocument/2006/relationships" xmlns:a="http://schemas.openxmlformats.org/drawingml/2006/main" xmlns="" val="653782836"/>
       </p:ext>
     </p:extLst>
   </p:cSld>
   <p:clrMapOvr>
     <a:masterClrMapping/>
   </p:clrMapOvr>
-  <p:transition xmlns:p14="http://schemas.microsoft.com/office/powerpoint/2010/main"/>
+  <p:transition/>
   <p:timing>
     <p:tnLst>
       <p:par>
-        <p:cTn xmlns:p14="http://schemas.microsoft.com/office/powerpoint/2010/main" id="1" dur="indefinite" restart="never" nodeType="tmRoot"/>
+        <p:cTn id="1" dur="indefinite" restart="never" nodeType="tmRoot"/>
       </p:par>
     </p:tnLst>
   </p:timing>

</xml_diff>